<commit_message>
Added a level exit door to switch between scenes, added 360Ground objects with behavior in Scene2 to expand on level, and altered the LevelMusic in Scene1 to make it persistant across levels and player deaths.
</commit_message>
<xml_diff>
--- a/Pics/sprite designs.pptx
+++ b/Pics/sprite designs.pptx
@@ -6,6 +6,7 @@
   </p:sldMasterIdLst>
   <p:sldIdLst>
     <p:sldId id="256" r:id="rId2"/>
+    <p:sldId id="257" r:id="rId3"/>
   </p:sldIdLst>
   <p:sldSz cx="12192000" cy="6858000"/>
   <p:notesSz cx="6858000" cy="9144000"/>
@@ -104,6 +105,11 @@
       </a:defRPr>
     </a:lvl9pPr>
   </p:defaultTextStyle>
+  <p:extLst>
+    <p:ext uri="{EFAFB233-063F-42B5-8137-9DF3F51BA10A}">
+      <p15:sldGuideLst xmlns:p15="http://schemas.microsoft.com/office/powerpoint/2012/main"/>
+    </p:ext>
+  </p:extLst>
 </p:presentation>
 </file>
 
@@ -254,7 +260,7 @@
           <a:p>
             <a:fld id="{C1ECD762-9F41-48F3-8A19-76C2870CFF4B}" type="datetimeFigureOut">
               <a:rPr lang="en-US" smtClean="0"/>
-              <a:t>6/21/2018</a:t>
+              <a:t>6/24/2018</a:t>
             </a:fld>
             <a:endParaRPr lang="en-US"/>
           </a:p>
@@ -452,7 +458,7 @@
           <a:p>
             <a:fld id="{C1ECD762-9F41-48F3-8A19-76C2870CFF4B}" type="datetimeFigureOut">
               <a:rPr lang="en-US" smtClean="0"/>
-              <a:t>6/21/2018</a:t>
+              <a:t>6/24/2018</a:t>
             </a:fld>
             <a:endParaRPr lang="en-US"/>
           </a:p>
@@ -660,7 +666,7 @@
           <a:p>
             <a:fld id="{C1ECD762-9F41-48F3-8A19-76C2870CFF4B}" type="datetimeFigureOut">
               <a:rPr lang="en-US" smtClean="0"/>
-              <a:t>6/21/2018</a:t>
+              <a:t>6/24/2018</a:t>
             </a:fld>
             <a:endParaRPr lang="en-US"/>
           </a:p>
@@ -858,7 +864,7 @@
           <a:p>
             <a:fld id="{C1ECD762-9F41-48F3-8A19-76C2870CFF4B}" type="datetimeFigureOut">
               <a:rPr lang="en-US" smtClean="0"/>
-              <a:t>6/21/2018</a:t>
+              <a:t>6/24/2018</a:t>
             </a:fld>
             <a:endParaRPr lang="en-US"/>
           </a:p>
@@ -1133,7 +1139,7 @@
           <a:p>
             <a:fld id="{C1ECD762-9F41-48F3-8A19-76C2870CFF4B}" type="datetimeFigureOut">
               <a:rPr lang="en-US" smtClean="0"/>
-              <a:t>6/21/2018</a:t>
+              <a:t>6/24/2018</a:t>
             </a:fld>
             <a:endParaRPr lang="en-US"/>
           </a:p>
@@ -1398,7 +1404,7 @@
           <a:p>
             <a:fld id="{C1ECD762-9F41-48F3-8A19-76C2870CFF4B}" type="datetimeFigureOut">
               <a:rPr lang="en-US" smtClean="0"/>
-              <a:t>6/21/2018</a:t>
+              <a:t>6/24/2018</a:t>
             </a:fld>
             <a:endParaRPr lang="en-US"/>
           </a:p>
@@ -1810,7 +1816,7 @@
           <a:p>
             <a:fld id="{C1ECD762-9F41-48F3-8A19-76C2870CFF4B}" type="datetimeFigureOut">
               <a:rPr lang="en-US" smtClean="0"/>
-              <a:t>6/21/2018</a:t>
+              <a:t>6/24/2018</a:t>
             </a:fld>
             <a:endParaRPr lang="en-US"/>
           </a:p>
@@ -1951,7 +1957,7 @@
           <a:p>
             <a:fld id="{C1ECD762-9F41-48F3-8A19-76C2870CFF4B}" type="datetimeFigureOut">
               <a:rPr lang="en-US" smtClean="0"/>
-              <a:t>6/21/2018</a:t>
+              <a:t>6/24/2018</a:t>
             </a:fld>
             <a:endParaRPr lang="en-US"/>
           </a:p>
@@ -2064,7 +2070,7 @@
           <a:p>
             <a:fld id="{C1ECD762-9F41-48F3-8A19-76C2870CFF4B}" type="datetimeFigureOut">
               <a:rPr lang="en-US" smtClean="0"/>
-              <a:t>6/21/2018</a:t>
+              <a:t>6/24/2018</a:t>
             </a:fld>
             <a:endParaRPr lang="en-US"/>
           </a:p>
@@ -2375,7 +2381,7 @@
           <a:p>
             <a:fld id="{C1ECD762-9F41-48F3-8A19-76C2870CFF4B}" type="datetimeFigureOut">
               <a:rPr lang="en-US" smtClean="0"/>
-              <a:t>6/21/2018</a:t>
+              <a:t>6/24/2018</a:t>
             </a:fld>
             <a:endParaRPr lang="en-US"/>
           </a:p>
@@ -2663,7 +2669,7 @@
           <a:p>
             <a:fld id="{C1ECD762-9F41-48F3-8A19-76C2870CFF4B}" type="datetimeFigureOut">
               <a:rPr lang="en-US" smtClean="0"/>
-              <a:t>6/21/2018</a:t>
+              <a:t>6/24/2018</a:t>
             </a:fld>
             <a:endParaRPr lang="en-US"/>
           </a:p>
@@ -2904,7 +2910,7 @@
           <a:p>
             <a:fld id="{C1ECD762-9F41-48F3-8A19-76C2870CFF4B}" type="datetimeFigureOut">
               <a:rPr lang="en-US" smtClean="0"/>
-              <a:t>6/21/2018</a:t>
+              <a:t>6/24/2018</a:t>
             </a:fld>
             <a:endParaRPr lang="en-US"/>
           </a:p>
@@ -3647,8 +3653,8 @@
           </p:txBody>
         </p:sp>
       </p:grpSp>
-      <mc:AlternateContent xmlns:mc="http://schemas.openxmlformats.org/markup-compatibility/2006">
-        <mc:Choice xmlns:a14="http://schemas.microsoft.com/office/drawing/2010/main" Requires="a14">
+      <mc:AlternateContent xmlns:mc="http://schemas.openxmlformats.org/markup-compatibility/2006" xmlns:a14="http://schemas.microsoft.com/office/drawing/2010/main">
+        <mc:Choice Requires="a14">
           <p:sp>
             <p:nvSpPr>
               <p:cNvPr id="13" name="TextBox 12">
@@ -3677,6 +3683,7 @@
               </a:bodyPr>
               <a:lstStyle/>
               <a:p>
+                <a:pPr/>
                 <a14:m>
                   <m:oMathPara xmlns:m="http://schemas.openxmlformats.org/officeDocument/2006/math">
                     <m:oMathParaPr>
@@ -3899,7 +3906,7 @@
             </p:txBody>
           </p:sp>
         </mc:Choice>
-        <mc:Fallback>
+        <mc:Fallback xmlns="">
           <p:sp>
             <p:nvSpPr>
               <p:cNvPr id="13" name="TextBox 12">
@@ -3944,8 +3951,8 @@
           </p:sp>
         </mc:Fallback>
       </mc:AlternateContent>
-      <mc:AlternateContent xmlns:mc="http://schemas.openxmlformats.org/markup-compatibility/2006">
-        <mc:Choice xmlns:a14="http://schemas.microsoft.com/office/drawing/2010/main" Requires="a14">
+      <mc:AlternateContent xmlns:mc="http://schemas.openxmlformats.org/markup-compatibility/2006" xmlns:a14="http://schemas.microsoft.com/office/drawing/2010/main">
+        <mc:Choice Requires="a14">
           <p:sp>
             <p:nvSpPr>
               <p:cNvPr id="14" name="TextBox 13">
@@ -3974,6 +3981,7 @@
               </a:bodyPr>
               <a:lstStyle/>
               <a:p>
+                <a:pPr/>
                 <a14:m>
                   <m:oMathPara xmlns:m="http://schemas.openxmlformats.org/officeDocument/2006/math">
                     <m:oMathParaPr>
@@ -4399,7 +4407,7 @@
             </p:txBody>
           </p:sp>
         </mc:Choice>
-        <mc:Fallback>
+        <mc:Fallback xmlns="">
           <p:sp>
             <p:nvSpPr>
               <p:cNvPr id="14" name="TextBox 13">
@@ -4448,6 +4456,309 @@
     <p:extLst>
       <p:ext uri="{BB962C8B-B14F-4D97-AF65-F5344CB8AC3E}">
         <p14:creationId xmlns:p14="http://schemas.microsoft.com/office/powerpoint/2010/main" val="695470352"/>
+      </p:ext>
+    </p:extLst>
+  </p:cSld>
+  <p:clrMapOvr>
+    <a:masterClrMapping/>
+  </p:clrMapOvr>
+</p:sld>
+</file>
+
+<file path=ppt/slides/slide2.xml><?xml version="1.0" encoding="utf-8"?>
+<p:sld xmlns:a="http://schemas.openxmlformats.org/drawingml/2006/main" xmlns:r="http://schemas.openxmlformats.org/officeDocument/2006/relationships" xmlns:p="http://schemas.openxmlformats.org/presentationml/2006/main">
+  <p:cSld>
+    <p:bg>
+      <p:bgPr>
+        <a:solidFill>
+          <a:srgbClr val="0070C0"/>
+        </a:solidFill>
+        <a:effectLst/>
+      </p:bgPr>
+    </p:bg>
+    <p:spTree>
+      <p:nvGrpSpPr>
+        <p:cNvPr id="1" name=""/>
+        <p:cNvGrpSpPr/>
+        <p:nvPr/>
+      </p:nvGrpSpPr>
+      <p:grpSpPr>
+        <a:xfrm>
+          <a:off x="0" y="0"/>
+          <a:ext cx="0" cy="0"/>
+          <a:chOff x="0" y="0"/>
+          <a:chExt cx="0" cy="0"/>
+        </a:xfrm>
+      </p:grpSpPr>
+      <p:sp>
+        <p:nvSpPr>
+          <p:cNvPr id="4" name="Rectangle 3">
+            <a:extLst>
+              <a:ext uri="{FF2B5EF4-FFF2-40B4-BE49-F238E27FC236}">
+                <a16:creationId xmlns:a16="http://schemas.microsoft.com/office/drawing/2014/main" id="{E301B682-78A3-4033-8A4E-3F34E217254B}"/>
+              </a:ext>
+            </a:extLst>
+          </p:cNvPr>
+          <p:cNvSpPr/>
+          <p:nvPr/>
+        </p:nvSpPr>
+        <p:spPr>
+          <a:xfrm>
+            <a:off x="2188028" y="4191001"/>
+            <a:ext cx="7815943" cy="326571"/>
+          </a:xfrm>
+          <a:prstGeom prst="rect">
+            <a:avLst/>
+          </a:prstGeom>
+          <a:solidFill>
+            <a:srgbClr val="00B050"/>
+          </a:solidFill>
+          <a:ln>
+            <a:solidFill>
+              <a:schemeClr val="tx1">
+                <a:lumMod val="50000"/>
+                <a:lumOff val="50000"/>
+              </a:schemeClr>
+            </a:solidFill>
+          </a:ln>
+        </p:spPr>
+        <p:style>
+          <a:lnRef idx="2">
+            <a:schemeClr val="accent1">
+              <a:shade val="50000"/>
+            </a:schemeClr>
+          </a:lnRef>
+          <a:fillRef idx="1">
+            <a:schemeClr val="accent1"/>
+          </a:fillRef>
+          <a:effectRef idx="0">
+            <a:schemeClr val="accent1"/>
+          </a:effectRef>
+          <a:fontRef idx="minor">
+            <a:schemeClr val="lt1"/>
+          </a:fontRef>
+        </p:style>
+        <p:txBody>
+          <a:bodyPr rtlCol="0" anchor="ctr"/>
+          <a:lstStyle/>
+          <a:p>
+            <a:pPr algn="ctr"/>
+            <a:endParaRPr lang="en-US"/>
+          </a:p>
+        </p:txBody>
+      </p:sp>
+      <p:grpSp>
+        <p:nvGrpSpPr>
+          <p:cNvPr id="15" name="Group 14">
+            <a:extLst>
+              <a:ext uri="{FF2B5EF4-FFF2-40B4-BE49-F238E27FC236}">
+                <a16:creationId xmlns:a16="http://schemas.microsoft.com/office/drawing/2014/main" id="{3FF603B3-15F5-425B-87D4-E5C10B149A5E}"/>
+              </a:ext>
+            </a:extLst>
+          </p:cNvPr>
+          <p:cNvGrpSpPr/>
+          <p:nvPr/>
+        </p:nvGrpSpPr>
+        <p:grpSpPr>
+          <a:xfrm>
+            <a:off x="6677025" y="2343151"/>
+            <a:ext cx="726684" cy="1847850"/>
+            <a:chOff x="6677025" y="2343151"/>
+            <a:chExt cx="726684" cy="1847850"/>
+          </a:xfrm>
+        </p:grpSpPr>
+        <p:sp>
+          <p:nvSpPr>
+            <p:cNvPr id="5" name="Rectangle 4">
+              <a:extLst>
+                <a:ext uri="{FF2B5EF4-FFF2-40B4-BE49-F238E27FC236}">
+                  <a16:creationId xmlns:a16="http://schemas.microsoft.com/office/drawing/2014/main" id="{C183303B-53AE-48FB-93FD-069CBD24E29C}"/>
+                </a:ext>
+              </a:extLst>
+            </p:cNvPr>
+            <p:cNvSpPr/>
+            <p:nvPr/>
+          </p:nvSpPr>
+          <p:spPr>
+            <a:xfrm>
+              <a:off x="6685377" y="2343151"/>
+              <a:ext cx="718332" cy="1847850"/>
+            </a:xfrm>
+            <a:prstGeom prst="rect">
+              <a:avLst/>
+            </a:prstGeom>
+            <a:solidFill>
+              <a:schemeClr val="bg1"/>
+            </a:solidFill>
+            <a:ln w="28575">
+              <a:noFill/>
+            </a:ln>
+          </p:spPr>
+          <p:style>
+            <a:lnRef idx="2">
+              <a:schemeClr val="accent1">
+                <a:shade val="50000"/>
+              </a:schemeClr>
+            </a:lnRef>
+            <a:fillRef idx="1">
+              <a:schemeClr val="accent1"/>
+            </a:fillRef>
+            <a:effectRef idx="0">
+              <a:schemeClr val="accent1"/>
+            </a:effectRef>
+            <a:fontRef idx="minor">
+              <a:schemeClr val="lt1"/>
+            </a:fontRef>
+          </p:style>
+          <p:txBody>
+            <a:bodyPr rtlCol="0" anchor="ctr"/>
+            <a:lstStyle/>
+            <a:p>
+              <a:pPr algn="ctr"/>
+              <a:endParaRPr lang="en-US"/>
+            </a:p>
+          </p:txBody>
+        </p:sp>
+        <p:cxnSp>
+          <p:nvCxnSpPr>
+            <p:cNvPr id="8" name="Straight Connector 7">
+              <a:extLst>
+                <a:ext uri="{FF2B5EF4-FFF2-40B4-BE49-F238E27FC236}">
+                  <a16:creationId xmlns:a16="http://schemas.microsoft.com/office/drawing/2014/main" id="{B04573C7-ABC1-4336-889A-E80C3C6D2464}"/>
+                </a:ext>
+              </a:extLst>
+            </p:cNvPr>
+            <p:cNvCxnSpPr>
+              <a:cxnSpLocks/>
+            </p:cNvCxnSpPr>
+            <p:nvPr/>
+          </p:nvCxnSpPr>
+          <p:spPr>
+            <a:xfrm flipV="1">
+              <a:off x="6677025" y="2343151"/>
+              <a:ext cx="8352" cy="1847850"/>
+            </a:xfrm>
+            <a:prstGeom prst="line">
+              <a:avLst/>
+            </a:prstGeom>
+            <a:ln w="28575">
+              <a:solidFill>
+                <a:schemeClr val="bg1">
+                  <a:lumMod val="50000"/>
+                </a:schemeClr>
+              </a:solidFill>
+            </a:ln>
+          </p:spPr>
+          <p:style>
+            <a:lnRef idx="1">
+              <a:schemeClr val="accent1"/>
+            </a:lnRef>
+            <a:fillRef idx="0">
+              <a:schemeClr val="accent1"/>
+            </a:fillRef>
+            <a:effectRef idx="0">
+              <a:schemeClr val="accent1"/>
+            </a:effectRef>
+            <a:fontRef idx="minor">
+              <a:schemeClr val="tx1"/>
+            </a:fontRef>
+          </p:style>
+        </p:cxnSp>
+        <p:cxnSp>
+          <p:nvCxnSpPr>
+            <p:cNvPr id="10" name="Straight Connector 9">
+              <a:extLst>
+                <a:ext uri="{FF2B5EF4-FFF2-40B4-BE49-F238E27FC236}">
+                  <a16:creationId xmlns:a16="http://schemas.microsoft.com/office/drawing/2014/main" id="{A40513BA-36F3-4928-B74B-0D8FA56F1A34}"/>
+                </a:ext>
+              </a:extLst>
+            </p:cNvPr>
+            <p:cNvCxnSpPr>
+              <a:cxnSpLocks/>
+            </p:cNvCxnSpPr>
+            <p:nvPr/>
+          </p:nvCxnSpPr>
+          <p:spPr>
+            <a:xfrm flipV="1">
+              <a:off x="7395357" y="2343151"/>
+              <a:ext cx="8352" cy="1847850"/>
+            </a:xfrm>
+            <a:prstGeom prst="line">
+              <a:avLst/>
+            </a:prstGeom>
+            <a:ln w="28575">
+              <a:solidFill>
+                <a:schemeClr val="bg1">
+                  <a:lumMod val="50000"/>
+                </a:schemeClr>
+              </a:solidFill>
+            </a:ln>
+          </p:spPr>
+          <p:style>
+            <a:lnRef idx="1">
+              <a:schemeClr val="accent1"/>
+            </a:lnRef>
+            <a:fillRef idx="0">
+              <a:schemeClr val="accent1"/>
+            </a:fillRef>
+            <a:effectRef idx="0">
+              <a:schemeClr val="accent1"/>
+            </a:effectRef>
+            <a:fontRef idx="minor">
+              <a:schemeClr val="tx1"/>
+            </a:fontRef>
+          </p:style>
+        </p:cxnSp>
+        <p:cxnSp>
+          <p:nvCxnSpPr>
+            <p:cNvPr id="11" name="Straight Connector 10">
+              <a:extLst>
+                <a:ext uri="{FF2B5EF4-FFF2-40B4-BE49-F238E27FC236}">
+                  <a16:creationId xmlns:a16="http://schemas.microsoft.com/office/drawing/2014/main" id="{02B6B198-BCFD-4154-8BD5-63026C8AF7F5}"/>
+                </a:ext>
+              </a:extLst>
+            </p:cNvPr>
+            <p:cNvCxnSpPr>
+              <a:cxnSpLocks/>
+            </p:cNvCxnSpPr>
+            <p:nvPr/>
+          </p:nvCxnSpPr>
+          <p:spPr>
+            <a:xfrm flipH="1">
+              <a:off x="6685377" y="2343151"/>
+              <a:ext cx="718332" cy="0"/>
+            </a:xfrm>
+            <a:prstGeom prst="line">
+              <a:avLst/>
+            </a:prstGeom>
+            <a:ln w="28575">
+              <a:solidFill>
+                <a:schemeClr val="bg1">
+                  <a:lumMod val="50000"/>
+                </a:schemeClr>
+              </a:solidFill>
+            </a:ln>
+          </p:spPr>
+          <p:style>
+            <a:lnRef idx="1">
+              <a:schemeClr val="accent1"/>
+            </a:lnRef>
+            <a:fillRef idx="0">
+              <a:schemeClr val="accent1"/>
+            </a:fillRef>
+            <a:effectRef idx="0">
+              <a:schemeClr val="accent1"/>
+            </a:effectRef>
+            <a:fontRef idx="minor">
+              <a:schemeClr val="tx1"/>
+            </a:fontRef>
+          </p:style>
+        </p:cxnSp>
+      </p:grpSp>
+    </p:spTree>
+    <p:extLst>
+      <p:ext uri="{BB962C8B-B14F-4D97-AF65-F5344CB8AC3E}">
+        <p14:creationId xmlns:p14="http://schemas.microsoft.com/office/powerpoint/2010/main" val="1412455053"/>
       </p:ext>
     </p:extLst>
   </p:cSld>

</xml_diff>

<commit_message>
Made pause menu buttons change sprites to indicate which button is selected. Now works with controller and keyboard menu navigation.
</commit_message>
<xml_diff>
--- a/Pics/sprite designs.pptx
+++ b/Pics/sprite designs.pptx
@@ -7,6 +7,7 @@
   <p:sldIdLst>
     <p:sldId id="256" r:id="rId2"/>
     <p:sldId id="257" r:id="rId3"/>
+    <p:sldId id="258" r:id="rId4"/>
   </p:sldIdLst>
   <p:sldSz cx="12192000" cy="6858000"/>
   <p:notesSz cx="6858000" cy="9144000"/>
@@ -4768,6 +4769,132 @@
 </p:sld>
 </file>
 
+<file path=ppt/slides/slide3.xml><?xml version="1.0" encoding="utf-8"?>
+<p:sld xmlns:a="http://schemas.openxmlformats.org/drawingml/2006/main" xmlns:r="http://schemas.openxmlformats.org/officeDocument/2006/relationships" xmlns:p="http://schemas.openxmlformats.org/presentationml/2006/main">
+  <p:cSld>
+    <p:spTree>
+      <p:nvGrpSpPr>
+        <p:cNvPr id="1" name=""/>
+        <p:cNvGrpSpPr/>
+        <p:nvPr/>
+      </p:nvGrpSpPr>
+      <p:grpSpPr>
+        <a:xfrm>
+          <a:off x="0" y="0"/>
+          <a:ext cx="0" cy="0"/>
+          <a:chOff x="0" y="0"/>
+          <a:chExt cx="0" cy="0"/>
+        </a:xfrm>
+      </p:grpSpPr>
+      <p:pic>
+        <p:nvPicPr>
+          <p:cNvPr id="5" name="Picture 4" descr="A picture containing screenshot&#10;&#10;Description generated with high confidence">
+            <a:extLst>
+              <a:ext uri="{FF2B5EF4-FFF2-40B4-BE49-F238E27FC236}">
+                <a16:creationId xmlns:a16="http://schemas.microsoft.com/office/drawing/2014/main" id="{E79C3D83-D86A-4912-82C9-C97475CED005}"/>
+              </a:ext>
+            </a:extLst>
+          </p:cNvPr>
+          <p:cNvPicPr>
+            <a:picLocks noChangeAspect="1"/>
+          </p:cNvPicPr>
+          <p:nvPr/>
+        </p:nvPicPr>
+        <p:blipFill>
+          <a:blip r:embed="rId2">
+            <a:extLst>
+              <a:ext uri="{BEBA8EAE-BF5A-486C-A8C5-ECC9F3942E4B}">
+                <a14:imgProps xmlns:a14="http://schemas.microsoft.com/office/drawing/2010/main">
+                  <a14:imgLayer r:embed="rId3">
+                    <a14:imgEffect>
+                      <a14:saturation sat="33000"/>
+                    </a14:imgEffect>
+                    <a14:imgEffect>
+                      <a14:brightnessContrast bright="40000" contrast="-40000"/>
+                    </a14:imgEffect>
+                  </a14:imgLayer>
+                </a14:imgProps>
+              </a:ext>
+              <a:ext uri="{28A0092B-C50C-407E-A947-70E740481C1C}">
+                <a14:useLocalDpi xmlns:a14="http://schemas.microsoft.com/office/drawing/2010/main" val="0"/>
+              </a:ext>
+            </a:extLst>
+          </a:blip>
+          <a:stretch>
+            <a:fillRect/>
+          </a:stretch>
+        </p:blipFill>
+        <p:spPr>
+          <a:xfrm>
+            <a:off x="3498209" y="1401508"/>
+            <a:ext cx="3621338" cy="951058"/>
+          </a:xfrm>
+          <a:prstGeom prst="rect">
+            <a:avLst/>
+          </a:prstGeom>
+        </p:spPr>
+      </p:pic>
+      <p:pic>
+        <p:nvPicPr>
+          <p:cNvPr id="8" name="Picture 7">
+            <a:extLst>
+              <a:ext uri="{FF2B5EF4-FFF2-40B4-BE49-F238E27FC236}">
+                <a16:creationId xmlns:a16="http://schemas.microsoft.com/office/drawing/2014/main" id="{DC8FA6C2-E20F-4B7F-87EF-E9785BEEC0F2}"/>
+              </a:ext>
+            </a:extLst>
+          </p:cNvPr>
+          <p:cNvPicPr>
+            <a:picLocks noChangeAspect="1"/>
+          </p:cNvPicPr>
+          <p:nvPr/>
+        </p:nvPicPr>
+        <p:blipFill>
+          <a:blip r:embed="rId4">
+            <a:extLst>
+              <a:ext uri="{BEBA8EAE-BF5A-486C-A8C5-ECC9F3942E4B}">
+                <a14:imgProps xmlns:a14="http://schemas.microsoft.com/office/drawing/2010/main">
+                  <a14:imgLayer r:embed="rId5">
+                    <a14:imgEffect>
+                      <a14:saturation sat="33000"/>
+                    </a14:imgEffect>
+                    <a14:imgEffect>
+                      <a14:brightnessContrast bright="40000" contrast="-40000"/>
+                    </a14:imgEffect>
+                  </a14:imgLayer>
+                </a14:imgProps>
+              </a:ext>
+              <a:ext uri="{28A0092B-C50C-407E-A947-70E740481C1C}">
+                <a14:useLocalDpi xmlns:a14="http://schemas.microsoft.com/office/drawing/2010/main" val="0"/>
+              </a:ext>
+            </a:extLst>
+          </a:blip>
+          <a:stretch>
+            <a:fillRect/>
+          </a:stretch>
+        </p:blipFill>
+        <p:spPr>
+          <a:xfrm>
+            <a:off x="4285331" y="2953471"/>
+            <a:ext cx="3621338" cy="951058"/>
+          </a:xfrm>
+          <a:prstGeom prst="rect">
+            <a:avLst/>
+          </a:prstGeom>
+        </p:spPr>
+      </p:pic>
+    </p:spTree>
+    <p:extLst>
+      <p:ext uri="{BB962C8B-B14F-4D97-AF65-F5344CB8AC3E}">
+        <p14:creationId xmlns:p14="http://schemas.microsoft.com/office/powerpoint/2010/main" val="3360685041"/>
+      </p:ext>
+    </p:extLst>
+  </p:cSld>
+  <p:clrMapOvr>
+    <a:masterClrMapping/>
+  </p:clrMapOvr>
+</p:sld>
+</file>
+
 <file path=ppt/theme/theme1.xml><?xml version="1.0" encoding="utf-8"?>
 <a:theme xmlns:a="http://schemas.openxmlformats.org/drawingml/2006/main" name="Office Theme">
   <a:themeElements>

</xml_diff>

<commit_message>
Created Narhem sprite and added an NPC prefab. Currently developing NPC script to get the distance between it and the player.
</commit_message>
<xml_diff>
--- a/Pics/sprite designs.pptx
+++ b/Pics/sprite designs.pptx
@@ -261,7 +261,7 @@
           <a:p>
             <a:fld id="{C1ECD762-9F41-48F3-8A19-76C2870CFF4B}" type="datetimeFigureOut">
               <a:rPr lang="en-US" smtClean="0"/>
-              <a:t>6/24/2018</a:t>
+              <a:t>7/8/2018</a:t>
             </a:fld>
             <a:endParaRPr lang="en-US"/>
           </a:p>
@@ -459,7 +459,7 @@
           <a:p>
             <a:fld id="{C1ECD762-9F41-48F3-8A19-76C2870CFF4B}" type="datetimeFigureOut">
               <a:rPr lang="en-US" smtClean="0"/>
-              <a:t>6/24/2018</a:t>
+              <a:t>7/8/2018</a:t>
             </a:fld>
             <a:endParaRPr lang="en-US"/>
           </a:p>
@@ -667,7 +667,7 @@
           <a:p>
             <a:fld id="{C1ECD762-9F41-48F3-8A19-76C2870CFF4B}" type="datetimeFigureOut">
               <a:rPr lang="en-US" smtClean="0"/>
-              <a:t>6/24/2018</a:t>
+              <a:t>7/8/2018</a:t>
             </a:fld>
             <a:endParaRPr lang="en-US"/>
           </a:p>
@@ -865,7 +865,7 @@
           <a:p>
             <a:fld id="{C1ECD762-9F41-48F3-8A19-76C2870CFF4B}" type="datetimeFigureOut">
               <a:rPr lang="en-US" smtClean="0"/>
-              <a:t>6/24/2018</a:t>
+              <a:t>7/8/2018</a:t>
             </a:fld>
             <a:endParaRPr lang="en-US"/>
           </a:p>
@@ -1140,7 +1140,7 @@
           <a:p>
             <a:fld id="{C1ECD762-9F41-48F3-8A19-76C2870CFF4B}" type="datetimeFigureOut">
               <a:rPr lang="en-US" smtClean="0"/>
-              <a:t>6/24/2018</a:t>
+              <a:t>7/8/2018</a:t>
             </a:fld>
             <a:endParaRPr lang="en-US"/>
           </a:p>
@@ -1405,7 +1405,7 @@
           <a:p>
             <a:fld id="{C1ECD762-9F41-48F3-8A19-76C2870CFF4B}" type="datetimeFigureOut">
               <a:rPr lang="en-US" smtClean="0"/>
-              <a:t>6/24/2018</a:t>
+              <a:t>7/8/2018</a:t>
             </a:fld>
             <a:endParaRPr lang="en-US"/>
           </a:p>
@@ -1817,7 +1817,7 @@
           <a:p>
             <a:fld id="{C1ECD762-9F41-48F3-8A19-76C2870CFF4B}" type="datetimeFigureOut">
               <a:rPr lang="en-US" smtClean="0"/>
-              <a:t>6/24/2018</a:t>
+              <a:t>7/8/2018</a:t>
             </a:fld>
             <a:endParaRPr lang="en-US"/>
           </a:p>
@@ -1958,7 +1958,7 @@
           <a:p>
             <a:fld id="{C1ECD762-9F41-48F3-8A19-76C2870CFF4B}" type="datetimeFigureOut">
               <a:rPr lang="en-US" smtClean="0"/>
-              <a:t>6/24/2018</a:t>
+              <a:t>7/8/2018</a:t>
             </a:fld>
             <a:endParaRPr lang="en-US"/>
           </a:p>
@@ -2071,7 +2071,7 @@
           <a:p>
             <a:fld id="{C1ECD762-9F41-48F3-8A19-76C2870CFF4B}" type="datetimeFigureOut">
               <a:rPr lang="en-US" smtClean="0"/>
-              <a:t>6/24/2018</a:t>
+              <a:t>7/8/2018</a:t>
             </a:fld>
             <a:endParaRPr lang="en-US"/>
           </a:p>
@@ -2382,7 +2382,7 @@
           <a:p>
             <a:fld id="{C1ECD762-9F41-48F3-8A19-76C2870CFF4B}" type="datetimeFigureOut">
               <a:rPr lang="en-US" smtClean="0"/>
-              <a:t>6/24/2018</a:t>
+              <a:t>7/8/2018</a:t>
             </a:fld>
             <a:endParaRPr lang="en-US"/>
           </a:p>
@@ -2670,7 +2670,7 @@
           <a:p>
             <a:fld id="{C1ECD762-9F41-48F3-8A19-76C2870CFF4B}" type="datetimeFigureOut">
               <a:rPr lang="en-US" smtClean="0"/>
-              <a:t>6/24/2018</a:t>
+              <a:t>7/8/2018</a:t>
             </a:fld>
             <a:endParaRPr lang="en-US"/>
           </a:p>
@@ -2911,7 +2911,7 @@
           <a:p>
             <a:fld id="{C1ECD762-9F41-48F3-8A19-76C2870CFF4B}" type="datetimeFigureOut">
               <a:rPr lang="en-US" smtClean="0"/>
-              <a:t>6/24/2018</a:t>
+              <a:t>7/8/2018</a:t>
             </a:fld>
             <a:endParaRPr lang="en-US"/>
           </a:p>
@@ -4786,6 +4786,505 @@
           <a:chExt cx="0" cy="0"/>
         </a:xfrm>
       </p:grpSpPr>
+      <p:sp>
+        <p:nvSpPr>
+          <p:cNvPr id="2" name="Oval 1">
+            <a:extLst>
+              <a:ext uri="{FF2B5EF4-FFF2-40B4-BE49-F238E27FC236}">
+                <a16:creationId xmlns:a16="http://schemas.microsoft.com/office/drawing/2014/main" id="{2949711F-72C6-4F3B-8E44-39DD9F83A0B4}"/>
+              </a:ext>
+            </a:extLst>
+          </p:cNvPr>
+          <p:cNvSpPr/>
+          <p:nvPr/>
+        </p:nvSpPr>
+        <p:spPr>
+          <a:xfrm>
+            <a:off x="6870819" y="2344020"/>
+            <a:ext cx="914400" cy="914400"/>
+          </a:xfrm>
+          <a:prstGeom prst="ellipse">
+            <a:avLst/>
+          </a:prstGeom>
+          <a:solidFill>
+            <a:schemeClr val="accent2"/>
+          </a:solidFill>
+          <a:ln>
+            <a:solidFill>
+              <a:schemeClr val="accent2"/>
+            </a:solidFill>
+          </a:ln>
+        </p:spPr>
+        <p:style>
+          <a:lnRef idx="2">
+            <a:schemeClr val="accent1">
+              <a:shade val="50000"/>
+            </a:schemeClr>
+          </a:lnRef>
+          <a:fillRef idx="1">
+            <a:schemeClr val="accent1"/>
+          </a:fillRef>
+          <a:effectRef idx="0">
+            <a:schemeClr val="accent1"/>
+          </a:effectRef>
+          <a:fontRef idx="minor">
+            <a:schemeClr val="lt1"/>
+          </a:fontRef>
+        </p:style>
+        <p:txBody>
+          <a:bodyPr rtlCol="0" anchor="ctr"/>
+          <a:lstStyle/>
+          <a:p>
+            <a:pPr algn="ctr"/>
+            <a:endParaRPr lang="en-US"/>
+          </a:p>
+        </p:txBody>
+      </p:sp>
+      <p:grpSp>
+        <p:nvGrpSpPr>
+          <p:cNvPr id="12" name="Group 11">
+            <a:extLst>
+              <a:ext uri="{FF2B5EF4-FFF2-40B4-BE49-F238E27FC236}">
+                <a16:creationId xmlns:a16="http://schemas.microsoft.com/office/drawing/2014/main" id="{FFE57149-C4C5-4D04-B1B7-2F957DAD91A4}"/>
+              </a:ext>
+            </a:extLst>
+          </p:cNvPr>
+          <p:cNvGrpSpPr/>
+          <p:nvPr/>
+        </p:nvGrpSpPr>
+        <p:grpSpPr>
+          <a:xfrm>
+            <a:off x="6844695" y="1529697"/>
+            <a:ext cx="960207" cy="923330"/>
+            <a:chOff x="6844695" y="1529697"/>
+            <a:chExt cx="960207" cy="923330"/>
+          </a:xfrm>
+          <a:scene3d>
+            <a:camera prst="orthographicFront">
+              <a:rot lat="0" lon="0" rev="0"/>
+            </a:camera>
+            <a:lightRig rig="balanced" dir="t">
+              <a:rot lat="0" lon="0" rev="8700000"/>
+            </a:lightRig>
+          </a:scene3d>
+        </p:grpSpPr>
+        <p:sp>
+          <p:nvSpPr>
+            <p:cNvPr id="3" name="Pentagon 2">
+              <a:extLst>
+                <a:ext uri="{FF2B5EF4-FFF2-40B4-BE49-F238E27FC236}">
+                  <a16:creationId xmlns:a16="http://schemas.microsoft.com/office/drawing/2014/main" id="{283EE1BF-8B66-4444-8FFE-B3581E6FA0E0}"/>
+                </a:ext>
+              </a:extLst>
+            </p:cNvPr>
+            <p:cNvSpPr/>
+            <p:nvPr/>
+          </p:nvSpPr>
+          <p:spPr>
+            <a:xfrm>
+              <a:off x="6847959" y="1529697"/>
+              <a:ext cx="956943" cy="914398"/>
+            </a:xfrm>
+            <a:custGeom>
+              <a:avLst/>
+              <a:gdLst>
+                <a:gd name="connsiteX0" fmla="*/ 1 w 960120"/>
+                <a:gd name="connsiteY0" fmla="*/ 349269 h 914400"/>
+                <a:gd name="connsiteX1" fmla="*/ 480060 w 960120"/>
+                <a:gd name="connsiteY1" fmla="*/ 0 h 914400"/>
+                <a:gd name="connsiteX2" fmla="*/ 960119 w 960120"/>
+                <a:gd name="connsiteY2" fmla="*/ 349269 h 914400"/>
+                <a:gd name="connsiteX3" fmla="*/ 776753 w 960120"/>
+                <a:gd name="connsiteY3" fmla="*/ 914398 h 914400"/>
+                <a:gd name="connsiteX4" fmla="*/ 183367 w 960120"/>
+                <a:gd name="connsiteY4" fmla="*/ 914398 h 914400"/>
+                <a:gd name="connsiteX5" fmla="*/ 1 w 960120"/>
+                <a:gd name="connsiteY5" fmla="*/ 349269 h 914400"/>
+                <a:gd name="connsiteX0" fmla="*/ 0 w 960118"/>
+                <a:gd name="connsiteY0" fmla="*/ 349269 h 914398"/>
+                <a:gd name="connsiteX1" fmla="*/ 480059 w 960118"/>
+                <a:gd name="connsiteY1" fmla="*/ 0 h 914398"/>
+                <a:gd name="connsiteX2" fmla="*/ 960118 w 960118"/>
+                <a:gd name="connsiteY2" fmla="*/ 349269 h 914398"/>
+                <a:gd name="connsiteX3" fmla="*/ 776752 w 960118"/>
+                <a:gd name="connsiteY3" fmla="*/ 914398 h 914398"/>
+                <a:gd name="connsiteX4" fmla="*/ 183366 w 960118"/>
+                <a:gd name="connsiteY4" fmla="*/ 914398 h 914398"/>
+                <a:gd name="connsiteX5" fmla="*/ 0 w 960118"/>
+                <a:gd name="connsiteY5" fmla="*/ 349269 h 914398"/>
+                <a:gd name="connsiteX0" fmla="*/ 0 w 960118"/>
+                <a:gd name="connsiteY0" fmla="*/ 349269 h 914398"/>
+                <a:gd name="connsiteX1" fmla="*/ 480059 w 960118"/>
+                <a:gd name="connsiteY1" fmla="*/ 0 h 914398"/>
+                <a:gd name="connsiteX2" fmla="*/ 960118 w 960118"/>
+                <a:gd name="connsiteY2" fmla="*/ 349269 h 914398"/>
+                <a:gd name="connsiteX3" fmla="*/ 776752 w 960118"/>
+                <a:gd name="connsiteY3" fmla="*/ 914398 h 914398"/>
+                <a:gd name="connsiteX4" fmla="*/ 183366 w 960118"/>
+                <a:gd name="connsiteY4" fmla="*/ 914398 h 914398"/>
+                <a:gd name="connsiteX5" fmla="*/ 0 w 960118"/>
+                <a:gd name="connsiteY5" fmla="*/ 349269 h 914398"/>
+                <a:gd name="connsiteX0" fmla="*/ 0 w 960118"/>
+                <a:gd name="connsiteY0" fmla="*/ 349269 h 914398"/>
+                <a:gd name="connsiteX1" fmla="*/ 480059 w 960118"/>
+                <a:gd name="connsiteY1" fmla="*/ 0 h 914398"/>
+                <a:gd name="connsiteX2" fmla="*/ 960118 w 960118"/>
+                <a:gd name="connsiteY2" fmla="*/ 349269 h 914398"/>
+                <a:gd name="connsiteX3" fmla="*/ 776752 w 960118"/>
+                <a:gd name="connsiteY3" fmla="*/ 914398 h 914398"/>
+                <a:gd name="connsiteX4" fmla="*/ 183366 w 960118"/>
+                <a:gd name="connsiteY4" fmla="*/ 914398 h 914398"/>
+                <a:gd name="connsiteX5" fmla="*/ 0 w 960118"/>
+                <a:gd name="connsiteY5" fmla="*/ 349269 h 914398"/>
+                <a:gd name="connsiteX0" fmla="*/ 0 w 960118"/>
+                <a:gd name="connsiteY0" fmla="*/ 349269 h 914398"/>
+                <a:gd name="connsiteX1" fmla="*/ 480059 w 960118"/>
+                <a:gd name="connsiteY1" fmla="*/ 0 h 914398"/>
+                <a:gd name="connsiteX2" fmla="*/ 960118 w 960118"/>
+                <a:gd name="connsiteY2" fmla="*/ 349269 h 914398"/>
+                <a:gd name="connsiteX3" fmla="*/ 776752 w 960118"/>
+                <a:gd name="connsiteY3" fmla="*/ 914398 h 914398"/>
+                <a:gd name="connsiteX4" fmla="*/ 183366 w 960118"/>
+                <a:gd name="connsiteY4" fmla="*/ 914398 h 914398"/>
+                <a:gd name="connsiteX5" fmla="*/ 0 w 960118"/>
+                <a:gd name="connsiteY5" fmla="*/ 349269 h 914398"/>
+                <a:gd name="connsiteX0" fmla="*/ 0 w 960118"/>
+                <a:gd name="connsiteY0" fmla="*/ 349269 h 914398"/>
+                <a:gd name="connsiteX1" fmla="*/ 480059 w 960118"/>
+                <a:gd name="connsiteY1" fmla="*/ 0 h 914398"/>
+                <a:gd name="connsiteX2" fmla="*/ 960118 w 960118"/>
+                <a:gd name="connsiteY2" fmla="*/ 349269 h 914398"/>
+                <a:gd name="connsiteX3" fmla="*/ 776752 w 960118"/>
+                <a:gd name="connsiteY3" fmla="*/ 914398 h 914398"/>
+                <a:gd name="connsiteX4" fmla="*/ 183366 w 960118"/>
+                <a:gd name="connsiteY4" fmla="*/ 914398 h 914398"/>
+                <a:gd name="connsiteX5" fmla="*/ 0 w 960118"/>
+                <a:gd name="connsiteY5" fmla="*/ 349269 h 914398"/>
+                <a:gd name="connsiteX0" fmla="*/ 0 w 960118"/>
+                <a:gd name="connsiteY0" fmla="*/ 349269 h 914398"/>
+                <a:gd name="connsiteX1" fmla="*/ 480059 w 960118"/>
+                <a:gd name="connsiteY1" fmla="*/ 0 h 914398"/>
+                <a:gd name="connsiteX2" fmla="*/ 960118 w 960118"/>
+                <a:gd name="connsiteY2" fmla="*/ 349269 h 914398"/>
+                <a:gd name="connsiteX3" fmla="*/ 776752 w 960118"/>
+                <a:gd name="connsiteY3" fmla="*/ 914398 h 914398"/>
+                <a:gd name="connsiteX4" fmla="*/ 183366 w 960118"/>
+                <a:gd name="connsiteY4" fmla="*/ 914398 h 914398"/>
+                <a:gd name="connsiteX5" fmla="*/ 0 w 960118"/>
+                <a:gd name="connsiteY5" fmla="*/ 349269 h 914398"/>
+                <a:gd name="connsiteX0" fmla="*/ 0 w 960118"/>
+                <a:gd name="connsiteY0" fmla="*/ 412769 h 914398"/>
+                <a:gd name="connsiteX1" fmla="*/ 480059 w 960118"/>
+                <a:gd name="connsiteY1" fmla="*/ 0 h 914398"/>
+                <a:gd name="connsiteX2" fmla="*/ 960118 w 960118"/>
+                <a:gd name="connsiteY2" fmla="*/ 349269 h 914398"/>
+                <a:gd name="connsiteX3" fmla="*/ 776752 w 960118"/>
+                <a:gd name="connsiteY3" fmla="*/ 914398 h 914398"/>
+                <a:gd name="connsiteX4" fmla="*/ 183366 w 960118"/>
+                <a:gd name="connsiteY4" fmla="*/ 914398 h 914398"/>
+                <a:gd name="connsiteX5" fmla="*/ 0 w 960118"/>
+                <a:gd name="connsiteY5" fmla="*/ 412769 h 914398"/>
+                <a:gd name="connsiteX0" fmla="*/ 0 w 960118"/>
+                <a:gd name="connsiteY0" fmla="*/ 412769 h 914398"/>
+                <a:gd name="connsiteX1" fmla="*/ 480059 w 960118"/>
+                <a:gd name="connsiteY1" fmla="*/ 0 h 914398"/>
+                <a:gd name="connsiteX2" fmla="*/ 960118 w 960118"/>
+                <a:gd name="connsiteY2" fmla="*/ 457219 h 914398"/>
+                <a:gd name="connsiteX3" fmla="*/ 776752 w 960118"/>
+                <a:gd name="connsiteY3" fmla="*/ 914398 h 914398"/>
+                <a:gd name="connsiteX4" fmla="*/ 183366 w 960118"/>
+                <a:gd name="connsiteY4" fmla="*/ 914398 h 914398"/>
+                <a:gd name="connsiteX5" fmla="*/ 0 w 960118"/>
+                <a:gd name="connsiteY5" fmla="*/ 412769 h 914398"/>
+                <a:gd name="connsiteX0" fmla="*/ 0 w 956943"/>
+                <a:gd name="connsiteY0" fmla="*/ 412769 h 914398"/>
+                <a:gd name="connsiteX1" fmla="*/ 480059 w 956943"/>
+                <a:gd name="connsiteY1" fmla="*/ 0 h 914398"/>
+                <a:gd name="connsiteX2" fmla="*/ 956943 w 956943"/>
+                <a:gd name="connsiteY2" fmla="*/ 504844 h 914398"/>
+                <a:gd name="connsiteX3" fmla="*/ 776752 w 956943"/>
+                <a:gd name="connsiteY3" fmla="*/ 914398 h 914398"/>
+                <a:gd name="connsiteX4" fmla="*/ 183366 w 956943"/>
+                <a:gd name="connsiteY4" fmla="*/ 914398 h 914398"/>
+                <a:gd name="connsiteX5" fmla="*/ 0 w 956943"/>
+                <a:gd name="connsiteY5" fmla="*/ 412769 h 914398"/>
+                <a:gd name="connsiteX0" fmla="*/ 0 w 956943"/>
+                <a:gd name="connsiteY0" fmla="*/ 485794 h 914398"/>
+                <a:gd name="connsiteX1" fmla="*/ 480059 w 956943"/>
+                <a:gd name="connsiteY1" fmla="*/ 0 h 914398"/>
+                <a:gd name="connsiteX2" fmla="*/ 956943 w 956943"/>
+                <a:gd name="connsiteY2" fmla="*/ 504844 h 914398"/>
+                <a:gd name="connsiteX3" fmla="*/ 776752 w 956943"/>
+                <a:gd name="connsiteY3" fmla="*/ 914398 h 914398"/>
+                <a:gd name="connsiteX4" fmla="*/ 183366 w 956943"/>
+                <a:gd name="connsiteY4" fmla="*/ 914398 h 914398"/>
+                <a:gd name="connsiteX5" fmla="*/ 0 w 956943"/>
+                <a:gd name="connsiteY5" fmla="*/ 485794 h 914398"/>
+                <a:gd name="connsiteX0" fmla="*/ 0 w 956943"/>
+                <a:gd name="connsiteY0" fmla="*/ 485794 h 914398"/>
+                <a:gd name="connsiteX1" fmla="*/ 480059 w 956943"/>
+                <a:gd name="connsiteY1" fmla="*/ 0 h 914398"/>
+                <a:gd name="connsiteX2" fmla="*/ 956943 w 956943"/>
+                <a:gd name="connsiteY2" fmla="*/ 479444 h 914398"/>
+                <a:gd name="connsiteX3" fmla="*/ 776752 w 956943"/>
+                <a:gd name="connsiteY3" fmla="*/ 914398 h 914398"/>
+                <a:gd name="connsiteX4" fmla="*/ 183366 w 956943"/>
+                <a:gd name="connsiteY4" fmla="*/ 914398 h 914398"/>
+                <a:gd name="connsiteX5" fmla="*/ 0 w 956943"/>
+                <a:gd name="connsiteY5" fmla="*/ 485794 h 914398"/>
+                <a:gd name="connsiteX0" fmla="*/ 0 w 956943"/>
+                <a:gd name="connsiteY0" fmla="*/ 485794 h 914398"/>
+                <a:gd name="connsiteX1" fmla="*/ 480059 w 956943"/>
+                <a:gd name="connsiteY1" fmla="*/ 0 h 914398"/>
+                <a:gd name="connsiteX2" fmla="*/ 956943 w 956943"/>
+                <a:gd name="connsiteY2" fmla="*/ 479444 h 914398"/>
+                <a:gd name="connsiteX3" fmla="*/ 776752 w 956943"/>
+                <a:gd name="connsiteY3" fmla="*/ 914398 h 914398"/>
+                <a:gd name="connsiteX4" fmla="*/ 183366 w 956943"/>
+                <a:gd name="connsiteY4" fmla="*/ 914398 h 914398"/>
+                <a:gd name="connsiteX5" fmla="*/ 0 w 956943"/>
+                <a:gd name="connsiteY5" fmla="*/ 485794 h 914398"/>
+                <a:gd name="connsiteX0" fmla="*/ 0 w 956943"/>
+                <a:gd name="connsiteY0" fmla="*/ 485794 h 914398"/>
+                <a:gd name="connsiteX1" fmla="*/ 480059 w 956943"/>
+                <a:gd name="connsiteY1" fmla="*/ 0 h 914398"/>
+                <a:gd name="connsiteX2" fmla="*/ 956943 w 956943"/>
+                <a:gd name="connsiteY2" fmla="*/ 479444 h 914398"/>
+                <a:gd name="connsiteX3" fmla="*/ 776752 w 956943"/>
+                <a:gd name="connsiteY3" fmla="*/ 914398 h 914398"/>
+                <a:gd name="connsiteX4" fmla="*/ 183366 w 956943"/>
+                <a:gd name="connsiteY4" fmla="*/ 914398 h 914398"/>
+                <a:gd name="connsiteX5" fmla="*/ 0 w 956943"/>
+                <a:gd name="connsiteY5" fmla="*/ 485794 h 914398"/>
+                <a:gd name="connsiteX0" fmla="*/ 0 w 956943"/>
+                <a:gd name="connsiteY0" fmla="*/ 485794 h 914398"/>
+                <a:gd name="connsiteX1" fmla="*/ 480059 w 956943"/>
+                <a:gd name="connsiteY1" fmla="*/ 0 h 914398"/>
+                <a:gd name="connsiteX2" fmla="*/ 956943 w 956943"/>
+                <a:gd name="connsiteY2" fmla="*/ 479444 h 914398"/>
+                <a:gd name="connsiteX3" fmla="*/ 776752 w 956943"/>
+                <a:gd name="connsiteY3" fmla="*/ 914398 h 914398"/>
+                <a:gd name="connsiteX4" fmla="*/ 183366 w 956943"/>
+                <a:gd name="connsiteY4" fmla="*/ 914398 h 914398"/>
+                <a:gd name="connsiteX5" fmla="*/ 0 w 956943"/>
+                <a:gd name="connsiteY5" fmla="*/ 485794 h 914398"/>
+                <a:gd name="connsiteX0" fmla="*/ 0 w 956943"/>
+                <a:gd name="connsiteY0" fmla="*/ 485794 h 914398"/>
+                <a:gd name="connsiteX1" fmla="*/ 480059 w 956943"/>
+                <a:gd name="connsiteY1" fmla="*/ 0 h 914398"/>
+                <a:gd name="connsiteX2" fmla="*/ 956943 w 956943"/>
+                <a:gd name="connsiteY2" fmla="*/ 479444 h 914398"/>
+                <a:gd name="connsiteX3" fmla="*/ 776752 w 956943"/>
+                <a:gd name="connsiteY3" fmla="*/ 914398 h 914398"/>
+                <a:gd name="connsiteX4" fmla="*/ 183366 w 956943"/>
+                <a:gd name="connsiteY4" fmla="*/ 914398 h 914398"/>
+                <a:gd name="connsiteX5" fmla="*/ 0 w 956943"/>
+                <a:gd name="connsiteY5" fmla="*/ 485794 h 914398"/>
+                <a:gd name="connsiteX0" fmla="*/ 0 w 956943"/>
+                <a:gd name="connsiteY0" fmla="*/ 485794 h 914398"/>
+                <a:gd name="connsiteX1" fmla="*/ 480059 w 956943"/>
+                <a:gd name="connsiteY1" fmla="*/ 0 h 914398"/>
+                <a:gd name="connsiteX2" fmla="*/ 956943 w 956943"/>
+                <a:gd name="connsiteY2" fmla="*/ 479444 h 914398"/>
+                <a:gd name="connsiteX3" fmla="*/ 776752 w 956943"/>
+                <a:gd name="connsiteY3" fmla="*/ 914398 h 914398"/>
+                <a:gd name="connsiteX4" fmla="*/ 183366 w 956943"/>
+                <a:gd name="connsiteY4" fmla="*/ 914398 h 914398"/>
+                <a:gd name="connsiteX5" fmla="*/ 0 w 956943"/>
+                <a:gd name="connsiteY5" fmla="*/ 485794 h 914398"/>
+                <a:gd name="connsiteX0" fmla="*/ 0 w 956943"/>
+                <a:gd name="connsiteY0" fmla="*/ 485794 h 914398"/>
+                <a:gd name="connsiteX1" fmla="*/ 480059 w 956943"/>
+                <a:gd name="connsiteY1" fmla="*/ 0 h 914398"/>
+                <a:gd name="connsiteX2" fmla="*/ 956943 w 956943"/>
+                <a:gd name="connsiteY2" fmla="*/ 479444 h 914398"/>
+                <a:gd name="connsiteX3" fmla="*/ 776752 w 956943"/>
+                <a:gd name="connsiteY3" fmla="*/ 914398 h 914398"/>
+                <a:gd name="connsiteX4" fmla="*/ 183366 w 956943"/>
+                <a:gd name="connsiteY4" fmla="*/ 914398 h 914398"/>
+                <a:gd name="connsiteX5" fmla="*/ 0 w 956943"/>
+                <a:gd name="connsiteY5" fmla="*/ 485794 h 914398"/>
+                <a:gd name="connsiteX0" fmla="*/ 0 w 956943"/>
+                <a:gd name="connsiteY0" fmla="*/ 485794 h 914398"/>
+                <a:gd name="connsiteX1" fmla="*/ 480059 w 956943"/>
+                <a:gd name="connsiteY1" fmla="*/ 0 h 914398"/>
+                <a:gd name="connsiteX2" fmla="*/ 956943 w 956943"/>
+                <a:gd name="connsiteY2" fmla="*/ 479444 h 914398"/>
+                <a:gd name="connsiteX3" fmla="*/ 776752 w 956943"/>
+                <a:gd name="connsiteY3" fmla="*/ 914398 h 914398"/>
+                <a:gd name="connsiteX4" fmla="*/ 183366 w 956943"/>
+                <a:gd name="connsiteY4" fmla="*/ 914398 h 914398"/>
+                <a:gd name="connsiteX5" fmla="*/ 0 w 956943"/>
+                <a:gd name="connsiteY5" fmla="*/ 485794 h 914398"/>
+                <a:gd name="connsiteX0" fmla="*/ 0 w 956943"/>
+                <a:gd name="connsiteY0" fmla="*/ 485794 h 914398"/>
+                <a:gd name="connsiteX1" fmla="*/ 480059 w 956943"/>
+                <a:gd name="connsiteY1" fmla="*/ 0 h 914398"/>
+                <a:gd name="connsiteX2" fmla="*/ 956943 w 956943"/>
+                <a:gd name="connsiteY2" fmla="*/ 479444 h 914398"/>
+                <a:gd name="connsiteX3" fmla="*/ 776752 w 956943"/>
+                <a:gd name="connsiteY3" fmla="*/ 914398 h 914398"/>
+                <a:gd name="connsiteX4" fmla="*/ 183366 w 956943"/>
+                <a:gd name="connsiteY4" fmla="*/ 914398 h 914398"/>
+                <a:gd name="connsiteX5" fmla="*/ 0 w 956943"/>
+                <a:gd name="connsiteY5" fmla="*/ 485794 h 914398"/>
+              </a:gdLst>
+              <a:ahLst/>
+              <a:cxnLst>
+                <a:cxn ang="0">
+                  <a:pos x="connsiteX0" y="connsiteY0"/>
+                </a:cxn>
+                <a:cxn ang="0">
+                  <a:pos x="connsiteX1" y="connsiteY1"/>
+                </a:cxn>
+                <a:cxn ang="0">
+                  <a:pos x="connsiteX2" y="connsiteY2"/>
+                </a:cxn>
+                <a:cxn ang="0">
+                  <a:pos x="connsiteX3" y="connsiteY3"/>
+                </a:cxn>
+                <a:cxn ang="0">
+                  <a:pos x="connsiteX4" y="connsiteY4"/>
+                </a:cxn>
+                <a:cxn ang="0">
+                  <a:pos x="connsiteX5" y="connsiteY5"/>
+                </a:cxn>
+              </a:cxnLst>
+              <a:rect l="l" t="t" r="r" b="b"/>
+              <a:pathLst>
+                <a:path w="956943" h="914398">
+                  <a:moveTo>
+                    <a:pt x="0" y="485794"/>
+                  </a:moveTo>
+                  <a:cubicBezTo>
+                    <a:pt x="131445" y="277296"/>
+                    <a:pt x="218439" y="97373"/>
+                    <a:pt x="480059" y="0"/>
+                  </a:cubicBezTo>
+                  <a:cubicBezTo>
+                    <a:pt x="738504" y="106898"/>
+                    <a:pt x="854073" y="299521"/>
+                    <a:pt x="956943" y="479444"/>
+                  </a:cubicBezTo>
+                  <a:cubicBezTo>
+                    <a:pt x="902171" y="658295"/>
+                    <a:pt x="882324" y="748247"/>
+                    <a:pt x="776752" y="914398"/>
+                  </a:cubicBezTo>
+                  <a:cubicBezTo>
+                    <a:pt x="499582" y="869948"/>
+                    <a:pt x="508161" y="866773"/>
+                    <a:pt x="183366" y="914398"/>
+                  </a:cubicBezTo>
+                  <a:cubicBezTo>
+                    <a:pt x="84144" y="754597"/>
+                    <a:pt x="64297" y="670995"/>
+                    <a:pt x="0" y="485794"/>
+                  </a:cubicBezTo>
+                  <a:close/>
+                </a:path>
+              </a:pathLst>
+            </a:custGeom>
+            <a:solidFill>
+              <a:schemeClr val="bg1"/>
+            </a:solidFill>
+            <a:ln>
+              <a:noFill/>
+            </a:ln>
+            <a:effectLst>
+              <a:outerShdw blurRad="44450" dist="27940" dir="5400000" algn="ctr">
+                <a:srgbClr val="000000">
+                  <a:alpha val="32000"/>
+                </a:srgbClr>
+              </a:outerShdw>
+            </a:effectLst>
+            <a:sp3d>
+              <a:bevelT w="190500" h="38100"/>
+            </a:sp3d>
+          </p:spPr>
+          <p:style>
+            <a:lnRef idx="2">
+              <a:schemeClr val="accent1">
+                <a:shade val="50000"/>
+              </a:schemeClr>
+            </a:lnRef>
+            <a:fillRef idx="1">
+              <a:schemeClr val="accent1"/>
+            </a:fillRef>
+            <a:effectRef idx="0">
+              <a:schemeClr val="accent1"/>
+            </a:effectRef>
+            <a:fontRef idx="minor">
+              <a:schemeClr val="lt1"/>
+            </a:fontRef>
+          </p:style>
+          <p:txBody>
+            <a:bodyPr rtlCol="0" anchor="ctr"/>
+            <a:lstStyle/>
+            <a:p>
+              <a:pPr algn="ctr"/>
+              <a:endParaRPr lang="en-US"/>
+            </a:p>
+          </p:txBody>
+        </p:sp>
+        <p:sp>
+          <p:nvSpPr>
+            <p:cNvPr id="10" name="TextBox 9">
+              <a:extLst>
+                <a:ext uri="{FF2B5EF4-FFF2-40B4-BE49-F238E27FC236}">
+                  <a16:creationId xmlns:a16="http://schemas.microsoft.com/office/drawing/2014/main" id="{C4259C32-17D5-4542-8FAE-709EADE50932}"/>
+                </a:ext>
+              </a:extLst>
+            </p:cNvPr>
+            <p:cNvSpPr txBox="1"/>
+            <p:nvPr/>
+          </p:nvSpPr>
+          <p:spPr>
+            <a:xfrm>
+              <a:off x="6844695" y="1529697"/>
+              <a:ext cx="896399" cy="923330"/>
+            </a:xfrm>
+            <a:prstGeom prst="rect">
+              <a:avLst/>
+            </a:prstGeom>
+            <a:noFill/>
+            <a:ln>
+              <a:noFill/>
+            </a:ln>
+            <a:effectLst>
+              <a:outerShdw blurRad="44450" dist="27940" dir="5400000" algn="ctr">
+                <a:srgbClr val="000000">
+                  <a:alpha val="32000"/>
+                </a:srgbClr>
+              </a:outerShdw>
+            </a:effectLst>
+            <a:sp3d>
+              <a:bevelT w="190500" h="38100"/>
+            </a:sp3d>
+          </p:spPr>
+          <p:txBody>
+            <a:bodyPr wrap="none" rtlCol="0">
+              <a:spAutoFit/>
+              <a:sp3d extrusionH="57150" prstMaterial="softEdge">
+                <a:bevelT w="25400" h="38100"/>
+              </a:sp3d>
+            </a:bodyPr>
+            <a:lstStyle/>
+            <a:p>
+              <a:pPr algn="ctr"/>
+              <a:r>
+                <a:rPr lang="en-US" sz="5400" b="1" dirty="0">
+                  <a:ln/>
+                  <a:solidFill>
+                    <a:schemeClr val="accent4"/>
+                  </a:solidFill>
+                </a:rPr>
+                <a:t>C#</a:t>
+              </a:r>
+            </a:p>
+          </p:txBody>
+        </p:sp>
+      </p:grpSp>
       <p:pic>
         <p:nvPicPr>
           <p:cNvPr id="5" name="Picture 4" descr="A picture containing screenshot&#10;&#10;Description generated with high confidence">
@@ -4826,7 +5325,7 @@
         </p:blipFill>
         <p:spPr>
           <a:xfrm>
-            <a:off x="3498209" y="1401508"/>
+            <a:off x="260262" y="1392962"/>
             <a:ext cx="3621338" cy="951058"/>
           </a:xfrm>
           <a:prstGeom prst="rect">
@@ -4874,7 +5373,7 @@
         </p:blipFill>
         <p:spPr>
           <a:xfrm>
-            <a:off x="4285331" y="2953471"/>
+            <a:off x="260262" y="158996"/>
             <a:ext cx="3621338" cy="951058"/>
           </a:xfrm>
           <a:prstGeom prst="rect">
@@ -4882,6 +5381,646 @@
           </a:prstGeom>
         </p:spPr>
       </p:pic>
+      <p:sp>
+        <p:nvSpPr>
+          <p:cNvPr id="9" name="Trapezoid 8">
+            <a:extLst>
+              <a:ext uri="{FF2B5EF4-FFF2-40B4-BE49-F238E27FC236}">
+                <a16:creationId xmlns:a16="http://schemas.microsoft.com/office/drawing/2014/main" id="{4F5BEDF0-AC02-4297-B399-61AD969EEAE9}"/>
+              </a:ext>
+            </a:extLst>
+          </p:cNvPr>
+          <p:cNvSpPr/>
+          <p:nvPr/>
+        </p:nvSpPr>
+        <p:spPr>
+          <a:xfrm rot="10800000">
+            <a:off x="6965950" y="2287986"/>
+            <a:ext cx="717550" cy="149757"/>
+          </a:xfrm>
+          <a:custGeom>
+            <a:avLst/>
+            <a:gdLst>
+              <a:gd name="connsiteX0" fmla="*/ 0 w 698500"/>
+              <a:gd name="connsiteY0" fmla="*/ 108077 h 108077"/>
+              <a:gd name="connsiteX1" fmla="*/ 57960 w 698500"/>
+              <a:gd name="connsiteY1" fmla="*/ 0 h 108077"/>
+              <a:gd name="connsiteX2" fmla="*/ 640540 w 698500"/>
+              <a:gd name="connsiteY2" fmla="*/ 0 h 108077"/>
+              <a:gd name="connsiteX3" fmla="*/ 698500 w 698500"/>
+              <a:gd name="connsiteY3" fmla="*/ 108077 h 108077"/>
+              <a:gd name="connsiteX4" fmla="*/ 0 w 698500"/>
+              <a:gd name="connsiteY4" fmla="*/ 108077 h 108077"/>
+              <a:gd name="connsiteX0" fmla="*/ 0 w 698500"/>
+              <a:gd name="connsiteY0" fmla="*/ 108077 h 108077"/>
+              <a:gd name="connsiteX1" fmla="*/ 57960 w 698500"/>
+              <a:gd name="connsiteY1" fmla="*/ 0 h 108077"/>
+              <a:gd name="connsiteX2" fmla="*/ 640540 w 698500"/>
+              <a:gd name="connsiteY2" fmla="*/ 0 h 108077"/>
+              <a:gd name="connsiteX3" fmla="*/ 698500 w 698500"/>
+              <a:gd name="connsiteY3" fmla="*/ 108077 h 108077"/>
+              <a:gd name="connsiteX4" fmla="*/ 0 w 698500"/>
+              <a:gd name="connsiteY4" fmla="*/ 108077 h 108077"/>
+              <a:gd name="connsiteX0" fmla="*/ 0 w 698500"/>
+              <a:gd name="connsiteY0" fmla="*/ 108077 h 108077"/>
+              <a:gd name="connsiteX1" fmla="*/ 57960 w 698500"/>
+              <a:gd name="connsiteY1" fmla="*/ 0 h 108077"/>
+              <a:gd name="connsiteX2" fmla="*/ 640540 w 698500"/>
+              <a:gd name="connsiteY2" fmla="*/ 0 h 108077"/>
+              <a:gd name="connsiteX3" fmla="*/ 698500 w 698500"/>
+              <a:gd name="connsiteY3" fmla="*/ 108077 h 108077"/>
+              <a:gd name="connsiteX4" fmla="*/ 0 w 698500"/>
+              <a:gd name="connsiteY4" fmla="*/ 108077 h 108077"/>
+              <a:gd name="connsiteX0" fmla="*/ 0 w 698500"/>
+              <a:gd name="connsiteY0" fmla="*/ 108077 h 132065"/>
+              <a:gd name="connsiteX1" fmla="*/ 57960 w 698500"/>
+              <a:gd name="connsiteY1" fmla="*/ 0 h 132065"/>
+              <a:gd name="connsiteX2" fmla="*/ 640540 w 698500"/>
+              <a:gd name="connsiteY2" fmla="*/ 0 h 132065"/>
+              <a:gd name="connsiteX3" fmla="*/ 698500 w 698500"/>
+              <a:gd name="connsiteY3" fmla="*/ 108077 h 132065"/>
+              <a:gd name="connsiteX4" fmla="*/ 0 w 698500"/>
+              <a:gd name="connsiteY4" fmla="*/ 108077 h 132065"/>
+              <a:gd name="connsiteX0" fmla="*/ 0 w 698500"/>
+              <a:gd name="connsiteY0" fmla="*/ 108077 h 149757"/>
+              <a:gd name="connsiteX1" fmla="*/ 57960 w 698500"/>
+              <a:gd name="connsiteY1" fmla="*/ 0 h 149757"/>
+              <a:gd name="connsiteX2" fmla="*/ 640540 w 698500"/>
+              <a:gd name="connsiteY2" fmla="*/ 0 h 149757"/>
+              <a:gd name="connsiteX3" fmla="*/ 698500 w 698500"/>
+              <a:gd name="connsiteY3" fmla="*/ 108077 h 149757"/>
+              <a:gd name="connsiteX4" fmla="*/ 0 w 698500"/>
+              <a:gd name="connsiteY4" fmla="*/ 108077 h 149757"/>
+            </a:gdLst>
+            <a:ahLst/>
+            <a:cxnLst>
+              <a:cxn ang="0">
+                <a:pos x="connsiteX0" y="connsiteY0"/>
+              </a:cxn>
+              <a:cxn ang="0">
+                <a:pos x="connsiteX1" y="connsiteY1"/>
+              </a:cxn>
+              <a:cxn ang="0">
+                <a:pos x="connsiteX2" y="connsiteY2"/>
+              </a:cxn>
+              <a:cxn ang="0">
+                <a:pos x="connsiteX3" y="connsiteY3"/>
+              </a:cxn>
+              <a:cxn ang="0">
+                <a:pos x="connsiteX4" y="connsiteY4"/>
+              </a:cxn>
+            </a:cxnLst>
+            <a:rect l="l" t="t" r="r" b="b"/>
+            <a:pathLst>
+              <a:path w="698500" h="149757">
+                <a:moveTo>
+                  <a:pt x="0" y="108077"/>
+                </a:moveTo>
+                <a:lnTo>
+                  <a:pt x="57960" y="0"/>
+                </a:lnTo>
+                <a:cubicBezTo>
+                  <a:pt x="277553" y="66675"/>
+                  <a:pt x="471747" y="41275"/>
+                  <a:pt x="640540" y="0"/>
+                </a:cubicBezTo>
+                <a:lnTo>
+                  <a:pt x="698500" y="108077"/>
+                </a:lnTo>
+                <a:cubicBezTo>
+                  <a:pt x="332317" y="165227"/>
+                  <a:pt x="334433" y="162052"/>
+                  <a:pt x="0" y="108077"/>
+                </a:cubicBezTo>
+                <a:close/>
+              </a:path>
+            </a:pathLst>
+          </a:custGeom>
+          <a:solidFill>
+            <a:srgbClr val="FFCC00"/>
+          </a:solidFill>
+          <a:ln>
+            <a:solidFill>
+              <a:schemeClr val="accent4">
+                <a:lumMod val="75000"/>
+              </a:schemeClr>
+            </a:solidFill>
+          </a:ln>
+          <a:scene3d>
+            <a:camera prst="orthographicFront"/>
+            <a:lightRig rig="threePt" dir="t"/>
+          </a:scene3d>
+          <a:sp3d>
+            <a:bevelT w="57150" h="12700" prst="cross"/>
+          </a:sp3d>
+        </p:spPr>
+        <p:style>
+          <a:lnRef idx="2">
+            <a:schemeClr val="accent1">
+              <a:shade val="50000"/>
+            </a:schemeClr>
+          </a:lnRef>
+          <a:fillRef idx="1">
+            <a:schemeClr val="accent1"/>
+          </a:fillRef>
+          <a:effectRef idx="0">
+            <a:schemeClr val="accent1"/>
+          </a:effectRef>
+          <a:fontRef idx="minor">
+            <a:schemeClr val="lt1"/>
+          </a:fontRef>
+        </p:style>
+        <p:txBody>
+          <a:bodyPr rtlCol="0" anchor="t"/>
+          <a:lstStyle/>
+          <a:p>
+            <a:pPr algn="ctr"/>
+            <a:endParaRPr lang="en-US" dirty="0"/>
+          </a:p>
+        </p:txBody>
+      </p:sp>
+      <p:sp>
+        <p:nvSpPr>
+          <p:cNvPr id="13" name="TextBox 12">
+            <a:extLst>
+              <a:ext uri="{FF2B5EF4-FFF2-40B4-BE49-F238E27FC236}">
+                <a16:creationId xmlns:a16="http://schemas.microsoft.com/office/drawing/2014/main" id="{D32CFCF4-2572-4F17-BE47-BDC8FE3E3EC7}"/>
+              </a:ext>
+            </a:extLst>
+          </p:cNvPr>
+          <p:cNvSpPr txBox="1"/>
+          <p:nvPr/>
+        </p:nvSpPr>
+        <p:spPr>
+          <a:xfrm>
+            <a:off x="6972300" y="2350557"/>
+            <a:ext cx="723275" cy="174375"/>
+          </a:xfrm>
+          <a:custGeom>
+            <a:avLst/>
+            <a:gdLst>
+              <a:gd name="connsiteX0" fmla="*/ 0 w 723275"/>
+              <a:gd name="connsiteY0" fmla="*/ 0 h 138499"/>
+              <a:gd name="connsiteX1" fmla="*/ 723275 w 723275"/>
+              <a:gd name="connsiteY1" fmla="*/ 0 h 138499"/>
+              <a:gd name="connsiteX2" fmla="*/ 723275 w 723275"/>
+              <a:gd name="connsiteY2" fmla="*/ 138499 h 138499"/>
+              <a:gd name="connsiteX3" fmla="*/ 0 w 723275"/>
+              <a:gd name="connsiteY3" fmla="*/ 138499 h 138499"/>
+              <a:gd name="connsiteX4" fmla="*/ 0 w 723275"/>
+              <a:gd name="connsiteY4" fmla="*/ 0 h 138499"/>
+              <a:gd name="connsiteX0" fmla="*/ 0 w 723275"/>
+              <a:gd name="connsiteY0" fmla="*/ 23988 h 162487"/>
+              <a:gd name="connsiteX1" fmla="*/ 723275 w 723275"/>
+              <a:gd name="connsiteY1" fmla="*/ 23988 h 162487"/>
+              <a:gd name="connsiteX2" fmla="*/ 723275 w 723275"/>
+              <a:gd name="connsiteY2" fmla="*/ 162487 h 162487"/>
+              <a:gd name="connsiteX3" fmla="*/ 0 w 723275"/>
+              <a:gd name="connsiteY3" fmla="*/ 162487 h 162487"/>
+              <a:gd name="connsiteX4" fmla="*/ 0 w 723275"/>
+              <a:gd name="connsiteY4" fmla="*/ 23988 h 162487"/>
+              <a:gd name="connsiteX0" fmla="*/ 0 w 723275"/>
+              <a:gd name="connsiteY0" fmla="*/ 23988 h 162487"/>
+              <a:gd name="connsiteX1" fmla="*/ 723275 w 723275"/>
+              <a:gd name="connsiteY1" fmla="*/ 23988 h 162487"/>
+              <a:gd name="connsiteX2" fmla="*/ 723275 w 723275"/>
+              <a:gd name="connsiteY2" fmla="*/ 162487 h 162487"/>
+              <a:gd name="connsiteX3" fmla="*/ 0 w 723275"/>
+              <a:gd name="connsiteY3" fmla="*/ 162487 h 162487"/>
+              <a:gd name="connsiteX4" fmla="*/ 0 w 723275"/>
+              <a:gd name="connsiteY4" fmla="*/ 23988 h 162487"/>
+              <a:gd name="connsiteX0" fmla="*/ 0 w 723275"/>
+              <a:gd name="connsiteY0" fmla="*/ 23988 h 162487"/>
+              <a:gd name="connsiteX1" fmla="*/ 723275 w 723275"/>
+              <a:gd name="connsiteY1" fmla="*/ 23988 h 162487"/>
+              <a:gd name="connsiteX2" fmla="*/ 723275 w 723275"/>
+              <a:gd name="connsiteY2" fmla="*/ 162487 h 162487"/>
+              <a:gd name="connsiteX3" fmla="*/ 0 w 723275"/>
+              <a:gd name="connsiteY3" fmla="*/ 162487 h 162487"/>
+              <a:gd name="connsiteX4" fmla="*/ 0 w 723275"/>
+              <a:gd name="connsiteY4" fmla="*/ 23988 h 162487"/>
+              <a:gd name="connsiteX0" fmla="*/ 0 w 723275"/>
+              <a:gd name="connsiteY0" fmla="*/ 35876 h 174375"/>
+              <a:gd name="connsiteX1" fmla="*/ 723275 w 723275"/>
+              <a:gd name="connsiteY1" fmla="*/ 35876 h 174375"/>
+              <a:gd name="connsiteX2" fmla="*/ 723275 w 723275"/>
+              <a:gd name="connsiteY2" fmla="*/ 174375 h 174375"/>
+              <a:gd name="connsiteX3" fmla="*/ 0 w 723275"/>
+              <a:gd name="connsiteY3" fmla="*/ 174375 h 174375"/>
+              <a:gd name="connsiteX4" fmla="*/ 0 w 723275"/>
+              <a:gd name="connsiteY4" fmla="*/ 35876 h 174375"/>
+            </a:gdLst>
+            <a:ahLst/>
+            <a:cxnLst>
+              <a:cxn ang="0">
+                <a:pos x="connsiteX0" y="connsiteY0"/>
+              </a:cxn>
+              <a:cxn ang="0">
+                <a:pos x="connsiteX1" y="connsiteY1"/>
+              </a:cxn>
+              <a:cxn ang="0">
+                <a:pos x="connsiteX2" y="connsiteY2"/>
+              </a:cxn>
+              <a:cxn ang="0">
+                <a:pos x="connsiteX3" y="connsiteY3"/>
+              </a:cxn>
+              <a:cxn ang="0">
+                <a:pos x="connsiteX4" y="connsiteY4"/>
+              </a:cxn>
+            </a:cxnLst>
+            <a:rect l="l" t="t" r="r" b="b"/>
+            <a:pathLst>
+              <a:path w="723275" h="174375">
+                <a:moveTo>
+                  <a:pt x="0" y="35876"/>
+                </a:moveTo>
+                <a:cubicBezTo>
+                  <a:pt x="237917" y="-5399"/>
+                  <a:pt x="472658" y="-18099"/>
+                  <a:pt x="723275" y="35876"/>
+                </a:cubicBezTo>
+                <a:lnTo>
+                  <a:pt x="723275" y="174375"/>
+                </a:lnTo>
+                <a:cubicBezTo>
+                  <a:pt x="475833" y="114050"/>
+                  <a:pt x="253792" y="117225"/>
+                  <a:pt x="0" y="174375"/>
+                </a:cubicBezTo>
+                <a:lnTo>
+                  <a:pt x="0" y="35876"/>
+                </a:lnTo>
+                <a:close/>
+              </a:path>
+            </a:pathLst>
+          </a:custGeom>
+          <a:noFill/>
+        </p:spPr>
+        <p:txBody>
+          <a:bodyPr wrap="none" rtlCol="0">
+            <a:prstTxWarp prst="textArchUp">
+              <a:avLst>
+                <a:gd name="adj" fmla="val 10770335"/>
+              </a:avLst>
+            </a:prstTxWarp>
+            <a:spAutoFit/>
+          </a:bodyPr>
+          <a:lstStyle/>
+          <a:p>
+            <a:pPr algn="ctr"/>
+            <a:r>
+              <a:rPr lang="en-US" sz="325" b="1" dirty="0"/>
+              <a:t>Table View ∙ Presentation ∙ Model</a:t>
+            </a:r>
+          </a:p>
+        </p:txBody>
+      </p:sp>
+      <p:grpSp>
+        <p:nvGrpSpPr>
+          <p:cNvPr id="21" name="Group 20">
+            <a:extLst>
+              <a:ext uri="{FF2B5EF4-FFF2-40B4-BE49-F238E27FC236}">
+                <a16:creationId xmlns:a16="http://schemas.microsoft.com/office/drawing/2014/main" id="{E2F2DB8B-FD4E-4435-AF7A-ECE48D07780A}"/>
+              </a:ext>
+            </a:extLst>
+          </p:cNvPr>
+          <p:cNvGrpSpPr/>
+          <p:nvPr/>
+        </p:nvGrpSpPr>
+        <p:grpSpPr>
+          <a:xfrm>
+            <a:off x="7026539" y="2612602"/>
+            <a:ext cx="614796" cy="67098"/>
+            <a:chOff x="7007225" y="2644352"/>
+            <a:chExt cx="614796" cy="67098"/>
+          </a:xfrm>
+        </p:grpSpPr>
+        <p:grpSp>
+          <p:nvGrpSpPr>
+            <p:cNvPr id="17" name="Group 16">
+              <a:extLst>
+                <a:ext uri="{FF2B5EF4-FFF2-40B4-BE49-F238E27FC236}">
+                  <a16:creationId xmlns:a16="http://schemas.microsoft.com/office/drawing/2014/main" id="{E193F21E-F15F-49B1-9821-A612E99BD26C}"/>
+                </a:ext>
+              </a:extLst>
+            </p:cNvPr>
+            <p:cNvGrpSpPr/>
+            <p:nvPr/>
+          </p:nvGrpSpPr>
+          <p:grpSpPr>
+            <a:xfrm>
+              <a:off x="7007225" y="2644775"/>
+              <a:ext cx="177800" cy="66675"/>
+              <a:chOff x="7007225" y="2644775"/>
+              <a:chExt cx="177800" cy="66675"/>
+            </a:xfrm>
+          </p:grpSpPr>
+          <p:sp>
+            <p:nvSpPr>
+              <p:cNvPr id="15" name="Teardrop 14">
+                <a:extLst>
+                  <a:ext uri="{FF2B5EF4-FFF2-40B4-BE49-F238E27FC236}">
+                    <a16:creationId xmlns:a16="http://schemas.microsoft.com/office/drawing/2014/main" id="{17D135DC-63FC-43A8-A264-F6E549726C88}"/>
+                  </a:ext>
+                </a:extLst>
+              </p:cNvPr>
+              <p:cNvSpPr/>
+              <p:nvPr/>
+            </p:nvSpPr>
+            <p:spPr>
+              <a:xfrm rot="773010" flipH="1">
+                <a:off x="7007225" y="2644775"/>
+                <a:ext cx="177800" cy="66675"/>
+              </a:xfrm>
+              <a:prstGeom prst="teardrop">
+                <a:avLst>
+                  <a:gd name="adj" fmla="val 108791"/>
+                </a:avLst>
+              </a:prstGeom>
+              <a:solidFill>
+                <a:schemeClr val="bg1">
+                  <a:lumMod val="95000"/>
+                </a:schemeClr>
+              </a:solidFill>
+              <a:ln>
+                <a:solidFill>
+                  <a:schemeClr val="tx1"/>
+                </a:solidFill>
+              </a:ln>
+            </p:spPr>
+            <p:style>
+              <a:lnRef idx="2">
+                <a:schemeClr val="accent1">
+                  <a:shade val="50000"/>
+                </a:schemeClr>
+              </a:lnRef>
+              <a:fillRef idx="1">
+                <a:schemeClr val="accent1"/>
+              </a:fillRef>
+              <a:effectRef idx="0">
+                <a:schemeClr val="accent1"/>
+              </a:effectRef>
+              <a:fontRef idx="minor">
+                <a:schemeClr val="lt1"/>
+              </a:fontRef>
+            </p:style>
+            <p:txBody>
+              <a:bodyPr rtlCol="0" anchor="ctr"/>
+              <a:lstStyle/>
+              <a:p>
+                <a:pPr algn="ctr"/>
+                <a:endParaRPr lang="en-US"/>
+              </a:p>
+            </p:txBody>
+          </p:sp>
+          <p:sp>
+            <p:nvSpPr>
+              <p:cNvPr id="16" name="Oval 15">
+                <a:extLst>
+                  <a:ext uri="{FF2B5EF4-FFF2-40B4-BE49-F238E27FC236}">
+                    <a16:creationId xmlns:a16="http://schemas.microsoft.com/office/drawing/2014/main" id="{432FBE9D-7F00-4F1E-A8C9-4D5267A5DD9E}"/>
+                  </a:ext>
+                </a:extLst>
+              </p:cNvPr>
+              <p:cNvSpPr/>
+              <p:nvPr/>
+            </p:nvSpPr>
+            <p:spPr>
+              <a:xfrm>
+                <a:off x="7073900" y="2654138"/>
+                <a:ext cx="47625" cy="47104"/>
+              </a:xfrm>
+              <a:prstGeom prst="ellipse">
+                <a:avLst/>
+              </a:prstGeom>
+              <a:solidFill>
+                <a:srgbClr val="8D5F31"/>
+              </a:solidFill>
+              <a:ln>
+                <a:noFill/>
+              </a:ln>
+              <a:scene3d>
+                <a:camera prst="orthographicFront"/>
+                <a:lightRig rig="threePt" dir="t"/>
+              </a:scene3d>
+              <a:sp3d>
+                <a:bevelT/>
+              </a:sp3d>
+            </p:spPr>
+            <p:style>
+              <a:lnRef idx="2">
+                <a:schemeClr val="accent1">
+                  <a:shade val="50000"/>
+                </a:schemeClr>
+              </a:lnRef>
+              <a:fillRef idx="1">
+                <a:schemeClr val="accent1"/>
+              </a:fillRef>
+              <a:effectRef idx="0">
+                <a:schemeClr val="accent1"/>
+              </a:effectRef>
+              <a:fontRef idx="minor">
+                <a:schemeClr val="lt1"/>
+              </a:fontRef>
+            </p:style>
+            <p:txBody>
+              <a:bodyPr rtlCol="0" anchor="ctr"/>
+              <a:lstStyle/>
+              <a:p>
+                <a:pPr algn="ctr"/>
+                <a:endParaRPr lang="en-US"/>
+              </a:p>
+            </p:txBody>
+          </p:sp>
+        </p:grpSp>
+        <p:grpSp>
+          <p:nvGrpSpPr>
+            <p:cNvPr id="18" name="Group 17">
+              <a:extLst>
+                <a:ext uri="{FF2B5EF4-FFF2-40B4-BE49-F238E27FC236}">
+                  <a16:creationId xmlns:a16="http://schemas.microsoft.com/office/drawing/2014/main" id="{E2F924D9-C608-4411-B493-B17D101B7257}"/>
+                </a:ext>
+              </a:extLst>
+            </p:cNvPr>
+            <p:cNvGrpSpPr/>
+            <p:nvPr/>
+          </p:nvGrpSpPr>
+          <p:grpSpPr>
+            <a:xfrm flipH="1">
+              <a:off x="7444221" y="2644352"/>
+              <a:ext cx="177800" cy="66675"/>
+              <a:chOff x="7007225" y="2644775"/>
+              <a:chExt cx="177800" cy="66675"/>
+            </a:xfrm>
+          </p:grpSpPr>
+          <p:sp>
+            <p:nvSpPr>
+              <p:cNvPr id="19" name="Teardrop 18">
+                <a:extLst>
+                  <a:ext uri="{FF2B5EF4-FFF2-40B4-BE49-F238E27FC236}">
+                    <a16:creationId xmlns:a16="http://schemas.microsoft.com/office/drawing/2014/main" id="{A3F71256-ECE5-490F-95DE-71C310C59F4C}"/>
+                  </a:ext>
+                </a:extLst>
+              </p:cNvPr>
+              <p:cNvSpPr/>
+              <p:nvPr/>
+            </p:nvSpPr>
+            <p:spPr>
+              <a:xfrm rot="773010" flipH="1">
+                <a:off x="7007225" y="2644775"/>
+                <a:ext cx="177800" cy="66675"/>
+              </a:xfrm>
+              <a:prstGeom prst="teardrop">
+                <a:avLst>
+                  <a:gd name="adj" fmla="val 108791"/>
+                </a:avLst>
+              </a:prstGeom>
+              <a:solidFill>
+                <a:schemeClr val="bg1">
+                  <a:lumMod val="95000"/>
+                </a:schemeClr>
+              </a:solidFill>
+              <a:ln>
+                <a:solidFill>
+                  <a:schemeClr val="tx1"/>
+                </a:solidFill>
+              </a:ln>
+            </p:spPr>
+            <p:style>
+              <a:lnRef idx="2">
+                <a:schemeClr val="accent1">
+                  <a:shade val="50000"/>
+                </a:schemeClr>
+              </a:lnRef>
+              <a:fillRef idx="1">
+                <a:schemeClr val="accent1"/>
+              </a:fillRef>
+              <a:effectRef idx="0">
+                <a:schemeClr val="accent1"/>
+              </a:effectRef>
+              <a:fontRef idx="minor">
+                <a:schemeClr val="lt1"/>
+              </a:fontRef>
+            </p:style>
+            <p:txBody>
+              <a:bodyPr rtlCol="0" anchor="ctr"/>
+              <a:lstStyle/>
+              <a:p>
+                <a:pPr algn="ctr"/>
+                <a:endParaRPr lang="en-US"/>
+              </a:p>
+            </p:txBody>
+          </p:sp>
+          <p:sp>
+            <p:nvSpPr>
+              <p:cNvPr id="20" name="Oval 19">
+                <a:extLst>
+                  <a:ext uri="{FF2B5EF4-FFF2-40B4-BE49-F238E27FC236}">
+                    <a16:creationId xmlns:a16="http://schemas.microsoft.com/office/drawing/2014/main" id="{7D578B5F-58B5-41EC-B5EC-0D15AC59874B}"/>
+                  </a:ext>
+                </a:extLst>
+              </p:cNvPr>
+              <p:cNvSpPr/>
+              <p:nvPr/>
+            </p:nvSpPr>
+            <p:spPr>
+              <a:xfrm>
+                <a:off x="7073900" y="2654138"/>
+                <a:ext cx="47625" cy="47104"/>
+              </a:xfrm>
+              <a:prstGeom prst="ellipse">
+                <a:avLst/>
+              </a:prstGeom>
+              <a:solidFill>
+                <a:srgbClr val="8D5F31"/>
+              </a:solidFill>
+              <a:ln>
+                <a:noFill/>
+              </a:ln>
+              <a:scene3d>
+                <a:camera prst="orthographicFront"/>
+                <a:lightRig rig="threePt" dir="t"/>
+              </a:scene3d>
+              <a:sp3d>
+                <a:bevelT/>
+              </a:sp3d>
+            </p:spPr>
+            <p:style>
+              <a:lnRef idx="2">
+                <a:schemeClr val="accent1">
+                  <a:shade val="50000"/>
+                </a:schemeClr>
+              </a:lnRef>
+              <a:fillRef idx="1">
+                <a:schemeClr val="accent1"/>
+              </a:fillRef>
+              <a:effectRef idx="0">
+                <a:schemeClr val="accent1"/>
+              </a:effectRef>
+              <a:fontRef idx="minor">
+                <a:schemeClr val="lt1"/>
+              </a:fontRef>
+            </p:style>
+            <p:txBody>
+              <a:bodyPr rtlCol="0" anchor="ctr"/>
+              <a:lstStyle/>
+              <a:p>
+                <a:pPr algn="ctr"/>
+                <a:endParaRPr lang="en-US"/>
+              </a:p>
+            </p:txBody>
+          </p:sp>
+        </p:grpSp>
+      </p:grpSp>
+      <p:sp>
+        <p:nvSpPr>
+          <p:cNvPr id="22" name="Arc 21">
+            <a:extLst>
+              <a:ext uri="{FF2B5EF4-FFF2-40B4-BE49-F238E27FC236}">
+                <a16:creationId xmlns:a16="http://schemas.microsoft.com/office/drawing/2014/main" id="{94C2DDF0-C8CD-4E22-9482-56D3F159DBEE}"/>
+              </a:ext>
+            </a:extLst>
+          </p:cNvPr>
+          <p:cNvSpPr/>
+          <p:nvPr/>
+        </p:nvSpPr>
+        <p:spPr>
+          <a:xfrm rot="8275946">
+            <a:off x="6899275" y="1986895"/>
+            <a:ext cx="914400" cy="914400"/>
+          </a:xfrm>
+          <a:prstGeom prst="arc">
+            <a:avLst/>
+          </a:prstGeom>
+          <a:ln w="28575">
+            <a:solidFill>
+              <a:schemeClr val="tx1"/>
+            </a:solidFill>
+          </a:ln>
+        </p:spPr>
+        <p:style>
+          <a:lnRef idx="1">
+            <a:schemeClr val="accent1"/>
+          </a:lnRef>
+          <a:fillRef idx="0">
+            <a:schemeClr val="accent1"/>
+          </a:fillRef>
+          <a:effectRef idx="0">
+            <a:schemeClr val="accent1"/>
+          </a:effectRef>
+          <a:fontRef idx="minor">
+            <a:schemeClr val="tx1"/>
+          </a:fontRef>
+        </p:style>
+        <p:txBody>
+          <a:bodyPr rtlCol="0" anchor="ctr"/>
+          <a:lstStyle/>
+          <a:p>
+            <a:pPr algn="ctr"/>
+            <a:endParaRPr lang="en-US"/>
+          </a:p>
+        </p:txBody>
+      </p:sp>
     </p:spTree>
     <p:extLst>
       <p:ext uri="{BB962C8B-B14F-4D97-AF65-F5344CB8AC3E}">

</xml_diff>

<commit_message>
Saved the ppt file for sprite creation.
</commit_message>
<xml_diff>
--- a/Pics/sprite designs.pptx
+++ b/Pics/sprite designs.pptx
@@ -4756,6 +4756,41 @@
           </p:style>
         </p:cxnSp>
       </p:grpSp>
+      <p:pic>
+        <p:nvPicPr>
+          <p:cNvPr id="34" name="Picture 33" descr="A close up of a sign&#10;&#10;Description generated with high confidence">
+            <a:extLst>
+              <a:ext uri="{FF2B5EF4-FFF2-40B4-BE49-F238E27FC236}">
+                <a16:creationId xmlns:a16="http://schemas.microsoft.com/office/drawing/2014/main" id="{2CB9C85E-7EB7-4485-9298-2827B5D60EEE}"/>
+              </a:ext>
+            </a:extLst>
+          </p:cNvPr>
+          <p:cNvPicPr>
+            <a:picLocks noChangeAspect="1"/>
+          </p:cNvPicPr>
+          <p:nvPr/>
+        </p:nvPicPr>
+        <p:blipFill rotWithShape="1">
+          <a:blip r:embed="rId2">
+            <a:extLst>
+              <a:ext uri="{28A0092B-C50C-407E-A947-70E740481C1C}">
+                <a14:useLocalDpi xmlns:a14="http://schemas.microsoft.com/office/drawing/2010/main" val="0"/>
+              </a:ext>
+            </a:extLst>
+          </a:blip>
+          <a:srcRect l="5522" t="571" r="3297"/>
+          <a:stretch/>
+        </p:blipFill>
+        <p:spPr>
+          <a:xfrm>
+            <a:off x="3969543" y="2212186"/>
+            <a:ext cx="1578735" cy="1757910"/>
+          </a:xfrm>
+          <a:prstGeom prst="rect">
+            <a:avLst/>
+          </a:prstGeom>
+        </p:spPr>
+      </p:pic>
     </p:spTree>
     <p:extLst>
       <p:ext uri="{BB962C8B-B14F-4D97-AF65-F5344CB8AC3E}">
@@ -4786,66 +4821,108 @@
           <a:chExt cx="0" cy="0"/>
         </a:xfrm>
       </p:grpSpPr>
-      <p:sp>
-        <p:nvSpPr>
-          <p:cNvPr id="2" name="Oval 1">
-            <a:extLst>
-              <a:ext uri="{FF2B5EF4-FFF2-40B4-BE49-F238E27FC236}">
-                <a16:creationId xmlns:a16="http://schemas.microsoft.com/office/drawing/2014/main" id="{2949711F-72C6-4F3B-8E44-39DD9F83A0B4}"/>
-              </a:ext>
-            </a:extLst>
-          </p:cNvPr>
-          <p:cNvSpPr/>
+      <p:pic>
+        <p:nvPicPr>
+          <p:cNvPr id="5" name="Picture 4" descr="A picture containing screenshot&#10;&#10;Description generated with high confidence">
+            <a:extLst>
+              <a:ext uri="{FF2B5EF4-FFF2-40B4-BE49-F238E27FC236}">
+                <a16:creationId xmlns:a16="http://schemas.microsoft.com/office/drawing/2014/main" id="{E79C3D83-D86A-4912-82C9-C97475CED005}"/>
+              </a:ext>
+            </a:extLst>
+          </p:cNvPr>
+          <p:cNvPicPr>
+            <a:picLocks noChangeAspect="1"/>
+          </p:cNvPicPr>
           <p:nvPr/>
-        </p:nvSpPr>
+        </p:nvPicPr>
+        <p:blipFill>
+          <a:blip r:embed="rId2">
+            <a:extLst>
+              <a:ext uri="{BEBA8EAE-BF5A-486C-A8C5-ECC9F3942E4B}">
+                <a14:imgProps xmlns:a14="http://schemas.microsoft.com/office/drawing/2010/main">
+                  <a14:imgLayer r:embed="rId3">
+                    <a14:imgEffect>
+                      <a14:saturation sat="33000"/>
+                    </a14:imgEffect>
+                    <a14:imgEffect>
+                      <a14:brightnessContrast bright="40000" contrast="-40000"/>
+                    </a14:imgEffect>
+                  </a14:imgLayer>
+                </a14:imgProps>
+              </a:ext>
+              <a:ext uri="{28A0092B-C50C-407E-A947-70E740481C1C}">
+                <a14:useLocalDpi xmlns:a14="http://schemas.microsoft.com/office/drawing/2010/main" val="0"/>
+              </a:ext>
+            </a:extLst>
+          </a:blip>
+          <a:stretch>
+            <a:fillRect/>
+          </a:stretch>
+        </p:blipFill>
         <p:spPr>
           <a:xfrm>
-            <a:off x="6870819" y="2344020"/>
-            <a:ext cx="914400" cy="914400"/>
+            <a:off x="260262" y="1392962"/>
+            <a:ext cx="3621338" cy="951058"/>
           </a:xfrm>
-          <a:prstGeom prst="ellipse">
+          <a:prstGeom prst="rect">
             <a:avLst/>
           </a:prstGeom>
-          <a:solidFill>
-            <a:schemeClr val="accent2"/>
-          </a:solidFill>
-          <a:ln>
-            <a:solidFill>
-              <a:schemeClr val="accent2"/>
-            </a:solidFill>
-          </a:ln>
         </p:spPr>
-        <p:style>
-          <a:lnRef idx="2">
-            <a:schemeClr val="accent1">
-              <a:shade val="50000"/>
-            </a:schemeClr>
-          </a:lnRef>
-          <a:fillRef idx="1">
-            <a:schemeClr val="accent1"/>
-          </a:fillRef>
-          <a:effectRef idx="0">
-            <a:schemeClr val="accent1"/>
-          </a:effectRef>
-          <a:fontRef idx="minor">
-            <a:schemeClr val="lt1"/>
-          </a:fontRef>
-        </p:style>
-        <p:txBody>
-          <a:bodyPr rtlCol="0" anchor="ctr"/>
-          <a:lstStyle/>
-          <a:p>
-            <a:pPr algn="ctr"/>
-            <a:endParaRPr lang="en-US"/>
-          </a:p>
-        </p:txBody>
-      </p:sp>
+      </p:pic>
+      <p:pic>
+        <p:nvPicPr>
+          <p:cNvPr id="8" name="Picture 7">
+            <a:extLst>
+              <a:ext uri="{FF2B5EF4-FFF2-40B4-BE49-F238E27FC236}">
+                <a16:creationId xmlns:a16="http://schemas.microsoft.com/office/drawing/2014/main" id="{DC8FA6C2-E20F-4B7F-87EF-E9785BEEC0F2}"/>
+              </a:ext>
+            </a:extLst>
+          </p:cNvPr>
+          <p:cNvPicPr>
+            <a:picLocks noChangeAspect="1"/>
+          </p:cNvPicPr>
+          <p:nvPr/>
+        </p:nvPicPr>
+        <p:blipFill>
+          <a:blip r:embed="rId4">
+            <a:extLst>
+              <a:ext uri="{BEBA8EAE-BF5A-486C-A8C5-ECC9F3942E4B}">
+                <a14:imgProps xmlns:a14="http://schemas.microsoft.com/office/drawing/2010/main">
+                  <a14:imgLayer r:embed="rId5">
+                    <a14:imgEffect>
+                      <a14:saturation sat="33000"/>
+                    </a14:imgEffect>
+                    <a14:imgEffect>
+                      <a14:brightnessContrast bright="40000" contrast="-40000"/>
+                    </a14:imgEffect>
+                  </a14:imgLayer>
+                </a14:imgProps>
+              </a:ext>
+              <a:ext uri="{28A0092B-C50C-407E-A947-70E740481C1C}">
+                <a14:useLocalDpi xmlns:a14="http://schemas.microsoft.com/office/drawing/2010/main" val="0"/>
+              </a:ext>
+            </a:extLst>
+          </a:blip>
+          <a:stretch>
+            <a:fillRect/>
+          </a:stretch>
+        </p:blipFill>
+        <p:spPr>
+          <a:xfrm>
+            <a:off x="260262" y="158996"/>
+            <a:ext cx="3621338" cy="951058"/>
+          </a:xfrm>
+          <a:prstGeom prst="rect">
+            <a:avLst/>
+          </a:prstGeom>
+        </p:spPr>
+      </p:pic>
       <p:grpSp>
         <p:nvGrpSpPr>
-          <p:cNvPr id="12" name="Group 11">
-            <a:extLst>
-              <a:ext uri="{FF2B5EF4-FFF2-40B4-BE49-F238E27FC236}">
-                <a16:creationId xmlns:a16="http://schemas.microsoft.com/office/drawing/2014/main" id="{FFE57149-C4C5-4D04-B1B7-2F957DAD91A4}"/>
+          <p:cNvPr id="23" name="Group 22">
+            <a:extLst>
+              <a:ext uri="{FF2B5EF4-FFF2-40B4-BE49-F238E27FC236}">
+                <a16:creationId xmlns:a16="http://schemas.microsoft.com/office/drawing/2014/main" id="{37190F59-9EC0-48D8-9E37-62229918149C}"/>
               </a:ext>
             </a:extLst>
           </p:cNvPr>
@@ -4854,26 +4931,18 @@
         </p:nvGrpSpPr>
         <p:grpSpPr>
           <a:xfrm>
-            <a:off x="6844695" y="1529697"/>
-            <a:ext cx="960207" cy="923330"/>
-            <a:chOff x="6844695" y="1529697"/>
-            <a:chExt cx="960207" cy="923330"/>
+            <a:off x="5925809" y="1390361"/>
+            <a:ext cx="1589643" cy="2045676"/>
+            <a:chOff x="4203689" y="2462278"/>
+            <a:chExt cx="1589643" cy="2045676"/>
           </a:xfrm>
-          <a:scene3d>
-            <a:camera prst="orthographicFront">
-              <a:rot lat="0" lon="0" rev="0"/>
-            </a:camera>
-            <a:lightRig rig="balanced" dir="t">
-              <a:rot lat="0" lon="0" rev="8700000"/>
-            </a:lightRig>
-          </a:scene3d>
         </p:grpSpPr>
         <p:sp>
           <p:nvSpPr>
-            <p:cNvPr id="3" name="Pentagon 2">
+            <p:cNvPr id="24" name="Block Arc 23">
               <a:extLst>
                 <a:ext uri="{FF2B5EF4-FFF2-40B4-BE49-F238E27FC236}">
-                  <a16:creationId xmlns:a16="http://schemas.microsoft.com/office/drawing/2014/main" id="{283EE1BF-8B66-4444-8FFE-B3581E6FA0E0}"/>
+                  <a16:creationId xmlns:a16="http://schemas.microsoft.com/office/drawing/2014/main" id="{C98066EE-1D91-499D-854C-E2BD81F253EB}"/>
                 </a:ext>
               </a:extLst>
             </p:cNvPr>
@@ -4882,325 +4951,22 @@
           </p:nvSpPr>
           <p:spPr>
             <a:xfrm>
-              <a:off x="6847959" y="1529697"/>
-              <a:ext cx="956943" cy="914398"/>
+              <a:off x="4858291" y="3593554"/>
+              <a:ext cx="914400" cy="914400"/>
             </a:xfrm>
-            <a:custGeom>
-              <a:avLst/>
-              <a:gdLst>
-                <a:gd name="connsiteX0" fmla="*/ 1 w 960120"/>
-                <a:gd name="connsiteY0" fmla="*/ 349269 h 914400"/>
-                <a:gd name="connsiteX1" fmla="*/ 480060 w 960120"/>
-                <a:gd name="connsiteY1" fmla="*/ 0 h 914400"/>
-                <a:gd name="connsiteX2" fmla="*/ 960119 w 960120"/>
-                <a:gd name="connsiteY2" fmla="*/ 349269 h 914400"/>
-                <a:gd name="connsiteX3" fmla="*/ 776753 w 960120"/>
-                <a:gd name="connsiteY3" fmla="*/ 914398 h 914400"/>
-                <a:gd name="connsiteX4" fmla="*/ 183367 w 960120"/>
-                <a:gd name="connsiteY4" fmla="*/ 914398 h 914400"/>
-                <a:gd name="connsiteX5" fmla="*/ 1 w 960120"/>
-                <a:gd name="connsiteY5" fmla="*/ 349269 h 914400"/>
-                <a:gd name="connsiteX0" fmla="*/ 0 w 960118"/>
-                <a:gd name="connsiteY0" fmla="*/ 349269 h 914398"/>
-                <a:gd name="connsiteX1" fmla="*/ 480059 w 960118"/>
-                <a:gd name="connsiteY1" fmla="*/ 0 h 914398"/>
-                <a:gd name="connsiteX2" fmla="*/ 960118 w 960118"/>
-                <a:gd name="connsiteY2" fmla="*/ 349269 h 914398"/>
-                <a:gd name="connsiteX3" fmla="*/ 776752 w 960118"/>
-                <a:gd name="connsiteY3" fmla="*/ 914398 h 914398"/>
-                <a:gd name="connsiteX4" fmla="*/ 183366 w 960118"/>
-                <a:gd name="connsiteY4" fmla="*/ 914398 h 914398"/>
-                <a:gd name="connsiteX5" fmla="*/ 0 w 960118"/>
-                <a:gd name="connsiteY5" fmla="*/ 349269 h 914398"/>
-                <a:gd name="connsiteX0" fmla="*/ 0 w 960118"/>
-                <a:gd name="connsiteY0" fmla="*/ 349269 h 914398"/>
-                <a:gd name="connsiteX1" fmla="*/ 480059 w 960118"/>
-                <a:gd name="connsiteY1" fmla="*/ 0 h 914398"/>
-                <a:gd name="connsiteX2" fmla="*/ 960118 w 960118"/>
-                <a:gd name="connsiteY2" fmla="*/ 349269 h 914398"/>
-                <a:gd name="connsiteX3" fmla="*/ 776752 w 960118"/>
-                <a:gd name="connsiteY3" fmla="*/ 914398 h 914398"/>
-                <a:gd name="connsiteX4" fmla="*/ 183366 w 960118"/>
-                <a:gd name="connsiteY4" fmla="*/ 914398 h 914398"/>
-                <a:gd name="connsiteX5" fmla="*/ 0 w 960118"/>
-                <a:gd name="connsiteY5" fmla="*/ 349269 h 914398"/>
-                <a:gd name="connsiteX0" fmla="*/ 0 w 960118"/>
-                <a:gd name="connsiteY0" fmla="*/ 349269 h 914398"/>
-                <a:gd name="connsiteX1" fmla="*/ 480059 w 960118"/>
-                <a:gd name="connsiteY1" fmla="*/ 0 h 914398"/>
-                <a:gd name="connsiteX2" fmla="*/ 960118 w 960118"/>
-                <a:gd name="connsiteY2" fmla="*/ 349269 h 914398"/>
-                <a:gd name="connsiteX3" fmla="*/ 776752 w 960118"/>
-                <a:gd name="connsiteY3" fmla="*/ 914398 h 914398"/>
-                <a:gd name="connsiteX4" fmla="*/ 183366 w 960118"/>
-                <a:gd name="connsiteY4" fmla="*/ 914398 h 914398"/>
-                <a:gd name="connsiteX5" fmla="*/ 0 w 960118"/>
-                <a:gd name="connsiteY5" fmla="*/ 349269 h 914398"/>
-                <a:gd name="connsiteX0" fmla="*/ 0 w 960118"/>
-                <a:gd name="connsiteY0" fmla="*/ 349269 h 914398"/>
-                <a:gd name="connsiteX1" fmla="*/ 480059 w 960118"/>
-                <a:gd name="connsiteY1" fmla="*/ 0 h 914398"/>
-                <a:gd name="connsiteX2" fmla="*/ 960118 w 960118"/>
-                <a:gd name="connsiteY2" fmla="*/ 349269 h 914398"/>
-                <a:gd name="connsiteX3" fmla="*/ 776752 w 960118"/>
-                <a:gd name="connsiteY3" fmla="*/ 914398 h 914398"/>
-                <a:gd name="connsiteX4" fmla="*/ 183366 w 960118"/>
-                <a:gd name="connsiteY4" fmla="*/ 914398 h 914398"/>
-                <a:gd name="connsiteX5" fmla="*/ 0 w 960118"/>
-                <a:gd name="connsiteY5" fmla="*/ 349269 h 914398"/>
-                <a:gd name="connsiteX0" fmla="*/ 0 w 960118"/>
-                <a:gd name="connsiteY0" fmla="*/ 349269 h 914398"/>
-                <a:gd name="connsiteX1" fmla="*/ 480059 w 960118"/>
-                <a:gd name="connsiteY1" fmla="*/ 0 h 914398"/>
-                <a:gd name="connsiteX2" fmla="*/ 960118 w 960118"/>
-                <a:gd name="connsiteY2" fmla="*/ 349269 h 914398"/>
-                <a:gd name="connsiteX3" fmla="*/ 776752 w 960118"/>
-                <a:gd name="connsiteY3" fmla="*/ 914398 h 914398"/>
-                <a:gd name="connsiteX4" fmla="*/ 183366 w 960118"/>
-                <a:gd name="connsiteY4" fmla="*/ 914398 h 914398"/>
-                <a:gd name="connsiteX5" fmla="*/ 0 w 960118"/>
-                <a:gd name="connsiteY5" fmla="*/ 349269 h 914398"/>
-                <a:gd name="connsiteX0" fmla="*/ 0 w 960118"/>
-                <a:gd name="connsiteY0" fmla="*/ 349269 h 914398"/>
-                <a:gd name="connsiteX1" fmla="*/ 480059 w 960118"/>
-                <a:gd name="connsiteY1" fmla="*/ 0 h 914398"/>
-                <a:gd name="connsiteX2" fmla="*/ 960118 w 960118"/>
-                <a:gd name="connsiteY2" fmla="*/ 349269 h 914398"/>
-                <a:gd name="connsiteX3" fmla="*/ 776752 w 960118"/>
-                <a:gd name="connsiteY3" fmla="*/ 914398 h 914398"/>
-                <a:gd name="connsiteX4" fmla="*/ 183366 w 960118"/>
-                <a:gd name="connsiteY4" fmla="*/ 914398 h 914398"/>
-                <a:gd name="connsiteX5" fmla="*/ 0 w 960118"/>
-                <a:gd name="connsiteY5" fmla="*/ 349269 h 914398"/>
-                <a:gd name="connsiteX0" fmla="*/ 0 w 960118"/>
-                <a:gd name="connsiteY0" fmla="*/ 412769 h 914398"/>
-                <a:gd name="connsiteX1" fmla="*/ 480059 w 960118"/>
-                <a:gd name="connsiteY1" fmla="*/ 0 h 914398"/>
-                <a:gd name="connsiteX2" fmla="*/ 960118 w 960118"/>
-                <a:gd name="connsiteY2" fmla="*/ 349269 h 914398"/>
-                <a:gd name="connsiteX3" fmla="*/ 776752 w 960118"/>
-                <a:gd name="connsiteY3" fmla="*/ 914398 h 914398"/>
-                <a:gd name="connsiteX4" fmla="*/ 183366 w 960118"/>
-                <a:gd name="connsiteY4" fmla="*/ 914398 h 914398"/>
-                <a:gd name="connsiteX5" fmla="*/ 0 w 960118"/>
-                <a:gd name="connsiteY5" fmla="*/ 412769 h 914398"/>
-                <a:gd name="connsiteX0" fmla="*/ 0 w 960118"/>
-                <a:gd name="connsiteY0" fmla="*/ 412769 h 914398"/>
-                <a:gd name="connsiteX1" fmla="*/ 480059 w 960118"/>
-                <a:gd name="connsiteY1" fmla="*/ 0 h 914398"/>
-                <a:gd name="connsiteX2" fmla="*/ 960118 w 960118"/>
-                <a:gd name="connsiteY2" fmla="*/ 457219 h 914398"/>
-                <a:gd name="connsiteX3" fmla="*/ 776752 w 960118"/>
-                <a:gd name="connsiteY3" fmla="*/ 914398 h 914398"/>
-                <a:gd name="connsiteX4" fmla="*/ 183366 w 960118"/>
-                <a:gd name="connsiteY4" fmla="*/ 914398 h 914398"/>
-                <a:gd name="connsiteX5" fmla="*/ 0 w 960118"/>
-                <a:gd name="connsiteY5" fmla="*/ 412769 h 914398"/>
-                <a:gd name="connsiteX0" fmla="*/ 0 w 956943"/>
-                <a:gd name="connsiteY0" fmla="*/ 412769 h 914398"/>
-                <a:gd name="connsiteX1" fmla="*/ 480059 w 956943"/>
-                <a:gd name="connsiteY1" fmla="*/ 0 h 914398"/>
-                <a:gd name="connsiteX2" fmla="*/ 956943 w 956943"/>
-                <a:gd name="connsiteY2" fmla="*/ 504844 h 914398"/>
-                <a:gd name="connsiteX3" fmla="*/ 776752 w 956943"/>
-                <a:gd name="connsiteY3" fmla="*/ 914398 h 914398"/>
-                <a:gd name="connsiteX4" fmla="*/ 183366 w 956943"/>
-                <a:gd name="connsiteY4" fmla="*/ 914398 h 914398"/>
-                <a:gd name="connsiteX5" fmla="*/ 0 w 956943"/>
-                <a:gd name="connsiteY5" fmla="*/ 412769 h 914398"/>
-                <a:gd name="connsiteX0" fmla="*/ 0 w 956943"/>
-                <a:gd name="connsiteY0" fmla="*/ 485794 h 914398"/>
-                <a:gd name="connsiteX1" fmla="*/ 480059 w 956943"/>
-                <a:gd name="connsiteY1" fmla="*/ 0 h 914398"/>
-                <a:gd name="connsiteX2" fmla="*/ 956943 w 956943"/>
-                <a:gd name="connsiteY2" fmla="*/ 504844 h 914398"/>
-                <a:gd name="connsiteX3" fmla="*/ 776752 w 956943"/>
-                <a:gd name="connsiteY3" fmla="*/ 914398 h 914398"/>
-                <a:gd name="connsiteX4" fmla="*/ 183366 w 956943"/>
-                <a:gd name="connsiteY4" fmla="*/ 914398 h 914398"/>
-                <a:gd name="connsiteX5" fmla="*/ 0 w 956943"/>
-                <a:gd name="connsiteY5" fmla="*/ 485794 h 914398"/>
-                <a:gd name="connsiteX0" fmla="*/ 0 w 956943"/>
-                <a:gd name="connsiteY0" fmla="*/ 485794 h 914398"/>
-                <a:gd name="connsiteX1" fmla="*/ 480059 w 956943"/>
-                <a:gd name="connsiteY1" fmla="*/ 0 h 914398"/>
-                <a:gd name="connsiteX2" fmla="*/ 956943 w 956943"/>
-                <a:gd name="connsiteY2" fmla="*/ 479444 h 914398"/>
-                <a:gd name="connsiteX3" fmla="*/ 776752 w 956943"/>
-                <a:gd name="connsiteY3" fmla="*/ 914398 h 914398"/>
-                <a:gd name="connsiteX4" fmla="*/ 183366 w 956943"/>
-                <a:gd name="connsiteY4" fmla="*/ 914398 h 914398"/>
-                <a:gd name="connsiteX5" fmla="*/ 0 w 956943"/>
-                <a:gd name="connsiteY5" fmla="*/ 485794 h 914398"/>
-                <a:gd name="connsiteX0" fmla="*/ 0 w 956943"/>
-                <a:gd name="connsiteY0" fmla="*/ 485794 h 914398"/>
-                <a:gd name="connsiteX1" fmla="*/ 480059 w 956943"/>
-                <a:gd name="connsiteY1" fmla="*/ 0 h 914398"/>
-                <a:gd name="connsiteX2" fmla="*/ 956943 w 956943"/>
-                <a:gd name="connsiteY2" fmla="*/ 479444 h 914398"/>
-                <a:gd name="connsiteX3" fmla="*/ 776752 w 956943"/>
-                <a:gd name="connsiteY3" fmla="*/ 914398 h 914398"/>
-                <a:gd name="connsiteX4" fmla="*/ 183366 w 956943"/>
-                <a:gd name="connsiteY4" fmla="*/ 914398 h 914398"/>
-                <a:gd name="connsiteX5" fmla="*/ 0 w 956943"/>
-                <a:gd name="connsiteY5" fmla="*/ 485794 h 914398"/>
-                <a:gd name="connsiteX0" fmla="*/ 0 w 956943"/>
-                <a:gd name="connsiteY0" fmla="*/ 485794 h 914398"/>
-                <a:gd name="connsiteX1" fmla="*/ 480059 w 956943"/>
-                <a:gd name="connsiteY1" fmla="*/ 0 h 914398"/>
-                <a:gd name="connsiteX2" fmla="*/ 956943 w 956943"/>
-                <a:gd name="connsiteY2" fmla="*/ 479444 h 914398"/>
-                <a:gd name="connsiteX3" fmla="*/ 776752 w 956943"/>
-                <a:gd name="connsiteY3" fmla="*/ 914398 h 914398"/>
-                <a:gd name="connsiteX4" fmla="*/ 183366 w 956943"/>
-                <a:gd name="connsiteY4" fmla="*/ 914398 h 914398"/>
-                <a:gd name="connsiteX5" fmla="*/ 0 w 956943"/>
-                <a:gd name="connsiteY5" fmla="*/ 485794 h 914398"/>
-                <a:gd name="connsiteX0" fmla="*/ 0 w 956943"/>
-                <a:gd name="connsiteY0" fmla="*/ 485794 h 914398"/>
-                <a:gd name="connsiteX1" fmla="*/ 480059 w 956943"/>
-                <a:gd name="connsiteY1" fmla="*/ 0 h 914398"/>
-                <a:gd name="connsiteX2" fmla="*/ 956943 w 956943"/>
-                <a:gd name="connsiteY2" fmla="*/ 479444 h 914398"/>
-                <a:gd name="connsiteX3" fmla="*/ 776752 w 956943"/>
-                <a:gd name="connsiteY3" fmla="*/ 914398 h 914398"/>
-                <a:gd name="connsiteX4" fmla="*/ 183366 w 956943"/>
-                <a:gd name="connsiteY4" fmla="*/ 914398 h 914398"/>
-                <a:gd name="connsiteX5" fmla="*/ 0 w 956943"/>
-                <a:gd name="connsiteY5" fmla="*/ 485794 h 914398"/>
-                <a:gd name="connsiteX0" fmla="*/ 0 w 956943"/>
-                <a:gd name="connsiteY0" fmla="*/ 485794 h 914398"/>
-                <a:gd name="connsiteX1" fmla="*/ 480059 w 956943"/>
-                <a:gd name="connsiteY1" fmla="*/ 0 h 914398"/>
-                <a:gd name="connsiteX2" fmla="*/ 956943 w 956943"/>
-                <a:gd name="connsiteY2" fmla="*/ 479444 h 914398"/>
-                <a:gd name="connsiteX3" fmla="*/ 776752 w 956943"/>
-                <a:gd name="connsiteY3" fmla="*/ 914398 h 914398"/>
-                <a:gd name="connsiteX4" fmla="*/ 183366 w 956943"/>
-                <a:gd name="connsiteY4" fmla="*/ 914398 h 914398"/>
-                <a:gd name="connsiteX5" fmla="*/ 0 w 956943"/>
-                <a:gd name="connsiteY5" fmla="*/ 485794 h 914398"/>
-                <a:gd name="connsiteX0" fmla="*/ 0 w 956943"/>
-                <a:gd name="connsiteY0" fmla="*/ 485794 h 914398"/>
-                <a:gd name="connsiteX1" fmla="*/ 480059 w 956943"/>
-                <a:gd name="connsiteY1" fmla="*/ 0 h 914398"/>
-                <a:gd name="connsiteX2" fmla="*/ 956943 w 956943"/>
-                <a:gd name="connsiteY2" fmla="*/ 479444 h 914398"/>
-                <a:gd name="connsiteX3" fmla="*/ 776752 w 956943"/>
-                <a:gd name="connsiteY3" fmla="*/ 914398 h 914398"/>
-                <a:gd name="connsiteX4" fmla="*/ 183366 w 956943"/>
-                <a:gd name="connsiteY4" fmla="*/ 914398 h 914398"/>
-                <a:gd name="connsiteX5" fmla="*/ 0 w 956943"/>
-                <a:gd name="connsiteY5" fmla="*/ 485794 h 914398"/>
-                <a:gd name="connsiteX0" fmla="*/ 0 w 956943"/>
-                <a:gd name="connsiteY0" fmla="*/ 485794 h 914398"/>
-                <a:gd name="connsiteX1" fmla="*/ 480059 w 956943"/>
-                <a:gd name="connsiteY1" fmla="*/ 0 h 914398"/>
-                <a:gd name="connsiteX2" fmla="*/ 956943 w 956943"/>
-                <a:gd name="connsiteY2" fmla="*/ 479444 h 914398"/>
-                <a:gd name="connsiteX3" fmla="*/ 776752 w 956943"/>
-                <a:gd name="connsiteY3" fmla="*/ 914398 h 914398"/>
-                <a:gd name="connsiteX4" fmla="*/ 183366 w 956943"/>
-                <a:gd name="connsiteY4" fmla="*/ 914398 h 914398"/>
-                <a:gd name="connsiteX5" fmla="*/ 0 w 956943"/>
-                <a:gd name="connsiteY5" fmla="*/ 485794 h 914398"/>
-                <a:gd name="connsiteX0" fmla="*/ 0 w 956943"/>
-                <a:gd name="connsiteY0" fmla="*/ 485794 h 914398"/>
-                <a:gd name="connsiteX1" fmla="*/ 480059 w 956943"/>
-                <a:gd name="connsiteY1" fmla="*/ 0 h 914398"/>
-                <a:gd name="connsiteX2" fmla="*/ 956943 w 956943"/>
-                <a:gd name="connsiteY2" fmla="*/ 479444 h 914398"/>
-                <a:gd name="connsiteX3" fmla="*/ 776752 w 956943"/>
-                <a:gd name="connsiteY3" fmla="*/ 914398 h 914398"/>
-                <a:gd name="connsiteX4" fmla="*/ 183366 w 956943"/>
-                <a:gd name="connsiteY4" fmla="*/ 914398 h 914398"/>
-                <a:gd name="connsiteX5" fmla="*/ 0 w 956943"/>
-                <a:gd name="connsiteY5" fmla="*/ 485794 h 914398"/>
-                <a:gd name="connsiteX0" fmla="*/ 0 w 956943"/>
-                <a:gd name="connsiteY0" fmla="*/ 485794 h 914398"/>
-                <a:gd name="connsiteX1" fmla="*/ 480059 w 956943"/>
-                <a:gd name="connsiteY1" fmla="*/ 0 h 914398"/>
-                <a:gd name="connsiteX2" fmla="*/ 956943 w 956943"/>
-                <a:gd name="connsiteY2" fmla="*/ 479444 h 914398"/>
-                <a:gd name="connsiteX3" fmla="*/ 776752 w 956943"/>
-                <a:gd name="connsiteY3" fmla="*/ 914398 h 914398"/>
-                <a:gd name="connsiteX4" fmla="*/ 183366 w 956943"/>
-                <a:gd name="connsiteY4" fmla="*/ 914398 h 914398"/>
-                <a:gd name="connsiteX5" fmla="*/ 0 w 956943"/>
-                <a:gd name="connsiteY5" fmla="*/ 485794 h 914398"/>
-              </a:gdLst>
-              <a:ahLst/>
-              <a:cxnLst>
-                <a:cxn ang="0">
-                  <a:pos x="connsiteX0" y="connsiteY0"/>
-                </a:cxn>
-                <a:cxn ang="0">
-                  <a:pos x="connsiteX1" y="connsiteY1"/>
-                </a:cxn>
-                <a:cxn ang="0">
-                  <a:pos x="connsiteX2" y="connsiteY2"/>
-                </a:cxn>
-                <a:cxn ang="0">
-                  <a:pos x="connsiteX3" y="connsiteY3"/>
-                </a:cxn>
-                <a:cxn ang="0">
-                  <a:pos x="connsiteX4" y="connsiteY4"/>
-                </a:cxn>
-                <a:cxn ang="0">
-                  <a:pos x="connsiteX5" y="connsiteY5"/>
-                </a:cxn>
-              </a:cxnLst>
-              <a:rect l="l" t="t" r="r" b="b"/>
-              <a:pathLst>
-                <a:path w="956943" h="914398">
-                  <a:moveTo>
-                    <a:pt x="0" y="485794"/>
-                  </a:moveTo>
-                  <a:cubicBezTo>
-                    <a:pt x="131445" y="277296"/>
-                    <a:pt x="218439" y="97373"/>
-                    <a:pt x="480059" y="0"/>
-                  </a:cubicBezTo>
-                  <a:cubicBezTo>
-                    <a:pt x="738504" y="106898"/>
-                    <a:pt x="854073" y="299521"/>
-                    <a:pt x="956943" y="479444"/>
-                  </a:cubicBezTo>
-                  <a:cubicBezTo>
-                    <a:pt x="902171" y="658295"/>
-                    <a:pt x="882324" y="748247"/>
-                    <a:pt x="776752" y="914398"/>
-                  </a:cubicBezTo>
-                  <a:cubicBezTo>
-                    <a:pt x="499582" y="869948"/>
-                    <a:pt x="508161" y="866773"/>
-                    <a:pt x="183366" y="914398"/>
-                  </a:cubicBezTo>
-                  <a:cubicBezTo>
-                    <a:pt x="84144" y="754597"/>
-                    <a:pt x="64297" y="670995"/>
-                    <a:pt x="0" y="485794"/>
-                  </a:cubicBezTo>
-                  <a:close/>
-                </a:path>
-              </a:pathLst>
-            </a:custGeom>
+            <a:prstGeom prst="blockArc">
+              <a:avLst>
+                <a:gd name="adj1" fmla="val 17795767"/>
+                <a:gd name="adj2" fmla="val 21483511"/>
+                <a:gd name="adj3" fmla="val 9004"/>
+              </a:avLst>
+            </a:prstGeom>
             <a:solidFill>
-              <a:schemeClr val="bg1"/>
+              <a:schemeClr val="accent2"/>
             </a:solidFill>
             <a:ln>
               <a:noFill/>
             </a:ln>
-            <a:effectLst>
-              <a:outerShdw blurRad="44450" dist="27940" dir="5400000" algn="ctr">
-                <a:srgbClr val="000000">
-                  <a:alpha val="32000"/>
-                </a:srgbClr>
-              </a:outerShdw>
-            </a:effectLst>
-            <a:sp3d>
-              <a:bevelT w="190500" h="38100"/>
-            </a:sp3d>
           </p:spPr>
           <p:style>
             <a:lnRef idx="2">
@@ -5223,484 +4989,80 @@
             <a:lstStyle/>
             <a:p>
               <a:pPr algn="ctr"/>
-              <a:endParaRPr lang="en-US"/>
+              <a:endParaRPr lang="en-US">
+                <a:solidFill>
+                  <a:schemeClr val="tx1"/>
+                </a:solidFill>
+              </a:endParaRPr>
             </a:p>
           </p:txBody>
         </p:sp>
         <p:sp>
           <p:nvSpPr>
-            <p:cNvPr id="10" name="TextBox 9">
+            <p:cNvPr id="25" name="Block Arc 24">
               <a:extLst>
                 <a:ext uri="{FF2B5EF4-FFF2-40B4-BE49-F238E27FC236}">
-                  <a16:creationId xmlns:a16="http://schemas.microsoft.com/office/drawing/2014/main" id="{C4259C32-17D5-4542-8FAE-709EADE50932}"/>
+                  <a16:creationId xmlns:a16="http://schemas.microsoft.com/office/drawing/2014/main" id="{B8BE4134-7FCE-4DAF-AD40-62F2C70E8D7C}"/>
                 </a:ext>
               </a:extLst>
             </p:cNvPr>
-            <p:cNvSpPr txBox="1"/>
+            <p:cNvSpPr/>
             <p:nvPr/>
           </p:nvSpPr>
           <p:spPr>
-            <a:xfrm>
-              <a:off x="6844695" y="1529697"/>
-              <a:ext cx="896399" cy="923330"/>
+            <a:xfrm rot="5400000" flipV="1">
+              <a:off x="4260539" y="2905338"/>
+              <a:ext cx="914400" cy="914400"/>
             </a:xfrm>
-            <a:prstGeom prst="rect">
-              <a:avLst/>
+            <a:prstGeom prst="blockArc">
+              <a:avLst>
+                <a:gd name="adj1" fmla="val 18603924"/>
+                <a:gd name="adj2" fmla="val 21483511"/>
+                <a:gd name="adj3" fmla="val 9004"/>
+              </a:avLst>
             </a:prstGeom>
-            <a:noFill/>
+            <a:solidFill>
+              <a:schemeClr val="accent2"/>
+            </a:solidFill>
             <a:ln>
               <a:noFill/>
             </a:ln>
-            <a:effectLst>
-              <a:outerShdw blurRad="44450" dist="27940" dir="5400000" algn="ctr">
-                <a:srgbClr val="000000">
-                  <a:alpha val="32000"/>
-                </a:srgbClr>
-              </a:outerShdw>
-            </a:effectLst>
-            <a:sp3d>
-              <a:bevelT w="190500" h="38100"/>
-            </a:sp3d>
           </p:spPr>
+          <p:style>
+            <a:lnRef idx="2">
+              <a:schemeClr val="accent1">
+                <a:shade val="50000"/>
+              </a:schemeClr>
+            </a:lnRef>
+            <a:fillRef idx="1">
+              <a:schemeClr val="accent1"/>
+            </a:fillRef>
+            <a:effectRef idx="0">
+              <a:schemeClr val="accent1"/>
+            </a:effectRef>
+            <a:fontRef idx="minor">
+              <a:schemeClr val="lt1"/>
+            </a:fontRef>
+          </p:style>
           <p:txBody>
-            <a:bodyPr wrap="none" rtlCol="0">
-              <a:spAutoFit/>
-              <a:sp3d extrusionH="57150" prstMaterial="softEdge">
-                <a:bevelT w="25400" h="38100"/>
-              </a:sp3d>
-            </a:bodyPr>
+            <a:bodyPr rtlCol="0" anchor="ctr"/>
             <a:lstStyle/>
             <a:p>
               <a:pPr algn="ctr"/>
-              <a:r>
-                <a:rPr lang="en-US" sz="5400" b="1" dirty="0">
-                  <a:ln/>
-                  <a:solidFill>
-                    <a:schemeClr val="accent4"/>
-                  </a:solidFill>
-                </a:rPr>
-                <a:t>C#</a:t>
-              </a:r>
+              <a:endParaRPr lang="en-US">
+                <a:solidFill>
+                  <a:schemeClr val="tx1"/>
+                </a:solidFill>
+              </a:endParaRPr>
             </a:p>
           </p:txBody>
         </p:sp>
-      </p:grpSp>
-      <p:pic>
-        <p:nvPicPr>
-          <p:cNvPr id="5" name="Picture 4" descr="A picture containing screenshot&#10;&#10;Description generated with high confidence">
-            <a:extLst>
-              <a:ext uri="{FF2B5EF4-FFF2-40B4-BE49-F238E27FC236}">
-                <a16:creationId xmlns:a16="http://schemas.microsoft.com/office/drawing/2014/main" id="{E79C3D83-D86A-4912-82C9-C97475CED005}"/>
-              </a:ext>
-            </a:extLst>
-          </p:cNvPr>
-          <p:cNvPicPr>
-            <a:picLocks noChangeAspect="1"/>
-          </p:cNvPicPr>
-          <p:nvPr/>
-        </p:nvPicPr>
-        <p:blipFill>
-          <a:blip r:embed="rId2">
-            <a:extLst>
-              <a:ext uri="{BEBA8EAE-BF5A-486C-A8C5-ECC9F3942E4B}">
-                <a14:imgProps xmlns:a14="http://schemas.microsoft.com/office/drawing/2010/main">
-                  <a14:imgLayer r:embed="rId3">
-                    <a14:imgEffect>
-                      <a14:saturation sat="33000"/>
-                    </a14:imgEffect>
-                    <a14:imgEffect>
-                      <a14:brightnessContrast bright="40000" contrast="-40000"/>
-                    </a14:imgEffect>
-                  </a14:imgLayer>
-                </a14:imgProps>
-              </a:ext>
-              <a:ext uri="{28A0092B-C50C-407E-A947-70E740481C1C}">
-                <a14:useLocalDpi xmlns:a14="http://schemas.microsoft.com/office/drawing/2010/main" val="0"/>
-              </a:ext>
-            </a:extLst>
-          </a:blip>
-          <a:stretch>
-            <a:fillRect/>
-          </a:stretch>
-        </p:blipFill>
-        <p:spPr>
-          <a:xfrm>
-            <a:off x="260262" y="1392962"/>
-            <a:ext cx="3621338" cy="951058"/>
-          </a:xfrm>
-          <a:prstGeom prst="rect">
-            <a:avLst/>
-          </a:prstGeom>
-        </p:spPr>
-      </p:pic>
-      <p:pic>
-        <p:nvPicPr>
-          <p:cNvPr id="8" name="Picture 7">
-            <a:extLst>
-              <a:ext uri="{FF2B5EF4-FFF2-40B4-BE49-F238E27FC236}">
-                <a16:creationId xmlns:a16="http://schemas.microsoft.com/office/drawing/2014/main" id="{DC8FA6C2-E20F-4B7F-87EF-E9785BEEC0F2}"/>
-              </a:ext>
-            </a:extLst>
-          </p:cNvPr>
-          <p:cNvPicPr>
-            <a:picLocks noChangeAspect="1"/>
-          </p:cNvPicPr>
-          <p:nvPr/>
-        </p:nvPicPr>
-        <p:blipFill>
-          <a:blip r:embed="rId4">
-            <a:extLst>
-              <a:ext uri="{BEBA8EAE-BF5A-486C-A8C5-ECC9F3942E4B}">
-                <a14:imgProps xmlns:a14="http://schemas.microsoft.com/office/drawing/2010/main">
-                  <a14:imgLayer r:embed="rId5">
-                    <a14:imgEffect>
-                      <a14:saturation sat="33000"/>
-                    </a14:imgEffect>
-                    <a14:imgEffect>
-                      <a14:brightnessContrast bright="40000" contrast="-40000"/>
-                    </a14:imgEffect>
-                  </a14:imgLayer>
-                </a14:imgProps>
-              </a:ext>
-              <a:ext uri="{28A0092B-C50C-407E-A947-70E740481C1C}">
-                <a14:useLocalDpi xmlns:a14="http://schemas.microsoft.com/office/drawing/2010/main" val="0"/>
-              </a:ext>
-            </a:extLst>
-          </a:blip>
-          <a:stretch>
-            <a:fillRect/>
-          </a:stretch>
-        </p:blipFill>
-        <p:spPr>
-          <a:xfrm>
-            <a:off x="260262" y="158996"/>
-            <a:ext cx="3621338" cy="951058"/>
-          </a:xfrm>
-          <a:prstGeom prst="rect">
-            <a:avLst/>
-          </a:prstGeom>
-        </p:spPr>
-      </p:pic>
-      <p:sp>
-        <p:nvSpPr>
-          <p:cNvPr id="9" name="Trapezoid 8">
-            <a:extLst>
-              <a:ext uri="{FF2B5EF4-FFF2-40B4-BE49-F238E27FC236}">
-                <a16:creationId xmlns:a16="http://schemas.microsoft.com/office/drawing/2014/main" id="{4F5BEDF0-AC02-4297-B399-61AD969EEAE9}"/>
-              </a:ext>
-            </a:extLst>
-          </p:cNvPr>
-          <p:cNvSpPr/>
-          <p:nvPr/>
-        </p:nvSpPr>
-        <p:spPr>
-          <a:xfrm rot="10800000">
-            <a:off x="6965950" y="2287986"/>
-            <a:ext cx="717550" cy="149757"/>
-          </a:xfrm>
-          <a:custGeom>
-            <a:avLst/>
-            <a:gdLst>
-              <a:gd name="connsiteX0" fmla="*/ 0 w 698500"/>
-              <a:gd name="connsiteY0" fmla="*/ 108077 h 108077"/>
-              <a:gd name="connsiteX1" fmla="*/ 57960 w 698500"/>
-              <a:gd name="connsiteY1" fmla="*/ 0 h 108077"/>
-              <a:gd name="connsiteX2" fmla="*/ 640540 w 698500"/>
-              <a:gd name="connsiteY2" fmla="*/ 0 h 108077"/>
-              <a:gd name="connsiteX3" fmla="*/ 698500 w 698500"/>
-              <a:gd name="connsiteY3" fmla="*/ 108077 h 108077"/>
-              <a:gd name="connsiteX4" fmla="*/ 0 w 698500"/>
-              <a:gd name="connsiteY4" fmla="*/ 108077 h 108077"/>
-              <a:gd name="connsiteX0" fmla="*/ 0 w 698500"/>
-              <a:gd name="connsiteY0" fmla="*/ 108077 h 108077"/>
-              <a:gd name="connsiteX1" fmla="*/ 57960 w 698500"/>
-              <a:gd name="connsiteY1" fmla="*/ 0 h 108077"/>
-              <a:gd name="connsiteX2" fmla="*/ 640540 w 698500"/>
-              <a:gd name="connsiteY2" fmla="*/ 0 h 108077"/>
-              <a:gd name="connsiteX3" fmla="*/ 698500 w 698500"/>
-              <a:gd name="connsiteY3" fmla="*/ 108077 h 108077"/>
-              <a:gd name="connsiteX4" fmla="*/ 0 w 698500"/>
-              <a:gd name="connsiteY4" fmla="*/ 108077 h 108077"/>
-              <a:gd name="connsiteX0" fmla="*/ 0 w 698500"/>
-              <a:gd name="connsiteY0" fmla="*/ 108077 h 108077"/>
-              <a:gd name="connsiteX1" fmla="*/ 57960 w 698500"/>
-              <a:gd name="connsiteY1" fmla="*/ 0 h 108077"/>
-              <a:gd name="connsiteX2" fmla="*/ 640540 w 698500"/>
-              <a:gd name="connsiteY2" fmla="*/ 0 h 108077"/>
-              <a:gd name="connsiteX3" fmla="*/ 698500 w 698500"/>
-              <a:gd name="connsiteY3" fmla="*/ 108077 h 108077"/>
-              <a:gd name="connsiteX4" fmla="*/ 0 w 698500"/>
-              <a:gd name="connsiteY4" fmla="*/ 108077 h 108077"/>
-              <a:gd name="connsiteX0" fmla="*/ 0 w 698500"/>
-              <a:gd name="connsiteY0" fmla="*/ 108077 h 132065"/>
-              <a:gd name="connsiteX1" fmla="*/ 57960 w 698500"/>
-              <a:gd name="connsiteY1" fmla="*/ 0 h 132065"/>
-              <a:gd name="connsiteX2" fmla="*/ 640540 w 698500"/>
-              <a:gd name="connsiteY2" fmla="*/ 0 h 132065"/>
-              <a:gd name="connsiteX3" fmla="*/ 698500 w 698500"/>
-              <a:gd name="connsiteY3" fmla="*/ 108077 h 132065"/>
-              <a:gd name="connsiteX4" fmla="*/ 0 w 698500"/>
-              <a:gd name="connsiteY4" fmla="*/ 108077 h 132065"/>
-              <a:gd name="connsiteX0" fmla="*/ 0 w 698500"/>
-              <a:gd name="connsiteY0" fmla="*/ 108077 h 149757"/>
-              <a:gd name="connsiteX1" fmla="*/ 57960 w 698500"/>
-              <a:gd name="connsiteY1" fmla="*/ 0 h 149757"/>
-              <a:gd name="connsiteX2" fmla="*/ 640540 w 698500"/>
-              <a:gd name="connsiteY2" fmla="*/ 0 h 149757"/>
-              <a:gd name="connsiteX3" fmla="*/ 698500 w 698500"/>
-              <a:gd name="connsiteY3" fmla="*/ 108077 h 149757"/>
-              <a:gd name="connsiteX4" fmla="*/ 0 w 698500"/>
-              <a:gd name="connsiteY4" fmla="*/ 108077 h 149757"/>
-            </a:gdLst>
-            <a:ahLst/>
-            <a:cxnLst>
-              <a:cxn ang="0">
-                <a:pos x="connsiteX0" y="connsiteY0"/>
-              </a:cxn>
-              <a:cxn ang="0">
-                <a:pos x="connsiteX1" y="connsiteY1"/>
-              </a:cxn>
-              <a:cxn ang="0">
-                <a:pos x="connsiteX2" y="connsiteY2"/>
-              </a:cxn>
-              <a:cxn ang="0">
-                <a:pos x="connsiteX3" y="connsiteY3"/>
-              </a:cxn>
-              <a:cxn ang="0">
-                <a:pos x="connsiteX4" y="connsiteY4"/>
-              </a:cxn>
-            </a:cxnLst>
-            <a:rect l="l" t="t" r="r" b="b"/>
-            <a:pathLst>
-              <a:path w="698500" h="149757">
-                <a:moveTo>
-                  <a:pt x="0" y="108077"/>
-                </a:moveTo>
-                <a:lnTo>
-                  <a:pt x="57960" y="0"/>
-                </a:lnTo>
-                <a:cubicBezTo>
-                  <a:pt x="277553" y="66675"/>
-                  <a:pt x="471747" y="41275"/>
-                  <a:pt x="640540" y="0"/>
-                </a:cubicBezTo>
-                <a:lnTo>
-                  <a:pt x="698500" y="108077"/>
-                </a:lnTo>
-                <a:cubicBezTo>
-                  <a:pt x="332317" y="165227"/>
-                  <a:pt x="334433" y="162052"/>
-                  <a:pt x="0" y="108077"/>
-                </a:cubicBezTo>
-                <a:close/>
-              </a:path>
-            </a:pathLst>
-          </a:custGeom>
-          <a:solidFill>
-            <a:srgbClr val="FFCC00"/>
-          </a:solidFill>
-          <a:ln>
-            <a:solidFill>
-              <a:schemeClr val="accent4">
-                <a:lumMod val="75000"/>
-              </a:schemeClr>
-            </a:solidFill>
-          </a:ln>
-          <a:scene3d>
-            <a:camera prst="orthographicFront"/>
-            <a:lightRig rig="threePt" dir="t"/>
-          </a:scene3d>
-          <a:sp3d>
-            <a:bevelT w="57150" h="12700" prst="cross"/>
-          </a:sp3d>
-        </p:spPr>
-        <p:style>
-          <a:lnRef idx="2">
-            <a:schemeClr val="accent1">
-              <a:shade val="50000"/>
-            </a:schemeClr>
-          </a:lnRef>
-          <a:fillRef idx="1">
-            <a:schemeClr val="accent1"/>
-          </a:fillRef>
-          <a:effectRef idx="0">
-            <a:schemeClr val="accent1"/>
-          </a:effectRef>
-          <a:fontRef idx="minor">
-            <a:schemeClr val="lt1"/>
-          </a:fontRef>
-        </p:style>
-        <p:txBody>
-          <a:bodyPr rtlCol="0" anchor="t"/>
-          <a:lstStyle/>
-          <a:p>
-            <a:pPr algn="ctr"/>
-            <a:endParaRPr lang="en-US" dirty="0"/>
-          </a:p>
-        </p:txBody>
-      </p:sp>
-      <p:sp>
-        <p:nvSpPr>
-          <p:cNvPr id="13" name="TextBox 12">
-            <a:extLst>
-              <a:ext uri="{FF2B5EF4-FFF2-40B4-BE49-F238E27FC236}">
-                <a16:creationId xmlns:a16="http://schemas.microsoft.com/office/drawing/2014/main" id="{D32CFCF4-2572-4F17-BE47-BDC8FE3E3EC7}"/>
-              </a:ext>
-            </a:extLst>
-          </p:cNvPr>
-          <p:cNvSpPr txBox="1"/>
-          <p:nvPr/>
-        </p:nvSpPr>
-        <p:spPr>
-          <a:xfrm>
-            <a:off x="6972300" y="2350557"/>
-            <a:ext cx="723275" cy="174375"/>
-          </a:xfrm>
-          <a:custGeom>
-            <a:avLst/>
-            <a:gdLst>
-              <a:gd name="connsiteX0" fmla="*/ 0 w 723275"/>
-              <a:gd name="connsiteY0" fmla="*/ 0 h 138499"/>
-              <a:gd name="connsiteX1" fmla="*/ 723275 w 723275"/>
-              <a:gd name="connsiteY1" fmla="*/ 0 h 138499"/>
-              <a:gd name="connsiteX2" fmla="*/ 723275 w 723275"/>
-              <a:gd name="connsiteY2" fmla="*/ 138499 h 138499"/>
-              <a:gd name="connsiteX3" fmla="*/ 0 w 723275"/>
-              <a:gd name="connsiteY3" fmla="*/ 138499 h 138499"/>
-              <a:gd name="connsiteX4" fmla="*/ 0 w 723275"/>
-              <a:gd name="connsiteY4" fmla="*/ 0 h 138499"/>
-              <a:gd name="connsiteX0" fmla="*/ 0 w 723275"/>
-              <a:gd name="connsiteY0" fmla="*/ 23988 h 162487"/>
-              <a:gd name="connsiteX1" fmla="*/ 723275 w 723275"/>
-              <a:gd name="connsiteY1" fmla="*/ 23988 h 162487"/>
-              <a:gd name="connsiteX2" fmla="*/ 723275 w 723275"/>
-              <a:gd name="connsiteY2" fmla="*/ 162487 h 162487"/>
-              <a:gd name="connsiteX3" fmla="*/ 0 w 723275"/>
-              <a:gd name="connsiteY3" fmla="*/ 162487 h 162487"/>
-              <a:gd name="connsiteX4" fmla="*/ 0 w 723275"/>
-              <a:gd name="connsiteY4" fmla="*/ 23988 h 162487"/>
-              <a:gd name="connsiteX0" fmla="*/ 0 w 723275"/>
-              <a:gd name="connsiteY0" fmla="*/ 23988 h 162487"/>
-              <a:gd name="connsiteX1" fmla="*/ 723275 w 723275"/>
-              <a:gd name="connsiteY1" fmla="*/ 23988 h 162487"/>
-              <a:gd name="connsiteX2" fmla="*/ 723275 w 723275"/>
-              <a:gd name="connsiteY2" fmla="*/ 162487 h 162487"/>
-              <a:gd name="connsiteX3" fmla="*/ 0 w 723275"/>
-              <a:gd name="connsiteY3" fmla="*/ 162487 h 162487"/>
-              <a:gd name="connsiteX4" fmla="*/ 0 w 723275"/>
-              <a:gd name="connsiteY4" fmla="*/ 23988 h 162487"/>
-              <a:gd name="connsiteX0" fmla="*/ 0 w 723275"/>
-              <a:gd name="connsiteY0" fmla="*/ 23988 h 162487"/>
-              <a:gd name="connsiteX1" fmla="*/ 723275 w 723275"/>
-              <a:gd name="connsiteY1" fmla="*/ 23988 h 162487"/>
-              <a:gd name="connsiteX2" fmla="*/ 723275 w 723275"/>
-              <a:gd name="connsiteY2" fmla="*/ 162487 h 162487"/>
-              <a:gd name="connsiteX3" fmla="*/ 0 w 723275"/>
-              <a:gd name="connsiteY3" fmla="*/ 162487 h 162487"/>
-              <a:gd name="connsiteX4" fmla="*/ 0 w 723275"/>
-              <a:gd name="connsiteY4" fmla="*/ 23988 h 162487"/>
-              <a:gd name="connsiteX0" fmla="*/ 0 w 723275"/>
-              <a:gd name="connsiteY0" fmla="*/ 35876 h 174375"/>
-              <a:gd name="connsiteX1" fmla="*/ 723275 w 723275"/>
-              <a:gd name="connsiteY1" fmla="*/ 35876 h 174375"/>
-              <a:gd name="connsiteX2" fmla="*/ 723275 w 723275"/>
-              <a:gd name="connsiteY2" fmla="*/ 174375 h 174375"/>
-              <a:gd name="connsiteX3" fmla="*/ 0 w 723275"/>
-              <a:gd name="connsiteY3" fmla="*/ 174375 h 174375"/>
-              <a:gd name="connsiteX4" fmla="*/ 0 w 723275"/>
-              <a:gd name="connsiteY4" fmla="*/ 35876 h 174375"/>
-            </a:gdLst>
-            <a:ahLst/>
-            <a:cxnLst>
-              <a:cxn ang="0">
-                <a:pos x="connsiteX0" y="connsiteY0"/>
-              </a:cxn>
-              <a:cxn ang="0">
-                <a:pos x="connsiteX1" y="connsiteY1"/>
-              </a:cxn>
-              <a:cxn ang="0">
-                <a:pos x="connsiteX2" y="connsiteY2"/>
-              </a:cxn>
-              <a:cxn ang="0">
-                <a:pos x="connsiteX3" y="connsiteY3"/>
-              </a:cxn>
-              <a:cxn ang="0">
-                <a:pos x="connsiteX4" y="connsiteY4"/>
-              </a:cxn>
-            </a:cxnLst>
-            <a:rect l="l" t="t" r="r" b="b"/>
-            <a:pathLst>
-              <a:path w="723275" h="174375">
-                <a:moveTo>
-                  <a:pt x="0" y="35876"/>
-                </a:moveTo>
-                <a:cubicBezTo>
-                  <a:pt x="237917" y="-5399"/>
-                  <a:pt x="472658" y="-18099"/>
-                  <a:pt x="723275" y="35876"/>
-                </a:cubicBezTo>
-                <a:lnTo>
-                  <a:pt x="723275" y="174375"/>
-                </a:lnTo>
-                <a:cubicBezTo>
-                  <a:pt x="475833" y="114050"/>
-                  <a:pt x="253792" y="117225"/>
-                  <a:pt x="0" y="174375"/>
-                </a:cubicBezTo>
-                <a:lnTo>
-                  <a:pt x="0" y="35876"/>
-                </a:lnTo>
-                <a:close/>
-              </a:path>
-            </a:pathLst>
-          </a:custGeom>
-          <a:noFill/>
-        </p:spPr>
-        <p:txBody>
-          <a:bodyPr wrap="none" rtlCol="0">
-            <a:prstTxWarp prst="textArchUp">
-              <a:avLst>
-                <a:gd name="adj" fmla="val 10770335"/>
-              </a:avLst>
-            </a:prstTxWarp>
-            <a:spAutoFit/>
-          </a:bodyPr>
-          <a:lstStyle/>
-          <a:p>
-            <a:pPr algn="ctr"/>
-            <a:r>
-              <a:rPr lang="en-US" sz="325" b="1" dirty="0"/>
-              <a:t>Table View ∙ Presentation ∙ Model</a:t>
-            </a:r>
-          </a:p>
-        </p:txBody>
-      </p:sp>
-      <p:grpSp>
-        <p:nvGrpSpPr>
-          <p:cNvPr id="21" name="Group 20">
-            <a:extLst>
-              <a:ext uri="{FF2B5EF4-FFF2-40B4-BE49-F238E27FC236}">
-                <a16:creationId xmlns:a16="http://schemas.microsoft.com/office/drawing/2014/main" id="{E2F2DB8B-FD4E-4435-AF7A-ECE48D07780A}"/>
-              </a:ext>
-            </a:extLst>
-          </p:cNvPr>
-          <p:cNvGrpSpPr/>
-          <p:nvPr/>
-        </p:nvGrpSpPr>
-        <p:grpSpPr>
-          <a:xfrm>
-            <a:off x="7026539" y="2612602"/>
-            <a:ext cx="614796" cy="67098"/>
-            <a:chOff x="7007225" y="2644352"/>
-            <a:chExt cx="614796" cy="67098"/>
-          </a:xfrm>
-        </p:grpSpPr>
         <p:grpSp>
           <p:nvGrpSpPr>
-            <p:cNvPr id="17" name="Group 16">
+            <p:cNvPr id="26" name="Group 25">
               <a:extLst>
                 <a:ext uri="{FF2B5EF4-FFF2-40B4-BE49-F238E27FC236}">
-                  <a16:creationId xmlns:a16="http://schemas.microsoft.com/office/drawing/2014/main" id="{E193F21E-F15F-49B1-9821-A612E99BD26C}"/>
+                  <a16:creationId xmlns:a16="http://schemas.microsoft.com/office/drawing/2014/main" id="{31D90A05-0706-4867-B983-DF9B2C73745F}"/>
                 </a:ext>
               </a:extLst>
             </p:cNvPr>
@@ -5709,18 +5071,18 @@
           </p:nvGrpSpPr>
           <p:grpSpPr>
             <a:xfrm>
-              <a:off x="7007225" y="2644775"/>
-              <a:ext cx="177800" cy="66675"/>
-              <a:chOff x="7007225" y="2644775"/>
-              <a:chExt cx="177800" cy="66675"/>
+              <a:off x="4612035" y="2462278"/>
+              <a:ext cx="968980" cy="1728723"/>
+              <a:chOff x="6844695" y="1529697"/>
+              <a:chExt cx="968980" cy="1728723"/>
             </a:xfrm>
           </p:grpSpPr>
           <p:sp>
             <p:nvSpPr>
-              <p:cNvPr id="15" name="Teardrop 14">
+              <p:cNvPr id="33" name="Oval 32">
                 <a:extLst>
                   <a:ext uri="{FF2B5EF4-FFF2-40B4-BE49-F238E27FC236}">
-                    <a16:creationId xmlns:a16="http://schemas.microsoft.com/office/drawing/2014/main" id="{17D135DC-63FC-43A8-A264-F6E549726C88}"/>
+                    <a16:creationId xmlns:a16="http://schemas.microsoft.com/office/drawing/2014/main" id="{DCF97E0A-9564-4A51-A2B0-ECBAC4ED97A2}"/>
                   </a:ext>
                 </a:extLst>
               </p:cNvPr>
@@ -5728,23 +5090,1184 @@
               <p:nvPr/>
             </p:nvSpPr>
             <p:spPr>
-              <a:xfrm rot="773010" flipH="1">
-                <a:off x="7007225" y="2644775"/>
-                <a:ext cx="177800" cy="66675"/>
+              <a:xfrm>
+                <a:off x="6870819" y="2344020"/>
+                <a:ext cx="914400" cy="914400"/>
               </a:xfrm>
-              <a:prstGeom prst="teardrop">
-                <a:avLst>
-                  <a:gd name="adj" fmla="val 108791"/>
-                </a:avLst>
+              <a:prstGeom prst="ellipse">
+                <a:avLst/>
               </a:prstGeom>
               <a:solidFill>
-                <a:schemeClr val="bg1">
-                  <a:lumMod val="95000"/>
-                </a:schemeClr>
+                <a:schemeClr val="accent2"/>
               </a:solidFill>
               <a:ln>
                 <a:solidFill>
+                  <a:schemeClr val="tx1">
+                    <a:lumMod val="75000"/>
+                    <a:lumOff val="25000"/>
+                  </a:schemeClr>
+                </a:solidFill>
+              </a:ln>
+            </p:spPr>
+            <p:style>
+              <a:lnRef idx="2">
+                <a:schemeClr val="accent1">
+                  <a:shade val="50000"/>
+                </a:schemeClr>
+              </a:lnRef>
+              <a:fillRef idx="1">
+                <a:schemeClr val="accent1"/>
+              </a:fillRef>
+              <a:effectRef idx="0">
+                <a:schemeClr val="accent1"/>
+              </a:effectRef>
+              <a:fontRef idx="minor">
+                <a:schemeClr val="lt1"/>
+              </a:fontRef>
+            </p:style>
+            <p:txBody>
+              <a:bodyPr rtlCol="0" anchor="ctr"/>
+              <a:lstStyle/>
+              <a:p>
+                <a:pPr algn="ctr"/>
+                <a:endParaRPr lang="en-US"/>
+              </a:p>
+            </p:txBody>
+          </p:sp>
+          <p:grpSp>
+            <p:nvGrpSpPr>
+              <p:cNvPr id="34" name="Group 33">
+                <a:extLst>
+                  <a:ext uri="{FF2B5EF4-FFF2-40B4-BE49-F238E27FC236}">
+                    <a16:creationId xmlns:a16="http://schemas.microsoft.com/office/drawing/2014/main" id="{F8806C6B-C78E-4B27-8E18-F319A6B19C1C}"/>
+                  </a:ext>
+                </a:extLst>
+              </p:cNvPr>
+              <p:cNvGrpSpPr/>
+              <p:nvPr/>
+            </p:nvGrpSpPr>
+            <p:grpSpPr>
+              <a:xfrm>
+                <a:off x="6844695" y="1529697"/>
+                <a:ext cx="960207" cy="923330"/>
+                <a:chOff x="6844695" y="1529697"/>
+                <a:chExt cx="960207" cy="923330"/>
+              </a:xfrm>
+              <a:scene3d>
+                <a:camera prst="orthographicFront">
+                  <a:rot lat="0" lon="0" rev="0"/>
+                </a:camera>
+                <a:lightRig rig="balanced" dir="t">
+                  <a:rot lat="0" lon="0" rev="8700000"/>
+                </a:lightRig>
+              </a:scene3d>
+            </p:grpSpPr>
+            <p:sp>
+              <p:nvSpPr>
+                <p:cNvPr id="45" name="Pentagon 2">
+                  <a:extLst>
+                    <a:ext uri="{FF2B5EF4-FFF2-40B4-BE49-F238E27FC236}">
+                      <a16:creationId xmlns:a16="http://schemas.microsoft.com/office/drawing/2014/main" id="{B4319F83-A2A1-44BC-A452-AFC7F83D5E4C}"/>
+                    </a:ext>
+                  </a:extLst>
+                </p:cNvPr>
+                <p:cNvSpPr/>
+                <p:nvPr/>
+              </p:nvSpPr>
+              <p:spPr>
+                <a:xfrm>
+                  <a:off x="6847959" y="1529697"/>
+                  <a:ext cx="956943" cy="914398"/>
+                </a:xfrm>
+                <a:custGeom>
+                  <a:avLst/>
+                  <a:gdLst>
+                    <a:gd name="connsiteX0" fmla="*/ 1 w 960120"/>
+                    <a:gd name="connsiteY0" fmla="*/ 349269 h 914400"/>
+                    <a:gd name="connsiteX1" fmla="*/ 480060 w 960120"/>
+                    <a:gd name="connsiteY1" fmla="*/ 0 h 914400"/>
+                    <a:gd name="connsiteX2" fmla="*/ 960119 w 960120"/>
+                    <a:gd name="connsiteY2" fmla="*/ 349269 h 914400"/>
+                    <a:gd name="connsiteX3" fmla="*/ 776753 w 960120"/>
+                    <a:gd name="connsiteY3" fmla="*/ 914398 h 914400"/>
+                    <a:gd name="connsiteX4" fmla="*/ 183367 w 960120"/>
+                    <a:gd name="connsiteY4" fmla="*/ 914398 h 914400"/>
+                    <a:gd name="connsiteX5" fmla="*/ 1 w 960120"/>
+                    <a:gd name="connsiteY5" fmla="*/ 349269 h 914400"/>
+                    <a:gd name="connsiteX0" fmla="*/ 0 w 960118"/>
+                    <a:gd name="connsiteY0" fmla="*/ 349269 h 914398"/>
+                    <a:gd name="connsiteX1" fmla="*/ 480059 w 960118"/>
+                    <a:gd name="connsiteY1" fmla="*/ 0 h 914398"/>
+                    <a:gd name="connsiteX2" fmla="*/ 960118 w 960118"/>
+                    <a:gd name="connsiteY2" fmla="*/ 349269 h 914398"/>
+                    <a:gd name="connsiteX3" fmla="*/ 776752 w 960118"/>
+                    <a:gd name="connsiteY3" fmla="*/ 914398 h 914398"/>
+                    <a:gd name="connsiteX4" fmla="*/ 183366 w 960118"/>
+                    <a:gd name="connsiteY4" fmla="*/ 914398 h 914398"/>
+                    <a:gd name="connsiteX5" fmla="*/ 0 w 960118"/>
+                    <a:gd name="connsiteY5" fmla="*/ 349269 h 914398"/>
+                    <a:gd name="connsiteX0" fmla="*/ 0 w 960118"/>
+                    <a:gd name="connsiteY0" fmla="*/ 349269 h 914398"/>
+                    <a:gd name="connsiteX1" fmla="*/ 480059 w 960118"/>
+                    <a:gd name="connsiteY1" fmla="*/ 0 h 914398"/>
+                    <a:gd name="connsiteX2" fmla="*/ 960118 w 960118"/>
+                    <a:gd name="connsiteY2" fmla="*/ 349269 h 914398"/>
+                    <a:gd name="connsiteX3" fmla="*/ 776752 w 960118"/>
+                    <a:gd name="connsiteY3" fmla="*/ 914398 h 914398"/>
+                    <a:gd name="connsiteX4" fmla="*/ 183366 w 960118"/>
+                    <a:gd name="connsiteY4" fmla="*/ 914398 h 914398"/>
+                    <a:gd name="connsiteX5" fmla="*/ 0 w 960118"/>
+                    <a:gd name="connsiteY5" fmla="*/ 349269 h 914398"/>
+                    <a:gd name="connsiteX0" fmla="*/ 0 w 960118"/>
+                    <a:gd name="connsiteY0" fmla="*/ 349269 h 914398"/>
+                    <a:gd name="connsiteX1" fmla="*/ 480059 w 960118"/>
+                    <a:gd name="connsiteY1" fmla="*/ 0 h 914398"/>
+                    <a:gd name="connsiteX2" fmla="*/ 960118 w 960118"/>
+                    <a:gd name="connsiteY2" fmla="*/ 349269 h 914398"/>
+                    <a:gd name="connsiteX3" fmla="*/ 776752 w 960118"/>
+                    <a:gd name="connsiteY3" fmla="*/ 914398 h 914398"/>
+                    <a:gd name="connsiteX4" fmla="*/ 183366 w 960118"/>
+                    <a:gd name="connsiteY4" fmla="*/ 914398 h 914398"/>
+                    <a:gd name="connsiteX5" fmla="*/ 0 w 960118"/>
+                    <a:gd name="connsiteY5" fmla="*/ 349269 h 914398"/>
+                    <a:gd name="connsiteX0" fmla="*/ 0 w 960118"/>
+                    <a:gd name="connsiteY0" fmla="*/ 349269 h 914398"/>
+                    <a:gd name="connsiteX1" fmla="*/ 480059 w 960118"/>
+                    <a:gd name="connsiteY1" fmla="*/ 0 h 914398"/>
+                    <a:gd name="connsiteX2" fmla="*/ 960118 w 960118"/>
+                    <a:gd name="connsiteY2" fmla="*/ 349269 h 914398"/>
+                    <a:gd name="connsiteX3" fmla="*/ 776752 w 960118"/>
+                    <a:gd name="connsiteY3" fmla="*/ 914398 h 914398"/>
+                    <a:gd name="connsiteX4" fmla="*/ 183366 w 960118"/>
+                    <a:gd name="connsiteY4" fmla="*/ 914398 h 914398"/>
+                    <a:gd name="connsiteX5" fmla="*/ 0 w 960118"/>
+                    <a:gd name="connsiteY5" fmla="*/ 349269 h 914398"/>
+                    <a:gd name="connsiteX0" fmla="*/ 0 w 960118"/>
+                    <a:gd name="connsiteY0" fmla="*/ 349269 h 914398"/>
+                    <a:gd name="connsiteX1" fmla="*/ 480059 w 960118"/>
+                    <a:gd name="connsiteY1" fmla="*/ 0 h 914398"/>
+                    <a:gd name="connsiteX2" fmla="*/ 960118 w 960118"/>
+                    <a:gd name="connsiteY2" fmla="*/ 349269 h 914398"/>
+                    <a:gd name="connsiteX3" fmla="*/ 776752 w 960118"/>
+                    <a:gd name="connsiteY3" fmla="*/ 914398 h 914398"/>
+                    <a:gd name="connsiteX4" fmla="*/ 183366 w 960118"/>
+                    <a:gd name="connsiteY4" fmla="*/ 914398 h 914398"/>
+                    <a:gd name="connsiteX5" fmla="*/ 0 w 960118"/>
+                    <a:gd name="connsiteY5" fmla="*/ 349269 h 914398"/>
+                    <a:gd name="connsiteX0" fmla="*/ 0 w 960118"/>
+                    <a:gd name="connsiteY0" fmla="*/ 349269 h 914398"/>
+                    <a:gd name="connsiteX1" fmla="*/ 480059 w 960118"/>
+                    <a:gd name="connsiteY1" fmla="*/ 0 h 914398"/>
+                    <a:gd name="connsiteX2" fmla="*/ 960118 w 960118"/>
+                    <a:gd name="connsiteY2" fmla="*/ 349269 h 914398"/>
+                    <a:gd name="connsiteX3" fmla="*/ 776752 w 960118"/>
+                    <a:gd name="connsiteY3" fmla="*/ 914398 h 914398"/>
+                    <a:gd name="connsiteX4" fmla="*/ 183366 w 960118"/>
+                    <a:gd name="connsiteY4" fmla="*/ 914398 h 914398"/>
+                    <a:gd name="connsiteX5" fmla="*/ 0 w 960118"/>
+                    <a:gd name="connsiteY5" fmla="*/ 349269 h 914398"/>
+                    <a:gd name="connsiteX0" fmla="*/ 0 w 960118"/>
+                    <a:gd name="connsiteY0" fmla="*/ 412769 h 914398"/>
+                    <a:gd name="connsiteX1" fmla="*/ 480059 w 960118"/>
+                    <a:gd name="connsiteY1" fmla="*/ 0 h 914398"/>
+                    <a:gd name="connsiteX2" fmla="*/ 960118 w 960118"/>
+                    <a:gd name="connsiteY2" fmla="*/ 349269 h 914398"/>
+                    <a:gd name="connsiteX3" fmla="*/ 776752 w 960118"/>
+                    <a:gd name="connsiteY3" fmla="*/ 914398 h 914398"/>
+                    <a:gd name="connsiteX4" fmla="*/ 183366 w 960118"/>
+                    <a:gd name="connsiteY4" fmla="*/ 914398 h 914398"/>
+                    <a:gd name="connsiteX5" fmla="*/ 0 w 960118"/>
+                    <a:gd name="connsiteY5" fmla="*/ 412769 h 914398"/>
+                    <a:gd name="connsiteX0" fmla="*/ 0 w 960118"/>
+                    <a:gd name="connsiteY0" fmla="*/ 412769 h 914398"/>
+                    <a:gd name="connsiteX1" fmla="*/ 480059 w 960118"/>
+                    <a:gd name="connsiteY1" fmla="*/ 0 h 914398"/>
+                    <a:gd name="connsiteX2" fmla="*/ 960118 w 960118"/>
+                    <a:gd name="connsiteY2" fmla="*/ 457219 h 914398"/>
+                    <a:gd name="connsiteX3" fmla="*/ 776752 w 960118"/>
+                    <a:gd name="connsiteY3" fmla="*/ 914398 h 914398"/>
+                    <a:gd name="connsiteX4" fmla="*/ 183366 w 960118"/>
+                    <a:gd name="connsiteY4" fmla="*/ 914398 h 914398"/>
+                    <a:gd name="connsiteX5" fmla="*/ 0 w 960118"/>
+                    <a:gd name="connsiteY5" fmla="*/ 412769 h 914398"/>
+                    <a:gd name="connsiteX0" fmla="*/ 0 w 956943"/>
+                    <a:gd name="connsiteY0" fmla="*/ 412769 h 914398"/>
+                    <a:gd name="connsiteX1" fmla="*/ 480059 w 956943"/>
+                    <a:gd name="connsiteY1" fmla="*/ 0 h 914398"/>
+                    <a:gd name="connsiteX2" fmla="*/ 956943 w 956943"/>
+                    <a:gd name="connsiteY2" fmla="*/ 504844 h 914398"/>
+                    <a:gd name="connsiteX3" fmla="*/ 776752 w 956943"/>
+                    <a:gd name="connsiteY3" fmla="*/ 914398 h 914398"/>
+                    <a:gd name="connsiteX4" fmla="*/ 183366 w 956943"/>
+                    <a:gd name="connsiteY4" fmla="*/ 914398 h 914398"/>
+                    <a:gd name="connsiteX5" fmla="*/ 0 w 956943"/>
+                    <a:gd name="connsiteY5" fmla="*/ 412769 h 914398"/>
+                    <a:gd name="connsiteX0" fmla="*/ 0 w 956943"/>
+                    <a:gd name="connsiteY0" fmla="*/ 485794 h 914398"/>
+                    <a:gd name="connsiteX1" fmla="*/ 480059 w 956943"/>
+                    <a:gd name="connsiteY1" fmla="*/ 0 h 914398"/>
+                    <a:gd name="connsiteX2" fmla="*/ 956943 w 956943"/>
+                    <a:gd name="connsiteY2" fmla="*/ 504844 h 914398"/>
+                    <a:gd name="connsiteX3" fmla="*/ 776752 w 956943"/>
+                    <a:gd name="connsiteY3" fmla="*/ 914398 h 914398"/>
+                    <a:gd name="connsiteX4" fmla="*/ 183366 w 956943"/>
+                    <a:gd name="connsiteY4" fmla="*/ 914398 h 914398"/>
+                    <a:gd name="connsiteX5" fmla="*/ 0 w 956943"/>
+                    <a:gd name="connsiteY5" fmla="*/ 485794 h 914398"/>
+                    <a:gd name="connsiteX0" fmla="*/ 0 w 956943"/>
+                    <a:gd name="connsiteY0" fmla="*/ 485794 h 914398"/>
+                    <a:gd name="connsiteX1" fmla="*/ 480059 w 956943"/>
+                    <a:gd name="connsiteY1" fmla="*/ 0 h 914398"/>
+                    <a:gd name="connsiteX2" fmla="*/ 956943 w 956943"/>
+                    <a:gd name="connsiteY2" fmla="*/ 479444 h 914398"/>
+                    <a:gd name="connsiteX3" fmla="*/ 776752 w 956943"/>
+                    <a:gd name="connsiteY3" fmla="*/ 914398 h 914398"/>
+                    <a:gd name="connsiteX4" fmla="*/ 183366 w 956943"/>
+                    <a:gd name="connsiteY4" fmla="*/ 914398 h 914398"/>
+                    <a:gd name="connsiteX5" fmla="*/ 0 w 956943"/>
+                    <a:gd name="connsiteY5" fmla="*/ 485794 h 914398"/>
+                    <a:gd name="connsiteX0" fmla="*/ 0 w 956943"/>
+                    <a:gd name="connsiteY0" fmla="*/ 485794 h 914398"/>
+                    <a:gd name="connsiteX1" fmla="*/ 480059 w 956943"/>
+                    <a:gd name="connsiteY1" fmla="*/ 0 h 914398"/>
+                    <a:gd name="connsiteX2" fmla="*/ 956943 w 956943"/>
+                    <a:gd name="connsiteY2" fmla="*/ 479444 h 914398"/>
+                    <a:gd name="connsiteX3" fmla="*/ 776752 w 956943"/>
+                    <a:gd name="connsiteY3" fmla="*/ 914398 h 914398"/>
+                    <a:gd name="connsiteX4" fmla="*/ 183366 w 956943"/>
+                    <a:gd name="connsiteY4" fmla="*/ 914398 h 914398"/>
+                    <a:gd name="connsiteX5" fmla="*/ 0 w 956943"/>
+                    <a:gd name="connsiteY5" fmla="*/ 485794 h 914398"/>
+                    <a:gd name="connsiteX0" fmla="*/ 0 w 956943"/>
+                    <a:gd name="connsiteY0" fmla="*/ 485794 h 914398"/>
+                    <a:gd name="connsiteX1" fmla="*/ 480059 w 956943"/>
+                    <a:gd name="connsiteY1" fmla="*/ 0 h 914398"/>
+                    <a:gd name="connsiteX2" fmla="*/ 956943 w 956943"/>
+                    <a:gd name="connsiteY2" fmla="*/ 479444 h 914398"/>
+                    <a:gd name="connsiteX3" fmla="*/ 776752 w 956943"/>
+                    <a:gd name="connsiteY3" fmla="*/ 914398 h 914398"/>
+                    <a:gd name="connsiteX4" fmla="*/ 183366 w 956943"/>
+                    <a:gd name="connsiteY4" fmla="*/ 914398 h 914398"/>
+                    <a:gd name="connsiteX5" fmla="*/ 0 w 956943"/>
+                    <a:gd name="connsiteY5" fmla="*/ 485794 h 914398"/>
+                    <a:gd name="connsiteX0" fmla="*/ 0 w 956943"/>
+                    <a:gd name="connsiteY0" fmla="*/ 485794 h 914398"/>
+                    <a:gd name="connsiteX1" fmla="*/ 480059 w 956943"/>
+                    <a:gd name="connsiteY1" fmla="*/ 0 h 914398"/>
+                    <a:gd name="connsiteX2" fmla="*/ 956943 w 956943"/>
+                    <a:gd name="connsiteY2" fmla="*/ 479444 h 914398"/>
+                    <a:gd name="connsiteX3" fmla="*/ 776752 w 956943"/>
+                    <a:gd name="connsiteY3" fmla="*/ 914398 h 914398"/>
+                    <a:gd name="connsiteX4" fmla="*/ 183366 w 956943"/>
+                    <a:gd name="connsiteY4" fmla="*/ 914398 h 914398"/>
+                    <a:gd name="connsiteX5" fmla="*/ 0 w 956943"/>
+                    <a:gd name="connsiteY5" fmla="*/ 485794 h 914398"/>
+                    <a:gd name="connsiteX0" fmla="*/ 0 w 956943"/>
+                    <a:gd name="connsiteY0" fmla="*/ 485794 h 914398"/>
+                    <a:gd name="connsiteX1" fmla="*/ 480059 w 956943"/>
+                    <a:gd name="connsiteY1" fmla="*/ 0 h 914398"/>
+                    <a:gd name="connsiteX2" fmla="*/ 956943 w 956943"/>
+                    <a:gd name="connsiteY2" fmla="*/ 479444 h 914398"/>
+                    <a:gd name="connsiteX3" fmla="*/ 776752 w 956943"/>
+                    <a:gd name="connsiteY3" fmla="*/ 914398 h 914398"/>
+                    <a:gd name="connsiteX4" fmla="*/ 183366 w 956943"/>
+                    <a:gd name="connsiteY4" fmla="*/ 914398 h 914398"/>
+                    <a:gd name="connsiteX5" fmla="*/ 0 w 956943"/>
+                    <a:gd name="connsiteY5" fmla="*/ 485794 h 914398"/>
+                    <a:gd name="connsiteX0" fmla="*/ 0 w 956943"/>
+                    <a:gd name="connsiteY0" fmla="*/ 485794 h 914398"/>
+                    <a:gd name="connsiteX1" fmla="*/ 480059 w 956943"/>
+                    <a:gd name="connsiteY1" fmla="*/ 0 h 914398"/>
+                    <a:gd name="connsiteX2" fmla="*/ 956943 w 956943"/>
+                    <a:gd name="connsiteY2" fmla="*/ 479444 h 914398"/>
+                    <a:gd name="connsiteX3" fmla="*/ 776752 w 956943"/>
+                    <a:gd name="connsiteY3" fmla="*/ 914398 h 914398"/>
+                    <a:gd name="connsiteX4" fmla="*/ 183366 w 956943"/>
+                    <a:gd name="connsiteY4" fmla="*/ 914398 h 914398"/>
+                    <a:gd name="connsiteX5" fmla="*/ 0 w 956943"/>
+                    <a:gd name="connsiteY5" fmla="*/ 485794 h 914398"/>
+                    <a:gd name="connsiteX0" fmla="*/ 0 w 956943"/>
+                    <a:gd name="connsiteY0" fmla="*/ 485794 h 914398"/>
+                    <a:gd name="connsiteX1" fmla="*/ 480059 w 956943"/>
+                    <a:gd name="connsiteY1" fmla="*/ 0 h 914398"/>
+                    <a:gd name="connsiteX2" fmla="*/ 956943 w 956943"/>
+                    <a:gd name="connsiteY2" fmla="*/ 479444 h 914398"/>
+                    <a:gd name="connsiteX3" fmla="*/ 776752 w 956943"/>
+                    <a:gd name="connsiteY3" fmla="*/ 914398 h 914398"/>
+                    <a:gd name="connsiteX4" fmla="*/ 183366 w 956943"/>
+                    <a:gd name="connsiteY4" fmla="*/ 914398 h 914398"/>
+                    <a:gd name="connsiteX5" fmla="*/ 0 w 956943"/>
+                    <a:gd name="connsiteY5" fmla="*/ 485794 h 914398"/>
+                    <a:gd name="connsiteX0" fmla="*/ 0 w 956943"/>
+                    <a:gd name="connsiteY0" fmla="*/ 485794 h 914398"/>
+                    <a:gd name="connsiteX1" fmla="*/ 480059 w 956943"/>
+                    <a:gd name="connsiteY1" fmla="*/ 0 h 914398"/>
+                    <a:gd name="connsiteX2" fmla="*/ 956943 w 956943"/>
+                    <a:gd name="connsiteY2" fmla="*/ 479444 h 914398"/>
+                    <a:gd name="connsiteX3" fmla="*/ 776752 w 956943"/>
+                    <a:gd name="connsiteY3" fmla="*/ 914398 h 914398"/>
+                    <a:gd name="connsiteX4" fmla="*/ 183366 w 956943"/>
+                    <a:gd name="connsiteY4" fmla="*/ 914398 h 914398"/>
+                    <a:gd name="connsiteX5" fmla="*/ 0 w 956943"/>
+                    <a:gd name="connsiteY5" fmla="*/ 485794 h 914398"/>
+                    <a:gd name="connsiteX0" fmla="*/ 0 w 956943"/>
+                    <a:gd name="connsiteY0" fmla="*/ 485794 h 914398"/>
+                    <a:gd name="connsiteX1" fmla="*/ 480059 w 956943"/>
+                    <a:gd name="connsiteY1" fmla="*/ 0 h 914398"/>
+                    <a:gd name="connsiteX2" fmla="*/ 956943 w 956943"/>
+                    <a:gd name="connsiteY2" fmla="*/ 479444 h 914398"/>
+                    <a:gd name="connsiteX3" fmla="*/ 776752 w 956943"/>
+                    <a:gd name="connsiteY3" fmla="*/ 914398 h 914398"/>
+                    <a:gd name="connsiteX4" fmla="*/ 183366 w 956943"/>
+                    <a:gd name="connsiteY4" fmla="*/ 914398 h 914398"/>
+                    <a:gd name="connsiteX5" fmla="*/ 0 w 956943"/>
+                    <a:gd name="connsiteY5" fmla="*/ 485794 h 914398"/>
+                  </a:gdLst>
+                  <a:ahLst/>
+                  <a:cxnLst>
+                    <a:cxn ang="0">
+                      <a:pos x="connsiteX0" y="connsiteY0"/>
+                    </a:cxn>
+                    <a:cxn ang="0">
+                      <a:pos x="connsiteX1" y="connsiteY1"/>
+                    </a:cxn>
+                    <a:cxn ang="0">
+                      <a:pos x="connsiteX2" y="connsiteY2"/>
+                    </a:cxn>
+                    <a:cxn ang="0">
+                      <a:pos x="connsiteX3" y="connsiteY3"/>
+                    </a:cxn>
+                    <a:cxn ang="0">
+                      <a:pos x="connsiteX4" y="connsiteY4"/>
+                    </a:cxn>
+                    <a:cxn ang="0">
+                      <a:pos x="connsiteX5" y="connsiteY5"/>
+                    </a:cxn>
+                  </a:cxnLst>
+                  <a:rect l="l" t="t" r="r" b="b"/>
+                  <a:pathLst>
+                    <a:path w="956943" h="914398">
+                      <a:moveTo>
+                        <a:pt x="0" y="485794"/>
+                      </a:moveTo>
+                      <a:cubicBezTo>
+                        <a:pt x="131445" y="277296"/>
+                        <a:pt x="218439" y="97373"/>
+                        <a:pt x="480059" y="0"/>
+                      </a:cubicBezTo>
+                      <a:cubicBezTo>
+                        <a:pt x="738504" y="106898"/>
+                        <a:pt x="854073" y="299521"/>
+                        <a:pt x="956943" y="479444"/>
+                      </a:cubicBezTo>
+                      <a:cubicBezTo>
+                        <a:pt x="902171" y="658295"/>
+                        <a:pt x="882324" y="748247"/>
+                        <a:pt x="776752" y="914398"/>
+                      </a:cubicBezTo>
+                      <a:cubicBezTo>
+                        <a:pt x="499582" y="869948"/>
+                        <a:pt x="508161" y="866773"/>
+                        <a:pt x="183366" y="914398"/>
+                      </a:cubicBezTo>
+                      <a:cubicBezTo>
+                        <a:pt x="84144" y="754597"/>
+                        <a:pt x="64297" y="670995"/>
+                        <a:pt x="0" y="485794"/>
+                      </a:cubicBezTo>
+                      <a:close/>
+                    </a:path>
+                  </a:pathLst>
+                </a:custGeom>
+                <a:solidFill>
+                  <a:schemeClr val="bg1"/>
+                </a:solidFill>
+                <a:ln>
+                  <a:noFill/>
+                </a:ln>
+                <a:effectLst>
+                  <a:outerShdw blurRad="44450" dist="27940" dir="5400000" algn="ctr">
+                    <a:srgbClr val="000000">
+                      <a:alpha val="32000"/>
+                    </a:srgbClr>
+                  </a:outerShdw>
+                </a:effectLst>
+                <a:sp3d>
+                  <a:bevelT w="190500" h="38100"/>
+                </a:sp3d>
+              </p:spPr>
+              <p:style>
+                <a:lnRef idx="2">
+                  <a:schemeClr val="accent1">
+                    <a:shade val="50000"/>
+                  </a:schemeClr>
+                </a:lnRef>
+                <a:fillRef idx="1">
+                  <a:schemeClr val="accent1"/>
+                </a:fillRef>
+                <a:effectRef idx="0">
+                  <a:schemeClr val="accent1"/>
+                </a:effectRef>
+                <a:fontRef idx="minor">
+                  <a:schemeClr val="lt1"/>
+                </a:fontRef>
+              </p:style>
+              <p:txBody>
+                <a:bodyPr rtlCol="0" anchor="ctr"/>
+                <a:lstStyle/>
+                <a:p>
+                  <a:pPr algn="ctr"/>
+                  <a:endParaRPr lang="en-US"/>
+                </a:p>
+              </p:txBody>
+            </p:sp>
+            <p:sp>
+              <p:nvSpPr>
+                <p:cNvPr id="46" name="TextBox 45">
+                  <a:extLst>
+                    <a:ext uri="{FF2B5EF4-FFF2-40B4-BE49-F238E27FC236}">
+                      <a16:creationId xmlns:a16="http://schemas.microsoft.com/office/drawing/2014/main" id="{06813A46-9EB4-4983-A251-217290BED723}"/>
+                    </a:ext>
+                  </a:extLst>
+                </p:cNvPr>
+                <p:cNvSpPr txBox="1"/>
+                <p:nvPr/>
+              </p:nvSpPr>
+              <p:spPr>
+                <a:xfrm>
+                  <a:off x="6844695" y="1529697"/>
+                  <a:ext cx="896399" cy="923330"/>
+                </a:xfrm>
+                <a:prstGeom prst="rect">
+                  <a:avLst/>
+                </a:prstGeom>
+                <a:noFill/>
+                <a:ln>
+                  <a:noFill/>
+                </a:ln>
+                <a:effectLst>
+                  <a:outerShdw blurRad="44450" dist="27940" dir="5400000" algn="ctr">
+                    <a:srgbClr val="000000">
+                      <a:alpha val="32000"/>
+                    </a:srgbClr>
+                  </a:outerShdw>
+                </a:effectLst>
+                <a:sp3d>
+                  <a:bevelT w="190500" h="38100"/>
+                </a:sp3d>
+              </p:spPr>
+              <p:txBody>
+                <a:bodyPr wrap="none" rtlCol="0">
+                  <a:spAutoFit/>
+                  <a:sp3d extrusionH="57150" prstMaterial="softEdge">
+                    <a:bevelT w="25400" h="38100"/>
+                  </a:sp3d>
+                </a:bodyPr>
+                <a:lstStyle/>
+                <a:p>
+                  <a:pPr algn="ctr"/>
+                  <a:r>
+                    <a:rPr lang="en-US" sz="5400" b="1" dirty="0">
+                      <a:ln/>
+                      <a:solidFill>
+                        <a:schemeClr val="accent4"/>
+                      </a:solidFill>
+                    </a:rPr>
+                    <a:t>C#</a:t>
+                  </a:r>
+                </a:p>
+              </p:txBody>
+            </p:sp>
+          </p:grpSp>
+          <p:sp>
+            <p:nvSpPr>
+              <p:cNvPr id="35" name="Trapezoid 8">
+                <a:extLst>
+                  <a:ext uri="{FF2B5EF4-FFF2-40B4-BE49-F238E27FC236}">
+                    <a16:creationId xmlns:a16="http://schemas.microsoft.com/office/drawing/2014/main" id="{D59F8FDA-5755-4AF5-879D-9E0CB7FCFD87}"/>
+                  </a:ext>
+                </a:extLst>
+              </p:cNvPr>
+              <p:cNvSpPr/>
+              <p:nvPr/>
+            </p:nvSpPr>
+            <p:spPr>
+              <a:xfrm rot="10800000">
+                <a:off x="6965950" y="2287986"/>
+                <a:ext cx="717550" cy="149757"/>
+              </a:xfrm>
+              <a:custGeom>
+                <a:avLst/>
+                <a:gdLst>
+                  <a:gd name="connsiteX0" fmla="*/ 0 w 698500"/>
+                  <a:gd name="connsiteY0" fmla="*/ 108077 h 108077"/>
+                  <a:gd name="connsiteX1" fmla="*/ 57960 w 698500"/>
+                  <a:gd name="connsiteY1" fmla="*/ 0 h 108077"/>
+                  <a:gd name="connsiteX2" fmla="*/ 640540 w 698500"/>
+                  <a:gd name="connsiteY2" fmla="*/ 0 h 108077"/>
+                  <a:gd name="connsiteX3" fmla="*/ 698500 w 698500"/>
+                  <a:gd name="connsiteY3" fmla="*/ 108077 h 108077"/>
+                  <a:gd name="connsiteX4" fmla="*/ 0 w 698500"/>
+                  <a:gd name="connsiteY4" fmla="*/ 108077 h 108077"/>
+                  <a:gd name="connsiteX0" fmla="*/ 0 w 698500"/>
+                  <a:gd name="connsiteY0" fmla="*/ 108077 h 108077"/>
+                  <a:gd name="connsiteX1" fmla="*/ 57960 w 698500"/>
+                  <a:gd name="connsiteY1" fmla="*/ 0 h 108077"/>
+                  <a:gd name="connsiteX2" fmla="*/ 640540 w 698500"/>
+                  <a:gd name="connsiteY2" fmla="*/ 0 h 108077"/>
+                  <a:gd name="connsiteX3" fmla="*/ 698500 w 698500"/>
+                  <a:gd name="connsiteY3" fmla="*/ 108077 h 108077"/>
+                  <a:gd name="connsiteX4" fmla="*/ 0 w 698500"/>
+                  <a:gd name="connsiteY4" fmla="*/ 108077 h 108077"/>
+                  <a:gd name="connsiteX0" fmla="*/ 0 w 698500"/>
+                  <a:gd name="connsiteY0" fmla="*/ 108077 h 108077"/>
+                  <a:gd name="connsiteX1" fmla="*/ 57960 w 698500"/>
+                  <a:gd name="connsiteY1" fmla="*/ 0 h 108077"/>
+                  <a:gd name="connsiteX2" fmla="*/ 640540 w 698500"/>
+                  <a:gd name="connsiteY2" fmla="*/ 0 h 108077"/>
+                  <a:gd name="connsiteX3" fmla="*/ 698500 w 698500"/>
+                  <a:gd name="connsiteY3" fmla="*/ 108077 h 108077"/>
+                  <a:gd name="connsiteX4" fmla="*/ 0 w 698500"/>
+                  <a:gd name="connsiteY4" fmla="*/ 108077 h 108077"/>
+                  <a:gd name="connsiteX0" fmla="*/ 0 w 698500"/>
+                  <a:gd name="connsiteY0" fmla="*/ 108077 h 132065"/>
+                  <a:gd name="connsiteX1" fmla="*/ 57960 w 698500"/>
+                  <a:gd name="connsiteY1" fmla="*/ 0 h 132065"/>
+                  <a:gd name="connsiteX2" fmla="*/ 640540 w 698500"/>
+                  <a:gd name="connsiteY2" fmla="*/ 0 h 132065"/>
+                  <a:gd name="connsiteX3" fmla="*/ 698500 w 698500"/>
+                  <a:gd name="connsiteY3" fmla="*/ 108077 h 132065"/>
+                  <a:gd name="connsiteX4" fmla="*/ 0 w 698500"/>
+                  <a:gd name="connsiteY4" fmla="*/ 108077 h 132065"/>
+                  <a:gd name="connsiteX0" fmla="*/ 0 w 698500"/>
+                  <a:gd name="connsiteY0" fmla="*/ 108077 h 149757"/>
+                  <a:gd name="connsiteX1" fmla="*/ 57960 w 698500"/>
+                  <a:gd name="connsiteY1" fmla="*/ 0 h 149757"/>
+                  <a:gd name="connsiteX2" fmla="*/ 640540 w 698500"/>
+                  <a:gd name="connsiteY2" fmla="*/ 0 h 149757"/>
+                  <a:gd name="connsiteX3" fmla="*/ 698500 w 698500"/>
+                  <a:gd name="connsiteY3" fmla="*/ 108077 h 149757"/>
+                  <a:gd name="connsiteX4" fmla="*/ 0 w 698500"/>
+                  <a:gd name="connsiteY4" fmla="*/ 108077 h 149757"/>
+                </a:gdLst>
+                <a:ahLst/>
+                <a:cxnLst>
+                  <a:cxn ang="0">
+                    <a:pos x="connsiteX0" y="connsiteY0"/>
+                  </a:cxn>
+                  <a:cxn ang="0">
+                    <a:pos x="connsiteX1" y="connsiteY1"/>
+                  </a:cxn>
+                  <a:cxn ang="0">
+                    <a:pos x="connsiteX2" y="connsiteY2"/>
+                  </a:cxn>
+                  <a:cxn ang="0">
+                    <a:pos x="connsiteX3" y="connsiteY3"/>
+                  </a:cxn>
+                  <a:cxn ang="0">
+                    <a:pos x="connsiteX4" y="connsiteY4"/>
+                  </a:cxn>
+                </a:cxnLst>
+                <a:rect l="l" t="t" r="r" b="b"/>
+                <a:pathLst>
+                  <a:path w="698500" h="149757">
+                    <a:moveTo>
+                      <a:pt x="0" y="108077"/>
+                    </a:moveTo>
+                    <a:lnTo>
+                      <a:pt x="57960" y="0"/>
+                    </a:lnTo>
+                    <a:cubicBezTo>
+                      <a:pt x="277553" y="66675"/>
+                      <a:pt x="471747" y="41275"/>
+                      <a:pt x="640540" y="0"/>
+                    </a:cubicBezTo>
+                    <a:lnTo>
+                      <a:pt x="698500" y="108077"/>
+                    </a:lnTo>
+                    <a:cubicBezTo>
+                      <a:pt x="332317" y="165227"/>
+                      <a:pt x="334433" y="162052"/>
+                      <a:pt x="0" y="108077"/>
+                    </a:cubicBezTo>
+                    <a:close/>
+                  </a:path>
+                </a:pathLst>
+              </a:custGeom>
+              <a:solidFill>
+                <a:srgbClr val="FFCC00"/>
+              </a:solidFill>
+              <a:ln>
+                <a:solidFill>
+                  <a:schemeClr val="accent4">
+                    <a:lumMod val="75000"/>
+                  </a:schemeClr>
+                </a:solidFill>
+              </a:ln>
+              <a:scene3d>
+                <a:camera prst="orthographicFront"/>
+                <a:lightRig rig="threePt" dir="t"/>
+              </a:scene3d>
+              <a:sp3d>
+                <a:bevelT w="57150" h="12700" prst="cross"/>
+              </a:sp3d>
+            </p:spPr>
+            <p:style>
+              <a:lnRef idx="2">
+                <a:schemeClr val="accent1">
+                  <a:shade val="50000"/>
+                </a:schemeClr>
+              </a:lnRef>
+              <a:fillRef idx="1">
+                <a:schemeClr val="accent1"/>
+              </a:fillRef>
+              <a:effectRef idx="0">
+                <a:schemeClr val="accent1"/>
+              </a:effectRef>
+              <a:fontRef idx="minor">
+                <a:schemeClr val="lt1"/>
+              </a:fontRef>
+            </p:style>
+            <p:txBody>
+              <a:bodyPr rtlCol="0" anchor="t"/>
+              <a:lstStyle/>
+              <a:p>
+                <a:pPr algn="ctr"/>
+                <a:endParaRPr lang="en-US" dirty="0"/>
+              </a:p>
+            </p:txBody>
+          </p:sp>
+          <p:sp>
+            <p:nvSpPr>
+              <p:cNvPr id="36" name="TextBox 35">
+                <a:extLst>
+                  <a:ext uri="{FF2B5EF4-FFF2-40B4-BE49-F238E27FC236}">
+                    <a16:creationId xmlns:a16="http://schemas.microsoft.com/office/drawing/2014/main" id="{C5E76517-AF31-4D98-B4F6-7C0EB7294144}"/>
+                  </a:ext>
+                </a:extLst>
+              </p:cNvPr>
+              <p:cNvSpPr txBox="1"/>
+              <p:nvPr/>
+            </p:nvSpPr>
+            <p:spPr>
+              <a:xfrm>
+                <a:off x="6972300" y="2350557"/>
+                <a:ext cx="723275" cy="174375"/>
+              </a:xfrm>
+              <a:custGeom>
+                <a:avLst/>
+                <a:gdLst>
+                  <a:gd name="connsiteX0" fmla="*/ 0 w 723275"/>
+                  <a:gd name="connsiteY0" fmla="*/ 0 h 138499"/>
+                  <a:gd name="connsiteX1" fmla="*/ 723275 w 723275"/>
+                  <a:gd name="connsiteY1" fmla="*/ 0 h 138499"/>
+                  <a:gd name="connsiteX2" fmla="*/ 723275 w 723275"/>
+                  <a:gd name="connsiteY2" fmla="*/ 138499 h 138499"/>
+                  <a:gd name="connsiteX3" fmla="*/ 0 w 723275"/>
+                  <a:gd name="connsiteY3" fmla="*/ 138499 h 138499"/>
+                  <a:gd name="connsiteX4" fmla="*/ 0 w 723275"/>
+                  <a:gd name="connsiteY4" fmla="*/ 0 h 138499"/>
+                  <a:gd name="connsiteX0" fmla="*/ 0 w 723275"/>
+                  <a:gd name="connsiteY0" fmla="*/ 23988 h 162487"/>
+                  <a:gd name="connsiteX1" fmla="*/ 723275 w 723275"/>
+                  <a:gd name="connsiteY1" fmla="*/ 23988 h 162487"/>
+                  <a:gd name="connsiteX2" fmla="*/ 723275 w 723275"/>
+                  <a:gd name="connsiteY2" fmla="*/ 162487 h 162487"/>
+                  <a:gd name="connsiteX3" fmla="*/ 0 w 723275"/>
+                  <a:gd name="connsiteY3" fmla="*/ 162487 h 162487"/>
+                  <a:gd name="connsiteX4" fmla="*/ 0 w 723275"/>
+                  <a:gd name="connsiteY4" fmla="*/ 23988 h 162487"/>
+                  <a:gd name="connsiteX0" fmla="*/ 0 w 723275"/>
+                  <a:gd name="connsiteY0" fmla="*/ 23988 h 162487"/>
+                  <a:gd name="connsiteX1" fmla="*/ 723275 w 723275"/>
+                  <a:gd name="connsiteY1" fmla="*/ 23988 h 162487"/>
+                  <a:gd name="connsiteX2" fmla="*/ 723275 w 723275"/>
+                  <a:gd name="connsiteY2" fmla="*/ 162487 h 162487"/>
+                  <a:gd name="connsiteX3" fmla="*/ 0 w 723275"/>
+                  <a:gd name="connsiteY3" fmla="*/ 162487 h 162487"/>
+                  <a:gd name="connsiteX4" fmla="*/ 0 w 723275"/>
+                  <a:gd name="connsiteY4" fmla="*/ 23988 h 162487"/>
+                  <a:gd name="connsiteX0" fmla="*/ 0 w 723275"/>
+                  <a:gd name="connsiteY0" fmla="*/ 23988 h 162487"/>
+                  <a:gd name="connsiteX1" fmla="*/ 723275 w 723275"/>
+                  <a:gd name="connsiteY1" fmla="*/ 23988 h 162487"/>
+                  <a:gd name="connsiteX2" fmla="*/ 723275 w 723275"/>
+                  <a:gd name="connsiteY2" fmla="*/ 162487 h 162487"/>
+                  <a:gd name="connsiteX3" fmla="*/ 0 w 723275"/>
+                  <a:gd name="connsiteY3" fmla="*/ 162487 h 162487"/>
+                  <a:gd name="connsiteX4" fmla="*/ 0 w 723275"/>
+                  <a:gd name="connsiteY4" fmla="*/ 23988 h 162487"/>
+                  <a:gd name="connsiteX0" fmla="*/ 0 w 723275"/>
+                  <a:gd name="connsiteY0" fmla="*/ 35876 h 174375"/>
+                  <a:gd name="connsiteX1" fmla="*/ 723275 w 723275"/>
+                  <a:gd name="connsiteY1" fmla="*/ 35876 h 174375"/>
+                  <a:gd name="connsiteX2" fmla="*/ 723275 w 723275"/>
+                  <a:gd name="connsiteY2" fmla="*/ 174375 h 174375"/>
+                  <a:gd name="connsiteX3" fmla="*/ 0 w 723275"/>
+                  <a:gd name="connsiteY3" fmla="*/ 174375 h 174375"/>
+                  <a:gd name="connsiteX4" fmla="*/ 0 w 723275"/>
+                  <a:gd name="connsiteY4" fmla="*/ 35876 h 174375"/>
+                </a:gdLst>
+                <a:ahLst/>
+                <a:cxnLst>
+                  <a:cxn ang="0">
+                    <a:pos x="connsiteX0" y="connsiteY0"/>
+                  </a:cxn>
+                  <a:cxn ang="0">
+                    <a:pos x="connsiteX1" y="connsiteY1"/>
+                  </a:cxn>
+                  <a:cxn ang="0">
+                    <a:pos x="connsiteX2" y="connsiteY2"/>
+                  </a:cxn>
+                  <a:cxn ang="0">
+                    <a:pos x="connsiteX3" y="connsiteY3"/>
+                  </a:cxn>
+                  <a:cxn ang="0">
+                    <a:pos x="connsiteX4" y="connsiteY4"/>
+                  </a:cxn>
+                </a:cxnLst>
+                <a:rect l="l" t="t" r="r" b="b"/>
+                <a:pathLst>
+                  <a:path w="723275" h="174375">
+                    <a:moveTo>
+                      <a:pt x="0" y="35876"/>
+                    </a:moveTo>
+                    <a:cubicBezTo>
+                      <a:pt x="237917" y="-5399"/>
+                      <a:pt x="472658" y="-18099"/>
+                      <a:pt x="723275" y="35876"/>
+                    </a:cubicBezTo>
+                    <a:lnTo>
+                      <a:pt x="723275" y="174375"/>
+                    </a:lnTo>
+                    <a:cubicBezTo>
+                      <a:pt x="475833" y="114050"/>
+                      <a:pt x="253792" y="117225"/>
+                      <a:pt x="0" y="174375"/>
+                    </a:cubicBezTo>
+                    <a:lnTo>
+                      <a:pt x="0" y="35876"/>
+                    </a:lnTo>
+                    <a:close/>
+                  </a:path>
+                </a:pathLst>
+              </a:custGeom>
+              <a:noFill/>
+            </p:spPr>
+            <p:txBody>
+              <a:bodyPr wrap="none" rtlCol="0">
+                <a:prstTxWarp prst="textArchUp">
+                  <a:avLst>
+                    <a:gd name="adj" fmla="val 10770335"/>
+                  </a:avLst>
+                </a:prstTxWarp>
+                <a:spAutoFit/>
+              </a:bodyPr>
+              <a:lstStyle/>
+              <a:p>
+                <a:pPr algn="ctr"/>
+                <a:r>
+                  <a:rPr lang="en-US" sz="325" b="1" dirty="0"/>
+                  <a:t>Table View ∙ Presentation ∙ Model</a:t>
+                </a:r>
+              </a:p>
+            </p:txBody>
+          </p:sp>
+          <p:grpSp>
+            <p:nvGrpSpPr>
+              <p:cNvPr id="37" name="Group 36">
+                <a:extLst>
+                  <a:ext uri="{FF2B5EF4-FFF2-40B4-BE49-F238E27FC236}">
+                    <a16:creationId xmlns:a16="http://schemas.microsoft.com/office/drawing/2014/main" id="{08FFEC68-645C-4CAA-B4FF-5FD9C29EACAE}"/>
+                  </a:ext>
+                </a:extLst>
+              </p:cNvPr>
+              <p:cNvGrpSpPr/>
+              <p:nvPr/>
+            </p:nvGrpSpPr>
+            <p:grpSpPr>
+              <a:xfrm>
+                <a:off x="7026539" y="2612602"/>
+                <a:ext cx="614796" cy="67098"/>
+                <a:chOff x="7007225" y="2644352"/>
+                <a:chExt cx="614796" cy="67098"/>
+              </a:xfrm>
+            </p:grpSpPr>
+            <p:grpSp>
+              <p:nvGrpSpPr>
+                <p:cNvPr id="39" name="Group 38">
+                  <a:extLst>
+                    <a:ext uri="{FF2B5EF4-FFF2-40B4-BE49-F238E27FC236}">
+                      <a16:creationId xmlns:a16="http://schemas.microsoft.com/office/drawing/2014/main" id="{A133D950-1348-47B7-A785-22421B7F34B6}"/>
+                    </a:ext>
+                  </a:extLst>
+                </p:cNvPr>
+                <p:cNvGrpSpPr/>
+                <p:nvPr/>
+              </p:nvGrpSpPr>
+              <p:grpSpPr>
+                <a:xfrm>
+                  <a:off x="7007225" y="2644775"/>
+                  <a:ext cx="177800" cy="66675"/>
+                  <a:chOff x="7007225" y="2644775"/>
+                  <a:chExt cx="177800" cy="66675"/>
+                </a:xfrm>
+              </p:grpSpPr>
+              <p:sp>
+                <p:nvSpPr>
+                  <p:cNvPr id="43" name="Teardrop 42">
+                    <a:extLst>
+                      <a:ext uri="{FF2B5EF4-FFF2-40B4-BE49-F238E27FC236}">
+                        <a16:creationId xmlns:a16="http://schemas.microsoft.com/office/drawing/2014/main" id="{579D34AC-8B39-489B-B3A9-C70DF4290205}"/>
+                      </a:ext>
+                    </a:extLst>
+                  </p:cNvPr>
+                  <p:cNvSpPr/>
+                  <p:nvPr/>
+                </p:nvSpPr>
+                <p:spPr>
+                  <a:xfrm rot="773010" flipH="1">
+                    <a:off x="7007225" y="2644775"/>
+                    <a:ext cx="177800" cy="66675"/>
+                  </a:xfrm>
+                  <a:prstGeom prst="teardrop">
+                    <a:avLst>
+                      <a:gd name="adj" fmla="val 108791"/>
+                    </a:avLst>
+                  </a:prstGeom>
+                  <a:solidFill>
+                    <a:schemeClr val="bg1">
+                      <a:lumMod val="95000"/>
+                    </a:schemeClr>
+                  </a:solidFill>
+                  <a:ln>
+                    <a:solidFill>
+                      <a:schemeClr val="tx1"/>
+                    </a:solidFill>
+                  </a:ln>
+                </p:spPr>
+                <p:style>
+                  <a:lnRef idx="2">
+                    <a:schemeClr val="accent1">
+                      <a:shade val="50000"/>
+                    </a:schemeClr>
+                  </a:lnRef>
+                  <a:fillRef idx="1">
+                    <a:schemeClr val="accent1"/>
+                  </a:fillRef>
+                  <a:effectRef idx="0">
+                    <a:schemeClr val="accent1"/>
+                  </a:effectRef>
+                  <a:fontRef idx="minor">
+                    <a:schemeClr val="lt1"/>
+                  </a:fontRef>
+                </p:style>
+                <p:txBody>
+                  <a:bodyPr rtlCol="0" anchor="ctr"/>
+                  <a:lstStyle/>
+                  <a:p>
+                    <a:pPr algn="ctr"/>
+                    <a:endParaRPr lang="en-US"/>
+                  </a:p>
+                </p:txBody>
+              </p:sp>
+              <p:sp>
+                <p:nvSpPr>
+                  <p:cNvPr id="44" name="Oval 43">
+                    <a:extLst>
+                      <a:ext uri="{FF2B5EF4-FFF2-40B4-BE49-F238E27FC236}">
+                        <a16:creationId xmlns:a16="http://schemas.microsoft.com/office/drawing/2014/main" id="{C904EB0B-29D3-44B7-8869-4F2D4B617926}"/>
+                      </a:ext>
+                    </a:extLst>
+                  </p:cNvPr>
+                  <p:cNvSpPr/>
+                  <p:nvPr/>
+                </p:nvSpPr>
+                <p:spPr>
+                  <a:xfrm>
+                    <a:off x="7073900" y="2654138"/>
+                    <a:ext cx="47625" cy="47104"/>
+                  </a:xfrm>
+                  <a:prstGeom prst="ellipse">
+                    <a:avLst/>
+                  </a:prstGeom>
+                  <a:solidFill>
+                    <a:srgbClr val="8D5F31"/>
+                  </a:solidFill>
+                  <a:ln>
+                    <a:noFill/>
+                  </a:ln>
+                  <a:scene3d>
+                    <a:camera prst="orthographicFront"/>
+                    <a:lightRig rig="threePt" dir="t"/>
+                  </a:scene3d>
+                  <a:sp3d>
+                    <a:bevelT/>
+                  </a:sp3d>
+                </p:spPr>
+                <p:style>
+                  <a:lnRef idx="2">
+                    <a:schemeClr val="accent1">
+                      <a:shade val="50000"/>
+                    </a:schemeClr>
+                  </a:lnRef>
+                  <a:fillRef idx="1">
+                    <a:schemeClr val="accent1"/>
+                  </a:fillRef>
+                  <a:effectRef idx="0">
+                    <a:schemeClr val="accent1"/>
+                  </a:effectRef>
+                  <a:fontRef idx="minor">
+                    <a:schemeClr val="lt1"/>
+                  </a:fontRef>
+                </p:style>
+                <p:txBody>
+                  <a:bodyPr rtlCol="0" anchor="ctr"/>
+                  <a:lstStyle/>
+                  <a:p>
+                    <a:pPr algn="ctr"/>
+                    <a:endParaRPr lang="en-US"/>
+                  </a:p>
+                </p:txBody>
+              </p:sp>
+            </p:grpSp>
+            <p:grpSp>
+              <p:nvGrpSpPr>
+                <p:cNvPr id="40" name="Group 39">
+                  <a:extLst>
+                    <a:ext uri="{FF2B5EF4-FFF2-40B4-BE49-F238E27FC236}">
+                      <a16:creationId xmlns:a16="http://schemas.microsoft.com/office/drawing/2014/main" id="{5B15885C-FA0A-451E-B97F-0216403E3AB1}"/>
+                    </a:ext>
+                  </a:extLst>
+                </p:cNvPr>
+                <p:cNvGrpSpPr/>
+                <p:nvPr/>
+              </p:nvGrpSpPr>
+              <p:grpSpPr>
+                <a:xfrm flipH="1">
+                  <a:off x="7444221" y="2644352"/>
+                  <a:ext cx="177800" cy="66675"/>
+                  <a:chOff x="7007225" y="2644775"/>
+                  <a:chExt cx="177800" cy="66675"/>
+                </a:xfrm>
+              </p:grpSpPr>
+              <p:sp>
+                <p:nvSpPr>
+                  <p:cNvPr id="41" name="Teardrop 40">
+                    <a:extLst>
+                      <a:ext uri="{FF2B5EF4-FFF2-40B4-BE49-F238E27FC236}">
+                        <a16:creationId xmlns:a16="http://schemas.microsoft.com/office/drawing/2014/main" id="{982E6B3F-5BDD-4469-9A44-80E0929FDE61}"/>
+                      </a:ext>
+                    </a:extLst>
+                  </p:cNvPr>
+                  <p:cNvSpPr/>
+                  <p:nvPr/>
+                </p:nvSpPr>
+                <p:spPr>
+                  <a:xfrm rot="773010" flipH="1">
+                    <a:off x="7007225" y="2644775"/>
+                    <a:ext cx="177800" cy="66675"/>
+                  </a:xfrm>
+                  <a:prstGeom prst="teardrop">
+                    <a:avLst>
+                      <a:gd name="adj" fmla="val 108791"/>
+                    </a:avLst>
+                  </a:prstGeom>
+                  <a:solidFill>
+                    <a:schemeClr val="bg1">
+                      <a:lumMod val="95000"/>
+                    </a:schemeClr>
+                  </a:solidFill>
+                  <a:ln>
+                    <a:solidFill>
+                      <a:schemeClr val="tx1"/>
+                    </a:solidFill>
+                  </a:ln>
+                </p:spPr>
+                <p:style>
+                  <a:lnRef idx="2">
+                    <a:schemeClr val="accent1">
+                      <a:shade val="50000"/>
+                    </a:schemeClr>
+                  </a:lnRef>
+                  <a:fillRef idx="1">
+                    <a:schemeClr val="accent1"/>
+                  </a:fillRef>
+                  <a:effectRef idx="0">
+                    <a:schemeClr val="accent1"/>
+                  </a:effectRef>
+                  <a:fontRef idx="minor">
+                    <a:schemeClr val="lt1"/>
+                  </a:fontRef>
+                </p:style>
+                <p:txBody>
+                  <a:bodyPr rtlCol="0" anchor="ctr"/>
+                  <a:lstStyle/>
+                  <a:p>
+                    <a:pPr algn="ctr"/>
+                    <a:endParaRPr lang="en-US"/>
+                  </a:p>
+                </p:txBody>
+              </p:sp>
+              <p:sp>
+                <p:nvSpPr>
+                  <p:cNvPr id="42" name="Oval 41">
+                    <a:extLst>
+                      <a:ext uri="{FF2B5EF4-FFF2-40B4-BE49-F238E27FC236}">
+                        <a16:creationId xmlns:a16="http://schemas.microsoft.com/office/drawing/2014/main" id="{DC57F426-1432-4AD3-8FD1-C9CF0FBE9D49}"/>
+                      </a:ext>
+                    </a:extLst>
+                  </p:cNvPr>
+                  <p:cNvSpPr/>
+                  <p:nvPr/>
+                </p:nvSpPr>
+                <p:spPr>
+                  <a:xfrm>
+                    <a:off x="7073900" y="2654138"/>
+                    <a:ext cx="47625" cy="47104"/>
+                  </a:xfrm>
+                  <a:prstGeom prst="ellipse">
+                    <a:avLst/>
+                  </a:prstGeom>
+                  <a:solidFill>
+                    <a:srgbClr val="8D5F31"/>
+                  </a:solidFill>
+                  <a:ln>
+                    <a:noFill/>
+                  </a:ln>
+                  <a:scene3d>
+                    <a:camera prst="orthographicFront"/>
+                    <a:lightRig rig="threePt" dir="t"/>
+                  </a:scene3d>
+                  <a:sp3d>
+                    <a:bevelT/>
+                  </a:sp3d>
+                </p:spPr>
+                <p:style>
+                  <a:lnRef idx="2">
+                    <a:schemeClr val="accent1">
+                      <a:shade val="50000"/>
+                    </a:schemeClr>
+                  </a:lnRef>
+                  <a:fillRef idx="1">
+                    <a:schemeClr val="accent1"/>
+                  </a:fillRef>
+                  <a:effectRef idx="0">
+                    <a:schemeClr val="accent1"/>
+                  </a:effectRef>
+                  <a:fontRef idx="minor">
+                    <a:schemeClr val="lt1"/>
+                  </a:fontRef>
+                </p:style>
+                <p:txBody>
+                  <a:bodyPr rtlCol="0" anchor="ctr"/>
+                  <a:lstStyle/>
+                  <a:p>
+                    <a:pPr algn="ctr"/>
+                    <a:endParaRPr lang="en-US"/>
+                  </a:p>
+                </p:txBody>
+              </p:sp>
+            </p:grpSp>
+          </p:grpSp>
+          <p:sp>
+            <p:nvSpPr>
+              <p:cNvPr id="38" name="Arc 37">
+                <a:extLst>
+                  <a:ext uri="{FF2B5EF4-FFF2-40B4-BE49-F238E27FC236}">
+                    <a16:creationId xmlns:a16="http://schemas.microsoft.com/office/drawing/2014/main" id="{C43B89A9-4A8F-4B59-B903-F315A257B116}"/>
+                  </a:ext>
+                </a:extLst>
+              </p:cNvPr>
+              <p:cNvSpPr/>
+              <p:nvPr/>
+            </p:nvSpPr>
+            <p:spPr>
+              <a:xfrm rot="8275946">
+                <a:off x="6899275" y="1986895"/>
+                <a:ext cx="914400" cy="914400"/>
+              </a:xfrm>
+              <a:prstGeom prst="arc">
+                <a:avLst/>
+              </a:prstGeom>
+              <a:ln w="28575">
+                <a:solidFill>
                   <a:schemeClr val="tx1"/>
+                </a:solidFill>
+              </a:ln>
+            </p:spPr>
+            <p:style>
+              <a:lnRef idx="1">
+                <a:schemeClr val="accent1"/>
+              </a:lnRef>
+              <a:fillRef idx="0">
+                <a:schemeClr val="accent1"/>
+              </a:fillRef>
+              <a:effectRef idx="0">
+                <a:schemeClr val="accent1"/>
+              </a:effectRef>
+              <a:fontRef idx="minor">
+                <a:schemeClr val="tx1"/>
+              </a:fontRef>
+            </p:style>
+            <p:txBody>
+              <a:bodyPr rtlCol="0" anchor="ctr"/>
+              <a:lstStyle/>
+              <a:p>
+                <a:pPr algn="ctr"/>
+                <a:endParaRPr lang="en-US"/>
+              </a:p>
+            </p:txBody>
+          </p:sp>
+        </p:grpSp>
+        <p:grpSp>
+          <p:nvGrpSpPr>
+            <p:cNvPr id="27" name="Group 26">
+              <a:extLst>
+                <a:ext uri="{FF2B5EF4-FFF2-40B4-BE49-F238E27FC236}">
+                  <a16:creationId xmlns:a16="http://schemas.microsoft.com/office/drawing/2014/main" id="{DE245EE0-91C4-467E-827C-731BFD0C2947}"/>
+                </a:ext>
+              </a:extLst>
+            </p:cNvPr>
+            <p:cNvGrpSpPr/>
+            <p:nvPr/>
+          </p:nvGrpSpPr>
+          <p:grpSpPr>
+            <a:xfrm rot="21105339">
+              <a:off x="4203689" y="2830125"/>
+              <a:ext cx="394660" cy="1355459"/>
+              <a:chOff x="4041363" y="2666999"/>
+              <a:chExt cx="394660" cy="1355459"/>
+            </a:xfrm>
+          </p:grpSpPr>
+          <p:sp>
+            <p:nvSpPr>
+              <p:cNvPr id="31" name="Cylinder 30">
+                <a:extLst>
+                  <a:ext uri="{FF2B5EF4-FFF2-40B4-BE49-F238E27FC236}">
+                    <a16:creationId xmlns:a16="http://schemas.microsoft.com/office/drawing/2014/main" id="{2CAA59EB-3DE8-492A-B6EF-C1FA8408E00D}"/>
+                  </a:ext>
+                </a:extLst>
+              </p:cNvPr>
+              <p:cNvSpPr/>
+              <p:nvPr/>
+            </p:nvSpPr>
+            <p:spPr>
+              <a:xfrm>
+                <a:off x="4191586" y="2806306"/>
+                <a:ext cx="66675" cy="1216152"/>
+              </a:xfrm>
+              <a:prstGeom prst="can">
+                <a:avLst/>
+              </a:prstGeom>
+              <a:solidFill>
+                <a:srgbClr val="F4EE00"/>
+              </a:solidFill>
+              <a:ln w="3175">
+                <a:solidFill>
+                  <a:schemeClr val="accent4">
+                    <a:lumMod val="75000"/>
+                  </a:schemeClr>
                 </a:solidFill>
               </a:ln>
             </p:spPr>
@@ -5775,10 +6298,80 @@
           </p:sp>
           <p:sp>
             <p:nvSpPr>
-              <p:cNvPr id="16" name="Oval 15">
+              <p:cNvPr id="32" name="TextBox 31">
                 <a:extLst>
                   <a:ext uri="{FF2B5EF4-FFF2-40B4-BE49-F238E27FC236}">
-                    <a16:creationId xmlns:a16="http://schemas.microsoft.com/office/drawing/2014/main" id="{432FBE9D-7F00-4F1E-A8C9-4D5267A5DD9E}"/>
+                    <a16:creationId xmlns:a16="http://schemas.microsoft.com/office/drawing/2014/main" id="{6167F86F-6217-4EF2-A205-BFCEBCED5C6F}"/>
+                  </a:ext>
+                </a:extLst>
+              </p:cNvPr>
+              <p:cNvSpPr txBox="1"/>
+              <p:nvPr/>
+            </p:nvSpPr>
+            <p:spPr>
+              <a:xfrm>
+                <a:off x="4041363" y="2666999"/>
+                <a:ext cx="394660" cy="230832"/>
+              </a:xfrm>
+              <a:prstGeom prst="rect">
+                <a:avLst/>
+              </a:prstGeom>
+              <a:noFill/>
+            </p:spPr>
+            <p:txBody>
+              <a:bodyPr wrap="none" rtlCol="0">
+                <a:spAutoFit/>
+                <a:scene3d>
+                  <a:camera prst="orthographicFront"/>
+                  <a:lightRig rig="soft" dir="t">
+                    <a:rot lat="0" lon="0" rev="15600000"/>
+                  </a:lightRig>
+                </a:scene3d>
+                <a:sp3d extrusionH="57150" prstMaterial="softEdge">
+                  <a:bevelT w="25400" h="38100"/>
+                </a:sp3d>
+              </a:bodyPr>
+              <a:lstStyle/>
+              <a:p>
+                <a:r>
+                  <a:rPr lang="en-US" sz="900" b="1" dirty="0">
+                    <a:ln/>
+                    <a:solidFill>
+                      <a:schemeClr val="accent4"/>
+                    </a:solidFill>
+                  </a:rPr>
+                  <a:t>FOO</a:t>
+                </a:r>
+              </a:p>
+            </p:txBody>
+          </p:sp>
+        </p:grpSp>
+        <p:grpSp>
+          <p:nvGrpSpPr>
+            <p:cNvPr id="28" name="Group 27">
+              <a:extLst>
+                <a:ext uri="{FF2B5EF4-FFF2-40B4-BE49-F238E27FC236}">
+                  <a16:creationId xmlns:a16="http://schemas.microsoft.com/office/drawing/2014/main" id="{4C065827-25AC-4157-8C36-E6F178D40313}"/>
+                </a:ext>
+              </a:extLst>
+            </p:cNvPr>
+            <p:cNvGrpSpPr/>
+            <p:nvPr/>
+          </p:nvGrpSpPr>
+          <p:grpSpPr>
+            <a:xfrm>
+              <a:off x="4860533" y="3584067"/>
+              <a:ext cx="932799" cy="914400"/>
+              <a:chOff x="5512669" y="3536603"/>
+              <a:chExt cx="932799" cy="914400"/>
+            </a:xfrm>
+          </p:grpSpPr>
+          <p:sp>
+            <p:nvSpPr>
+              <p:cNvPr id="29" name="Block Arc 28">
+                <a:extLst>
+                  <a:ext uri="{FF2B5EF4-FFF2-40B4-BE49-F238E27FC236}">
+                    <a16:creationId xmlns:a16="http://schemas.microsoft.com/office/drawing/2014/main" id="{7F0D17DE-91BB-430F-8248-7F311748B9D5}"/>
                   </a:ext>
                 </a:extLst>
               </p:cNvPr>
@@ -5786,103 +6379,23 @@
               <p:nvPr/>
             </p:nvSpPr>
             <p:spPr>
-              <a:xfrm>
-                <a:off x="7073900" y="2654138"/>
-                <a:ext cx="47625" cy="47104"/>
+              <a:xfrm rot="21075178">
+                <a:off x="5512669" y="3536603"/>
+                <a:ext cx="914400" cy="914400"/>
               </a:xfrm>
-              <a:prstGeom prst="ellipse">
-                <a:avLst/>
-              </a:prstGeom>
-              <a:solidFill>
-                <a:srgbClr val="8D5F31"/>
-              </a:solidFill>
-              <a:ln>
-                <a:noFill/>
-              </a:ln>
-              <a:scene3d>
-                <a:camera prst="orthographicFront"/>
-                <a:lightRig rig="threePt" dir="t"/>
-              </a:scene3d>
-              <a:sp3d>
-                <a:bevelT/>
-              </a:sp3d>
-            </p:spPr>
-            <p:style>
-              <a:lnRef idx="2">
-                <a:schemeClr val="accent1">
-                  <a:shade val="50000"/>
-                </a:schemeClr>
-              </a:lnRef>
-              <a:fillRef idx="1">
-                <a:schemeClr val="accent1"/>
-              </a:fillRef>
-              <a:effectRef idx="0">
-                <a:schemeClr val="accent1"/>
-              </a:effectRef>
-              <a:fontRef idx="minor">
-                <a:schemeClr val="lt1"/>
-              </a:fontRef>
-            </p:style>
-            <p:txBody>
-              <a:bodyPr rtlCol="0" anchor="ctr"/>
-              <a:lstStyle/>
-              <a:p>
-                <a:pPr algn="ctr"/>
-                <a:endParaRPr lang="en-US"/>
-              </a:p>
-            </p:txBody>
-          </p:sp>
-        </p:grpSp>
-        <p:grpSp>
-          <p:nvGrpSpPr>
-            <p:cNvPr id="18" name="Group 17">
-              <a:extLst>
-                <a:ext uri="{FF2B5EF4-FFF2-40B4-BE49-F238E27FC236}">
-                  <a16:creationId xmlns:a16="http://schemas.microsoft.com/office/drawing/2014/main" id="{E2F924D9-C608-4411-B493-B17D101B7257}"/>
-                </a:ext>
-              </a:extLst>
-            </p:cNvPr>
-            <p:cNvGrpSpPr/>
-            <p:nvPr/>
-          </p:nvGrpSpPr>
-          <p:grpSpPr>
-            <a:xfrm flipH="1">
-              <a:off x="7444221" y="2644352"/>
-              <a:ext cx="177800" cy="66675"/>
-              <a:chOff x="7007225" y="2644775"/>
-              <a:chExt cx="177800" cy="66675"/>
-            </a:xfrm>
-          </p:grpSpPr>
-          <p:sp>
-            <p:nvSpPr>
-              <p:cNvPr id="19" name="Teardrop 18">
-                <a:extLst>
-                  <a:ext uri="{FF2B5EF4-FFF2-40B4-BE49-F238E27FC236}">
-                    <a16:creationId xmlns:a16="http://schemas.microsoft.com/office/drawing/2014/main" id="{A3F71256-ECE5-490F-95DE-71C310C59F4C}"/>
-                  </a:ext>
-                </a:extLst>
-              </p:cNvPr>
-              <p:cNvSpPr/>
-              <p:nvPr/>
-            </p:nvSpPr>
-            <p:spPr>
-              <a:xfrm rot="773010" flipH="1">
-                <a:off x="7007225" y="2644775"/>
-                <a:ext cx="177800" cy="66675"/>
-              </a:xfrm>
-              <a:prstGeom prst="teardrop">
+              <a:prstGeom prst="blockArc">
                 <a:avLst>
-                  <a:gd name="adj" fmla="val 108791"/>
+                  <a:gd name="adj1" fmla="val 20369705"/>
+                  <a:gd name="adj2" fmla="val 21551524"/>
+                  <a:gd name="adj3" fmla="val 10469"/>
                 </a:avLst>
               </a:prstGeom>
               <a:solidFill>
-                <a:schemeClr val="bg1">
-                  <a:lumMod val="95000"/>
-                </a:schemeClr>
+                <a:srgbClr val="000099"/>
               </a:solidFill>
-              <a:ln>
+              <a:ln w="3175">
                 <a:solidFill>
-                  <a:schemeClr val="tx1"/>
+                  <a:schemeClr val="bg1"/>
                 </a:solidFill>
               </a:ln>
             </p:spPr>
@@ -5907,66 +6420,51 @@
               <a:lstStyle/>
               <a:p>
                 <a:pPr algn="ctr"/>
-                <a:endParaRPr lang="en-US"/>
+                <a:endParaRPr lang="en-US">
+                  <a:solidFill>
+                    <a:schemeClr val="tx1"/>
+                  </a:solidFill>
+                </a:endParaRPr>
               </a:p>
             </p:txBody>
           </p:sp>
           <p:sp>
             <p:nvSpPr>
-              <p:cNvPr id="20" name="Oval 19">
+              <p:cNvPr id="30" name="TextBox 29">
                 <a:extLst>
                   <a:ext uri="{FF2B5EF4-FFF2-40B4-BE49-F238E27FC236}">
-                    <a16:creationId xmlns:a16="http://schemas.microsoft.com/office/drawing/2014/main" id="{7D578B5F-58B5-41EC-B5EC-0D15AC59874B}"/>
+                    <a16:creationId xmlns:a16="http://schemas.microsoft.com/office/drawing/2014/main" id="{5D2DEE42-2ABE-4FB6-AE55-FED50BD19583}"/>
                   </a:ext>
                 </a:extLst>
               </p:cNvPr>
-              <p:cNvSpPr/>
+              <p:cNvSpPr txBox="1"/>
               <p:nvPr/>
             </p:nvSpPr>
             <p:spPr>
-              <a:xfrm>
-                <a:off x="7073900" y="2654138"/>
-                <a:ext cx="47625" cy="47104"/>
+              <a:xfrm rot="4061678">
+                <a:off x="6227940" y="3762164"/>
+                <a:ext cx="250390" cy="184666"/>
               </a:xfrm>
-              <a:prstGeom prst="ellipse">
+              <a:prstGeom prst="rect">
                 <a:avLst/>
               </a:prstGeom>
-              <a:solidFill>
-                <a:srgbClr val="8D5F31"/>
-              </a:solidFill>
-              <a:ln>
-                <a:noFill/>
-              </a:ln>
-              <a:scene3d>
-                <a:camera prst="orthographicFront"/>
-                <a:lightRig rig="threePt" dir="t"/>
-              </a:scene3d>
-              <a:sp3d>
-                <a:bevelT/>
-              </a:sp3d>
+              <a:noFill/>
             </p:spPr>
-            <p:style>
-              <a:lnRef idx="2">
-                <a:schemeClr val="accent1">
-                  <a:shade val="50000"/>
-                </a:schemeClr>
-              </a:lnRef>
-              <a:fillRef idx="1">
-                <a:schemeClr val="accent1"/>
-              </a:fillRef>
-              <a:effectRef idx="0">
-                <a:schemeClr val="accent1"/>
-              </a:effectRef>
-              <a:fontRef idx="minor">
-                <a:schemeClr val="lt1"/>
-              </a:fontRef>
-            </p:style>
             <p:txBody>
-              <a:bodyPr rtlCol="0" anchor="ctr"/>
+              <a:bodyPr wrap="none" rtlCol="0">
+                <a:spAutoFit/>
+              </a:bodyPr>
               <a:lstStyle/>
               <a:p>
                 <a:pPr algn="ctr"/>
-                <a:endParaRPr lang="en-US"/>
+                <a:r>
+                  <a:rPr lang="en-US" sz="600" dirty="0">
+                    <a:solidFill>
+                      <a:schemeClr val="bg1"/>
+                    </a:solidFill>
+                  </a:rPr>
+                  <a:t>∞</a:t>
+                </a:r>
               </a:p>
             </p:txBody>
           </p:sp>
@@ -5974,10 +6472,10 @@
       </p:grpSp>
       <p:sp>
         <p:nvSpPr>
-          <p:cNvPr id="22" name="Arc 21">
-            <a:extLst>
-              <a:ext uri="{FF2B5EF4-FFF2-40B4-BE49-F238E27FC236}">
-                <a16:creationId xmlns:a16="http://schemas.microsoft.com/office/drawing/2014/main" id="{94C2DDF0-C8CD-4E22-9482-56D3F159DBEE}"/>
+          <p:cNvPr id="47" name="Oval 46">
+            <a:extLst>
+              <a:ext uri="{FF2B5EF4-FFF2-40B4-BE49-F238E27FC236}">
+                <a16:creationId xmlns:a16="http://schemas.microsoft.com/office/drawing/2014/main" id="{F662A7C0-9410-41F4-89AB-398824DB0091}"/>
               </a:ext>
             </a:extLst>
           </p:cNvPr>
@@ -5985,31 +6483,41 @@
           <p:nvPr/>
         </p:nvSpPr>
         <p:spPr>
-          <a:xfrm rot="8275946">
-            <a:off x="6899275" y="1986895"/>
+          <a:xfrm>
+            <a:off x="3041650" y="3214334"/>
             <a:ext cx="914400" cy="914400"/>
           </a:xfrm>
-          <a:prstGeom prst="arc">
+          <a:prstGeom prst="ellipse">
             <a:avLst/>
           </a:prstGeom>
-          <a:ln w="28575">
+          <a:pattFill prst="solidDmnd">
+            <a:fgClr>
+              <a:schemeClr val="tx1"/>
+            </a:fgClr>
+            <a:bgClr>
+              <a:srgbClr val="FFFF00"/>
+            </a:bgClr>
+          </a:pattFill>
+          <a:ln>
             <a:solidFill>
               <a:schemeClr val="tx1"/>
             </a:solidFill>
           </a:ln>
         </p:spPr>
         <p:style>
-          <a:lnRef idx="1">
-            <a:schemeClr val="accent1"/>
+          <a:lnRef idx="2">
+            <a:schemeClr val="accent1">
+              <a:shade val="50000"/>
+            </a:schemeClr>
           </a:lnRef>
-          <a:fillRef idx="0">
+          <a:fillRef idx="1">
             <a:schemeClr val="accent1"/>
           </a:fillRef>
           <a:effectRef idx="0">
             <a:schemeClr val="accent1"/>
           </a:effectRef>
           <a:fontRef idx="minor">
-            <a:schemeClr val="tx1"/>
+            <a:schemeClr val="lt1"/>
           </a:fontRef>
         </p:style>
         <p:txBody>

</xml_diff>